<commit_message>
Add example to the document.
Change-Id: I3c4fbcaa80e1bd8e9c311b0a773842ba9e121c96
</commit_message>
<xml_diff>
--- a/Doc/Presentation_How_To_Write_A_Collector.pptx
+++ b/Doc/Presentation_How_To_Write_A_Collector.pptx
@@ -5,7 +5,7 @@
     <p:sldMasterId id="2147483648" r:id="rId1"/>
   </p:sldMasterIdLst>
   <p:notesMasterIdLst>
-    <p:notesMasterId r:id="rId7"/>
+    <p:notesMasterId r:id="rId11"/>
   </p:notesMasterIdLst>
   <p:sldIdLst>
     <p:sldId id="256" r:id="rId2"/>
@@ -13,6 +13,10 @@
     <p:sldId id="258" r:id="rId4"/>
     <p:sldId id="259" r:id="rId5"/>
     <p:sldId id="260" r:id="rId6"/>
+    <p:sldId id="261" r:id="rId7"/>
+    <p:sldId id="262" r:id="rId8"/>
+    <p:sldId id="263" r:id="rId9"/>
+    <p:sldId id="264" r:id="rId10"/>
   </p:sldIdLst>
   <p:sldSz cx="12192000" cy="6858000"/>
   <p:notesSz cx="6858000" cy="9144000"/>
@@ -543,6 +547,90 @@
     <p:extLst>
       <p:ext uri="{BB962C8B-B14F-4D97-AF65-F5344CB8AC3E}">
         <p14:creationId xmlns:p14="http://schemas.microsoft.com/office/powerpoint/2010/main" val="2962476275"/>
+      </p:ext>
+    </p:extLst>
+  </p:cSld>
+  <p:clrMapOvr>
+    <a:masterClrMapping/>
+  </p:clrMapOvr>
+</p:notes>
+</file>
+
+<file path=ppt/notesSlides/notesSlide2.xml><?xml version="1.0" encoding="utf-8"?>
+<p:notes xmlns:a="http://schemas.openxmlformats.org/drawingml/2006/main" xmlns:r="http://schemas.openxmlformats.org/officeDocument/2006/relationships" xmlns:p="http://schemas.openxmlformats.org/presentationml/2006/main">
+  <p:cSld>
+    <p:spTree>
+      <p:nvGrpSpPr>
+        <p:cNvPr id="1" name=""/>
+        <p:cNvGrpSpPr/>
+        <p:nvPr/>
+      </p:nvGrpSpPr>
+      <p:grpSpPr>
+        <a:xfrm>
+          <a:off x="0" y="0"/>
+          <a:ext cx="0" cy="0"/>
+          <a:chOff x="0" y="0"/>
+          <a:chExt cx="0" cy="0"/>
+        </a:xfrm>
+      </p:grpSpPr>
+      <p:sp>
+        <p:nvSpPr>
+          <p:cNvPr id="2" name="Slide Image Placeholder 1"/>
+          <p:cNvSpPr>
+            <a:spLocks noGrp="1" noRot="1" noChangeAspect="1"/>
+          </p:cNvSpPr>
+          <p:nvPr>
+            <p:ph type="sldImg"/>
+          </p:nvPr>
+        </p:nvSpPr>
+        <p:spPr/>
+      </p:sp>
+      <p:sp>
+        <p:nvSpPr>
+          <p:cNvPr id="3" name="Notes Placeholder 2"/>
+          <p:cNvSpPr>
+            <a:spLocks noGrp="1"/>
+          </p:cNvSpPr>
+          <p:nvPr>
+            <p:ph type="body" idx="1"/>
+          </p:nvPr>
+        </p:nvSpPr>
+        <p:spPr/>
+        <p:txBody>
+          <a:bodyPr/>
+          <a:lstStyle/>
+          <a:p>
+            <a:endParaRPr lang="en-US" dirty="0"/>
+          </a:p>
+        </p:txBody>
+      </p:sp>
+      <p:sp>
+        <p:nvSpPr>
+          <p:cNvPr id="4" name="Slide Number Placeholder 3"/>
+          <p:cNvSpPr>
+            <a:spLocks noGrp="1"/>
+          </p:cNvSpPr>
+          <p:nvPr>
+            <p:ph type="sldNum" sz="quarter" idx="5"/>
+          </p:nvPr>
+        </p:nvSpPr>
+        <p:spPr/>
+        <p:txBody>
+          <a:bodyPr/>
+          <a:lstStyle/>
+          <a:p>
+            <a:fld id="{F83D907B-D254-4FC3-A643-46F528C5DA05}" type="slidenum">
+              <a:rPr lang="en-US" smtClean="0"/>
+              <a:t>7</a:t>
+            </a:fld>
+            <a:endParaRPr lang="en-US"/>
+          </a:p>
+        </p:txBody>
+      </p:sp>
+    </p:spTree>
+    <p:extLst>
+      <p:ext uri="{BB962C8B-B14F-4D97-AF65-F5344CB8AC3E}">
+        <p14:creationId xmlns:p14="http://schemas.microsoft.com/office/powerpoint/2010/main" val="1987544502"/>
       </p:ext>
     </p:extLst>
   </p:cSld>
@@ -3788,10 +3876,16 @@
           <a:lstStyle/>
           <a:p>
             <a:r>
-              <a:rPr lang="en-US" altLang="zh-CN" dirty="0"/>
+              <a:rPr lang="en-US" altLang="zh-CN" dirty="0">
+                <a:latin typeface="微软雅黑" panose="020B0503020204020204" pitchFamily="34" charset="-122"/>
+                <a:ea typeface="微软雅黑" panose="020B0503020204020204" pitchFamily="34" charset="-122"/>
+              </a:rPr>
               <a:t>Stock Analysis System</a:t>
             </a:r>
-            <a:endParaRPr lang="en-US" dirty="0"/>
+            <a:endParaRPr lang="en-US" dirty="0">
+              <a:latin typeface="微软雅黑" panose="020B0503020204020204" pitchFamily="34" charset="-122"/>
+              <a:ea typeface="微软雅黑" panose="020B0503020204020204" pitchFamily="34" charset="-122"/>
+            </a:endParaRPr>
           </a:p>
         </p:txBody>
       </p:sp>
@@ -3819,23 +3913,38 @@
           <a:lstStyle/>
           <a:p>
             <a:r>
-              <a:rPr lang="zh-CN" altLang="en-US" dirty="0"/>
+              <a:rPr lang="zh-CN" altLang="en-US" dirty="0">
+                <a:latin typeface="微软雅黑" panose="020B0503020204020204" pitchFamily="34" charset="-122"/>
+                <a:ea typeface="微软雅黑" panose="020B0503020204020204" pitchFamily="34" charset="-122"/>
+              </a:rPr>
               <a:t>如何接入数据</a:t>
             </a:r>
-            <a:endParaRPr lang="en-US" altLang="zh-CN" dirty="0"/>
-          </a:p>
-          <a:p>
-            <a:endParaRPr lang="en-US" dirty="0"/>
-          </a:p>
-          <a:p>
-            <a:r>
-              <a:rPr lang="en-US" dirty="0"/>
+            <a:endParaRPr lang="en-US" altLang="zh-CN" dirty="0">
+              <a:latin typeface="微软雅黑" panose="020B0503020204020204" pitchFamily="34" charset="-122"/>
+              <a:ea typeface="微软雅黑" panose="020B0503020204020204" pitchFamily="34" charset="-122"/>
+            </a:endParaRPr>
+          </a:p>
+          <a:p>
+            <a:endParaRPr lang="en-US" dirty="0">
+              <a:latin typeface="微软雅黑" panose="020B0503020204020204" pitchFamily="34" charset="-122"/>
+              <a:ea typeface="微软雅黑" panose="020B0503020204020204" pitchFamily="34" charset="-122"/>
+            </a:endParaRPr>
+          </a:p>
+          <a:p>
+            <a:r>
+              <a:rPr lang="en-US" dirty="0">
+                <a:latin typeface="微软雅黑" panose="020B0503020204020204" pitchFamily="34" charset="-122"/>
+                <a:ea typeface="微软雅黑" panose="020B0503020204020204" pitchFamily="34" charset="-122"/>
+              </a:rPr>
               <a:t>Sleepy</a:t>
             </a:r>
           </a:p>
           <a:p>
             <a:r>
-              <a:rPr lang="en-US" dirty="0"/>
+              <a:rPr lang="en-US" dirty="0">
+                <a:latin typeface="微软雅黑" panose="020B0503020204020204" pitchFamily="34" charset="-122"/>
+                <a:ea typeface="微软雅黑" panose="020B0503020204020204" pitchFamily="34" charset="-122"/>
+              </a:rPr>
               <a:t>20210302</a:t>
             </a:r>
           </a:p>
@@ -3971,14 +4080,23 @@
           <a:lstStyle/>
           <a:p>
             <a:r>
-              <a:rPr lang="en-US" sz="3600" dirty="0"/>
+              <a:rPr lang="en-US" sz="3600" dirty="0">
+                <a:latin typeface="微软雅黑" panose="020B0503020204020204" pitchFamily="34" charset="-122"/>
+                <a:ea typeface="微软雅黑" panose="020B0503020204020204" pitchFamily="34" charset="-122"/>
+              </a:rPr>
               <a:t>O</a:t>
             </a:r>
             <a:r>
-              <a:rPr lang="en-US" altLang="zh-CN" sz="3600" dirty="0"/>
+              <a:rPr lang="en-US" altLang="zh-CN" sz="3600" dirty="0">
+                <a:latin typeface="微软雅黑" panose="020B0503020204020204" pitchFamily="34" charset="-122"/>
+                <a:ea typeface="微软雅黑" panose="020B0503020204020204" pitchFamily="34" charset="-122"/>
+              </a:rPr>
               <a:t>verview</a:t>
             </a:r>
-            <a:endParaRPr lang="en-US" sz="3600" dirty="0"/>
+            <a:endParaRPr lang="en-US" sz="3600" dirty="0">
+              <a:latin typeface="微软雅黑" panose="020B0503020204020204" pitchFamily="34" charset="-122"/>
+              <a:ea typeface="微软雅黑" panose="020B0503020204020204" pitchFamily="34" charset="-122"/>
+            </a:endParaRPr>
           </a:p>
         </p:txBody>
       </p:sp>
@@ -4000,115 +4118,166 @@
         </p:nvSpPr>
         <p:spPr>
           <a:xfrm>
-            <a:off x="466928" y="1782981"/>
-            <a:ext cx="4484451" cy="4531872"/>
+            <a:off x="466928" y="1560049"/>
+            <a:ext cx="4484451" cy="4831324"/>
           </a:xfrm>
         </p:spPr>
         <p:txBody>
           <a:bodyPr>
-            <a:normAutofit lnSpcReduction="10000"/>
+            <a:normAutofit/>
           </a:bodyPr>
           <a:lstStyle/>
           <a:p>
             <a:r>
-              <a:rPr lang="zh-CN" altLang="en-US" sz="2000" dirty="0"/>
-              <a:t>数据接入主要就是系统框图中圈出来的这一部分</a:t>
-            </a:r>
-            <a:endParaRPr lang="en-US" altLang="zh-CN" sz="2000" dirty="0"/>
-          </a:p>
-          <a:p>
-            <a:r>
-              <a:rPr lang="zh-CN" altLang="en-US" sz="2000" dirty="0"/>
-              <a:t>为了可扩展性，数据收集器通过插件形式接入系统</a:t>
-            </a:r>
-            <a:endParaRPr lang="en-US" altLang="zh-CN" sz="2000" dirty="0"/>
-          </a:p>
-          <a:p>
-            <a:r>
-              <a:rPr lang="zh-CN" altLang="en-US" sz="2000" dirty="0"/>
+              <a:rPr lang="zh-CN" altLang="en-US" sz="2000" dirty="0">
+                <a:latin typeface="微软雅黑" panose="020B0503020204020204" pitchFamily="34" charset="-122"/>
+                <a:ea typeface="微软雅黑" panose="020B0503020204020204" pitchFamily="34" charset="-122"/>
+              </a:rPr>
+              <a:t>数据接入相关的模块主要是系统框图中圈出来的这一部分</a:t>
+            </a:r>
+            <a:endParaRPr lang="en-US" altLang="zh-CN" sz="2000" dirty="0">
+              <a:latin typeface="微软雅黑" panose="020B0503020204020204" pitchFamily="34" charset="-122"/>
+              <a:ea typeface="微软雅黑" panose="020B0503020204020204" pitchFamily="34" charset="-122"/>
+            </a:endParaRPr>
+          </a:p>
+          <a:p>
+            <a:r>
+              <a:rPr lang="zh-CN" altLang="en-US" sz="2000" dirty="0">
+                <a:latin typeface="微软雅黑" panose="020B0503020204020204" pitchFamily="34" charset="-122"/>
+                <a:ea typeface="微软雅黑" panose="020B0503020204020204" pitchFamily="34" charset="-122"/>
+              </a:rPr>
+              <a:t>一项数据以一个自定义的</a:t>
+            </a:r>
+            <a:r>
+              <a:rPr lang="en-US" altLang="zh-CN" sz="2000" dirty="0" err="1">
+                <a:latin typeface="微软雅黑" panose="020B0503020204020204" pitchFamily="34" charset="-122"/>
+                <a:ea typeface="微软雅黑" panose="020B0503020204020204" pitchFamily="34" charset="-122"/>
+              </a:rPr>
+              <a:t>uri</a:t>
+            </a:r>
+            <a:r>
+              <a:rPr lang="zh-CN" altLang="en-US" sz="2000" dirty="0">
+                <a:latin typeface="微软雅黑" panose="020B0503020204020204" pitchFamily="34" charset="-122"/>
+                <a:ea typeface="微软雅黑" panose="020B0503020204020204" pitchFamily="34" charset="-122"/>
+              </a:rPr>
+              <a:t>作为标识，通过</a:t>
+            </a:r>
+            <a:r>
+              <a:rPr lang="en-US" altLang="zh-CN" sz="2000" dirty="0" err="1">
+                <a:latin typeface="微软雅黑" panose="020B0503020204020204" pitchFamily="34" charset="-122"/>
+                <a:ea typeface="微软雅黑" panose="020B0503020204020204" pitchFamily="34" charset="-122"/>
+              </a:rPr>
+              <a:t>DataAgent</a:t>
+            </a:r>
+            <a:r>
+              <a:rPr lang="zh-CN" altLang="en-US" sz="2000" dirty="0">
+                <a:latin typeface="微软雅黑" panose="020B0503020204020204" pitchFamily="34" charset="-122"/>
+                <a:ea typeface="微软雅黑" panose="020B0503020204020204" pitchFamily="34" charset="-122"/>
+              </a:rPr>
+              <a:t>定义关键属性，这使得数据能被系统统一处理</a:t>
+            </a:r>
+            <a:endParaRPr lang="en-US" altLang="zh-CN" sz="2000" dirty="0">
+              <a:latin typeface="微软雅黑" panose="020B0503020204020204" pitchFamily="34" charset="-122"/>
+              <a:ea typeface="微软雅黑" panose="020B0503020204020204" pitchFamily="34" charset="-122"/>
+            </a:endParaRPr>
+          </a:p>
+          <a:p>
+            <a:r>
+              <a:rPr lang="zh-CN" altLang="en-US" sz="2000" dirty="0">
+                <a:latin typeface="微软雅黑" panose="020B0503020204020204" pitchFamily="34" charset="-122"/>
+                <a:ea typeface="微软雅黑" panose="020B0503020204020204" pitchFamily="34" charset="-122"/>
+              </a:rPr>
+              <a:t>为了可扩展性，数据采集器通过插件形式接入，一个数据采集器可以为多个</a:t>
+            </a:r>
+            <a:r>
+              <a:rPr lang="en-US" altLang="zh-CN" sz="2000" dirty="0" err="1">
+                <a:latin typeface="微软雅黑" panose="020B0503020204020204" pitchFamily="34" charset="-122"/>
+                <a:ea typeface="微软雅黑" panose="020B0503020204020204" pitchFamily="34" charset="-122"/>
+              </a:rPr>
+              <a:t>uri</a:t>
+            </a:r>
+            <a:r>
+              <a:rPr lang="zh-CN" altLang="en-US" sz="2000" dirty="0">
+                <a:latin typeface="微软雅黑" panose="020B0503020204020204" pitchFamily="34" charset="-122"/>
+                <a:ea typeface="微软雅黑" panose="020B0503020204020204" pitchFamily="34" charset="-122"/>
+              </a:rPr>
+              <a:t>采集数据</a:t>
+            </a:r>
+            <a:endParaRPr lang="en-US" altLang="zh-CN" sz="2000" dirty="0">
+              <a:latin typeface="微软雅黑" panose="020B0503020204020204" pitchFamily="34" charset="-122"/>
+              <a:ea typeface="微软雅黑" panose="020B0503020204020204" pitchFamily="34" charset="-122"/>
+            </a:endParaRPr>
+          </a:p>
+          <a:p>
+            <a:r>
+              <a:rPr lang="zh-CN" altLang="en-US" sz="2000" dirty="0">
+                <a:latin typeface="微软雅黑" panose="020B0503020204020204" pitchFamily="34" charset="-122"/>
+                <a:ea typeface="微软雅黑" panose="020B0503020204020204" pitchFamily="34" charset="-122"/>
+              </a:rPr>
               <a:t>由于使用了</a:t>
             </a:r>
             <a:r>
-              <a:rPr lang="en-US" altLang="zh-CN" sz="2000" dirty="0" err="1"/>
+              <a:rPr lang="en-US" altLang="zh-CN" sz="2000" dirty="0" err="1">
+                <a:latin typeface="微软雅黑" panose="020B0503020204020204" pitchFamily="34" charset="-122"/>
+                <a:ea typeface="微软雅黑" panose="020B0503020204020204" pitchFamily="34" charset="-122"/>
+              </a:rPr>
               <a:t>NoSql</a:t>
             </a:r>
             <a:r>
-              <a:rPr lang="zh-CN" altLang="en-US" sz="2000" dirty="0"/>
+              <a:rPr lang="zh-CN" altLang="en-US" sz="2000" dirty="0">
+                <a:latin typeface="微软雅黑" panose="020B0503020204020204" pitchFamily="34" charset="-122"/>
+                <a:ea typeface="微软雅黑" panose="020B0503020204020204" pitchFamily="34" charset="-122"/>
+              </a:rPr>
               <a:t>数据库，所以不需要定义所有字段。另外可以在插件中为字段指定可读名称。</a:t>
             </a:r>
-            <a:endParaRPr lang="en-US" altLang="zh-CN" sz="2000" dirty="0"/>
-          </a:p>
-          <a:p>
-            <a:r>
-              <a:rPr lang="zh-CN" altLang="en-US" sz="2000" dirty="0"/>
-              <a:t>通过</a:t>
-            </a:r>
-            <a:r>
-              <a:rPr lang="en-US" altLang="zh-CN" sz="2000" dirty="0" err="1"/>
-              <a:t>DataAgent</a:t>
-            </a:r>
-            <a:r>
-              <a:rPr lang="zh-CN" altLang="en-US" sz="2000" dirty="0"/>
-              <a:t>定义数据</a:t>
-            </a:r>
-            <a:r>
-              <a:rPr lang="en-US" altLang="zh-CN" sz="2000" dirty="0" err="1"/>
-              <a:t>uri</a:t>
-            </a:r>
-            <a:r>
-              <a:rPr lang="zh-CN" altLang="en-US" sz="2000" dirty="0"/>
-              <a:t>以及其关键属性，使得数据能被系统统一处理</a:t>
-            </a:r>
-            <a:endParaRPr lang="en-US" altLang="zh-CN" sz="2000" dirty="0"/>
-          </a:p>
-          <a:p>
-            <a:r>
-              <a:rPr lang="zh-CN" altLang="en-US" sz="2000" dirty="0"/>
+            <a:endParaRPr lang="en-US" altLang="zh-CN" sz="2000" dirty="0">
+              <a:latin typeface="微软雅黑" panose="020B0503020204020204" pitchFamily="34" charset="-122"/>
+              <a:ea typeface="微软雅黑" panose="020B0503020204020204" pitchFamily="34" charset="-122"/>
+            </a:endParaRPr>
+          </a:p>
+          <a:p>
+            <a:r>
+              <a:rPr lang="zh-CN" altLang="en-US" sz="2000" dirty="0">
+                <a:latin typeface="微软雅黑" panose="020B0503020204020204" pitchFamily="34" charset="-122"/>
+                <a:ea typeface="微软雅黑" panose="020B0503020204020204" pitchFamily="34" charset="-122"/>
+              </a:rPr>
               <a:t>理论上只要支持</a:t>
             </a:r>
             <a:r>
-              <a:rPr lang="en-US" altLang="zh-CN" sz="2000" dirty="0" err="1"/>
+              <a:rPr lang="en-US" altLang="zh-CN" sz="2000" dirty="0" err="1">
+                <a:latin typeface="微软雅黑" panose="020B0503020204020204" pitchFamily="34" charset="-122"/>
+                <a:ea typeface="微软雅黑" panose="020B0503020204020204" pitchFamily="34" charset="-122"/>
+              </a:rPr>
               <a:t>DepotInterface</a:t>
             </a:r>
             <a:r>
-              <a:rPr lang="zh-CN" altLang="en-US" sz="2000" dirty="0"/>
+              <a:rPr lang="zh-CN" altLang="en-US" sz="2000" dirty="0">
+                <a:latin typeface="微软雅黑" panose="020B0503020204020204" pitchFamily="34" charset="-122"/>
+                <a:ea typeface="微软雅黑" panose="020B0503020204020204" pitchFamily="34" charset="-122"/>
+              </a:rPr>
               <a:t>，数据可以以任意形态存储。而实际上此接口根据</a:t>
             </a:r>
             <a:r>
-              <a:rPr lang="en-US" altLang="zh-CN" sz="2000" dirty="0" err="1"/>
+              <a:rPr lang="en-US" altLang="zh-CN" sz="2000" dirty="0" err="1">
+                <a:latin typeface="微软雅黑" panose="020B0503020204020204" pitchFamily="34" charset="-122"/>
+                <a:ea typeface="微软雅黑" panose="020B0503020204020204" pitchFamily="34" charset="-122"/>
+              </a:rPr>
               <a:t>NoSql</a:t>
             </a:r>
             <a:r>
-              <a:rPr lang="zh-CN" altLang="en-US" sz="2000" dirty="0"/>
+              <a:rPr lang="zh-CN" altLang="en-US" sz="2000" dirty="0">
+                <a:latin typeface="微软雅黑" panose="020B0503020204020204" pitchFamily="34" charset="-122"/>
+                <a:ea typeface="微软雅黑" panose="020B0503020204020204" pitchFamily="34" charset="-122"/>
+              </a:rPr>
               <a:t>的理念设计，一般使用</a:t>
             </a:r>
             <a:r>
-              <a:rPr lang="en-US" altLang="zh-CN" sz="2000" dirty="0"/>
+              <a:rPr lang="en-US" altLang="zh-CN" sz="2000" dirty="0">
+                <a:latin typeface="微软雅黑" panose="020B0503020204020204" pitchFamily="34" charset="-122"/>
+                <a:ea typeface="微软雅黑" panose="020B0503020204020204" pitchFamily="34" charset="-122"/>
+              </a:rPr>
               <a:t>MongoDB</a:t>
             </a:r>
-          </a:p>
-          <a:p>
-            <a:r>
-              <a:rPr lang="zh-CN" altLang="en-US" sz="2000" dirty="0"/>
-              <a:t>只需要定义</a:t>
-            </a:r>
-            <a:r>
-              <a:rPr lang="en-US" altLang="zh-CN" sz="2000" dirty="0" err="1"/>
-              <a:t>DataAgent</a:t>
-            </a:r>
-            <a:r>
-              <a:rPr lang="zh-CN" altLang="en-US" sz="2000" dirty="0"/>
-              <a:t>并编写</a:t>
-            </a:r>
-            <a:r>
-              <a:rPr lang="en-US" altLang="zh-CN" sz="2000" dirty="0"/>
-              <a:t>Collector</a:t>
-            </a:r>
-            <a:r>
-              <a:rPr lang="zh-CN" altLang="en-US" sz="2000" dirty="0"/>
-              <a:t>插件，即可以将数据接入系统</a:t>
-            </a:r>
-            <a:endParaRPr lang="en-US" sz="2000" dirty="0"/>
           </a:p>
         </p:txBody>
       </p:sp>
@@ -4294,8 +4463,8 @@
         </p:blipFill>
         <p:spPr>
           <a:xfrm>
-            <a:off x="5024777" y="1560049"/>
-            <a:ext cx="6839874" cy="4616914"/>
+            <a:off x="4951379" y="1560049"/>
+            <a:ext cx="7044156" cy="4754804"/>
           </a:xfrm>
           <a:prstGeom prst="rect">
             <a:avLst/>
@@ -4592,14 +4761,23 @@
           <a:lstStyle/>
           <a:p>
             <a:r>
-              <a:rPr lang="en-US" sz="3600" dirty="0"/>
+              <a:rPr lang="en-US" sz="3600" dirty="0">
+                <a:latin typeface="微软雅黑" panose="020B0503020204020204" pitchFamily="34" charset="-122"/>
+                <a:ea typeface="微软雅黑" panose="020B0503020204020204" pitchFamily="34" charset="-122"/>
+              </a:rPr>
               <a:t>How to declare </a:t>
             </a:r>
             <a:r>
-              <a:rPr lang="en-US" sz="3600" dirty="0" err="1"/>
+              <a:rPr lang="en-US" sz="3600" dirty="0" err="1">
+                <a:latin typeface="微软雅黑" panose="020B0503020204020204" pitchFamily="34" charset="-122"/>
+                <a:ea typeface="微软雅黑" panose="020B0503020204020204" pitchFamily="34" charset="-122"/>
+              </a:rPr>
               <a:t>DataAgent</a:t>
             </a:r>
-            <a:endParaRPr lang="en-US" sz="3600" dirty="0"/>
+            <a:endParaRPr lang="en-US" sz="3600" dirty="0">
+              <a:latin typeface="微软雅黑" panose="020B0503020204020204" pitchFamily="34" charset="-122"/>
+              <a:ea typeface="微软雅黑" panose="020B0503020204020204" pitchFamily="34" charset="-122"/>
+            </a:endParaRPr>
           </a:p>
         </p:txBody>
       </p:sp>
@@ -4621,8 +4799,8 @@
         </p:nvSpPr>
         <p:spPr>
           <a:xfrm>
-            <a:off x="643469" y="1457471"/>
-            <a:ext cx="5163944" cy="4982240"/>
+            <a:off x="480768" y="1457471"/>
+            <a:ext cx="6044821" cy="4857382"/>
           </a:xfrm>
         </p:spPr>
         <p:txBody>
@@ -4631,206 +4809,374 @@
           </a:bodyPr>
           <a:lstStyle/>
           <a:p>
-            <a:r>
-              <a:rPr lang="en-US" sz="1600" dirty="0"/>
+            <a:pPr>
+              <a:lnSpc>
+                <a:spcPct val="100000"/>
+              </a:lnSpc>
+            </a:pPr>
+            <a:r>
+              <a:rPr lang="en-US" sz="1800" dirty="0">
+                <a:latin typeface="微软雅黑" panose="020B0503020204020204" pitchFamily="34" charset="-122"/>
+                <a:ea typeface="微软雅黑" panose="020B0503020204020204" pitchFamily="34" charset="-122"/>
+              </a:rPr>
               <a:t>StockAnalysisSystem/core/DataHub/DataAgent.py</a:t>
             </a:r>
           </a:p>
           <a:p>
             <a:pPr lvl="1">
+              <a:lnSpc>
+                <a:spcPct val="100000"/>
+              </a:lnSpc>
               <a:buFont typeface="Wingdings" panose="05000000000000000000" pitchFamily="2" charset="2"/>
               <a:buChar char="Ø"/>
             </a:pPr>
             <a:r>
-              <a:rPr lang="en-US" sz="1600" dirty="0" err="1"/>
+              <a:rPr lang="en-US" sz="1500" dirty="0" err="1">
+                <a:latin typeface="微软雅黑" panose="020B0503020204020204" pitchFamily="34" charset="-122"/>
+                <a:ea typeface="微软雅黑" panose="020B0503020204020204" pitchFamily="34" charset="-122"/>
+              </a:rPr>
               <a:t>DataAgent</a:t>
             </a:r>
             <a:r>
-              <a:rPr lang="zh-CN" altLang="en-US" sz="1600" dirty="0"/>
+              <a:rPr lang="zh-CN" altLang="en-US" sz="1500" dirty="0">
+                <a:latin typeface="微软雅黑" panose="020B0503020204020204" pitchFamily="34" charset="-122"/>
+                <a:ea typeface="微软雅黑" panose="020B0503020204020204" pitchFamily="34" charset="-122"/>
+              </a:rPr>
               <a:t>的接口及实现</a:t>
             </a:r>
-            <a:endParaRPr lang="en-US" sz="1600" dirty="0"/>
-          </a:p>
-          <a:p>
-            <a:r>
-              <a:rPr lang="en-US" sz="1600" dirty="0"/>
+            <a:endParaRPr lang="en-US" sz="1500" dirty="0">
+              <a:latin typeface="微软雅黑" panose="020B0503020204020204" pitchFamily="34" charset="-122"/>
+              <a:ea typeface="微软雅黑" panose="020B0503020204020204" pitchFamily="34" charset="-122"/>
+            </a:endParaRPr>
+          </a:p>
+          <a:p>
+            <a:pPr>
+              <a:lnSpc>
+                <a:spcPct val="100000"/>
+              </a:lnSpc>
+            </a:pPr>
+            <a:r>
+              <a:rPr lang="en-US" sz="1800" dirty="0">
+                <a:latin typeface="微软雅黑" panose="020B0503020204020204" pitchFamily="34" charset="-122"/>
+                <a:ea typeface="微软雅黑" panose="020B0503020204020204" pitchFamily="34" charset="-122"/>
+              </a:rPr>
               <a:t>StockAnalysisSystem/core/DataHub/DataAgentBuilder.py</a:t>
             </a:r>
           </a:p>
           <a:p>
             <a:pPr lvl="1">
+              <a:lnSpc>
+                <a:spcPct val="100000"/>
+              </a:lnSpc>
               <a:buFont typeface="Wingdings" panose="05000000000000000000" pitchFamily="2" charset="2"/>
               <a:buChar char="Ø"/>
             </a:pPr>
             <a:r>
-              <a:rPr lang="en-US" sz="1600" dirty="0" err="1"/>
+              <a:rPr lang="en-US" sz="1500" dirty="0" err="1">
+                <a:latin typeface="微软雅黑" panose="020B0503020204020204" pitchFamily="34" charset="-122"/>
+                <a:ea typeface="微软雅黑" panose="020B0503020204020204" pitchFamily="34" charset="-122"/>
+              </a:rPr>
               <a:t>DataAgent</a:t>
             </a:r>
             <a:r>
-              <a:rPr lang="zh-CN" altLang="en-US" sz="1600" dirty="0"/>
+              <a:rPr lang="zh-CN" altLang="en-US" sz="1500" dirty="0">
+                <a:latin typeface="微软雅黑" panose="020B0503020204020204" pitchFamily="34" charset="-122"/>
+                <a:ea typeface="微软雅黑" panose="020B0503020204020204" pitchFamily="34" charset="-122"/>
+              </a:rPr>
               <a:t>实例的定义以及创建</a:t>
             </a:r>
-            <a:endParaRPr lang="en-US" sz="1600" dirty="0"/>
-          </a:p>
-          <a:p>
-            <a:r>
-              <a:rPr lang="zh-CN" altLang="en-US" sz="1600" dirty="0"/>
+            <a:endParaRPr lang="en-US" sz="1500" dirty="0">
+              <a:latin typeface="微软雅黑" panose="020B0503020204020204" pitchFamily="34" charset="-122"/>
+              <a:ea typeface="微软雅黑" panose="020B0503020204020204" pitchFamily="34" charset="-122"/>
+            </a:endParaRPr>
+          </a:p>
+          <a:p>
+            <a:pPr>
+              <a:lnSpc>
+                <a:spcPct val="100000"/>
+              </a:lnSpc>
+            </a:pPr>
+            <a:r>
+              <a:rPr lang="zh-CN" altLang="en-US" sz="1800" dirty="0">
+                <a:latin typeface="微软雅黑" panose="020B0503020204020204" pitchFamily="34" charset="-122"/>
+                <a:ea typeface="微软雅黑" panose="020B0503020204020204" pitchFamily="34" charset="-122"/>
+              </a:rPr>
               <a:t>定义及创建</a:t>
             </a:r>
             <a:r>
-              <a:rPr lang="en-US" altLang="zh-CN" sz="1600" dirty="0" err="1"/>
+              <a:rPr lang="en-US" altLang="zh-CN" sz="1800" dirty="0" err="1">
+                <a:latin typeface="微软雅黑" panose="020B0503020204020204" pitchFamily="34" charset="-122"/>
+                <a:ea typeface="微软雅黑" panose="020B0503020204020204" pitchFamily="34" charset="-122"/>
+              </a:rPr>
               <a:t>DataAgent</a:t>
             </a:r>
             <a:r>
-              <a:rPr lang="zh-CN" altLang="en-US" sz="1600" dirty="0"/>
+              <a:rPr lang="zh-CN" altLang="en-US" sz="1800" dirty="0">
+                <a:latin typeface="微软雅黑" panose="020B0503020204020204" pitchFamily="34" charset="-122"/>
+                <a:ea typeface="微软雅黑" panose="020B0503020204020204" pitchFamily="34" charset="-122"/>
+              </a:rPr>
               <a:t>时需要指明以下参数：</a:t>
             </a:r>
-            <a:endParaRPr lang="en-US" altLang="zh-CN" sz="1600" dirty="0"/>
+            <a:endParaRPr lang="en-US" altLang="zh-CN" sz="1800" dirty="0">
+              <a:latin typeface="微软雅黑" panose="020B0503020204020204" pitchFamily="34" charset="-122"/>
+              <a:ea typeface="微软雅黑" panose="020B0503020204020204" pitchFamily="34" charset="-122"/>
+            </a:endParaRPr>
           </a:p>
           <a:p>
             <a:pPr lvl="1">
+              <a:lnSpc>
+                <a:spcPct val="100000"/>
+              </a:lnSpc>
               <a:buFont typeface="Wingdings" panose="05000000000000000000" pitchFamily="2" charset="2"/>
               <a:buChar char="Ø"/>
             </a:pPr>
             <a:r>
-              <a:rPr lang="en-US" sz="1600" dirty="0" err="1"/>
+              <a:rPr lang="en-US" sz="1500" dirty="0" err="1">
+                <a:latin typeface="微软雅黑" panose="020B0503020204020204" pitchFamily="34" charset="-122"/>
+                <a:ea typeface="微软雅黑" panose="020B0503020204020204" pitchFamily="34" charset="-122"/>
+              </a:rPr>
               <a:t>uri</a:t>
             </a:r>
             <a:r>
-              <a:rPr lang="zh-CN" altLang="en-US" sz="1600" dirty="0"/>
+              <a:rPr lang="zh-CN" altLang="en-US" sz="1500" dirty="0">
+                <a:latin typeface="微软雅黑" panose="020B0503020204020204" pitchFamily="34" charset="-122"/>
+                <a:ea typeface="微软雅黑" panose="020B0503020204020204" pitchFamily="34" charset="-122"/>
+              </a:rPr>
               <a:t> </a:t>
             </a:r>
             <a:r>
-              <a:rPr lang="en-US" altLang="zh-CN" sz="1600" dirty="0"/>
+              <a:rPr lang="en-US" altLang="zh-CN" sz="1500" dirty="0">
+                <a:latin typeface="微软雅黑" panose="020B0503020204020204" pitchFamily="34" charset="-122"/>
+                <a:ea typeface="微软雅黑" panose="020B0503020204020204" pitchFamily="34" charset="-122"/>
+              </a:rPr>
               <a:t>– </a:t>
             </a:r>
             <a:r>
-              <a:rPr lang="zh-CN" altLang="en-US" sz="1600" dirty="0"/>
-              <a:t>用以标识这个数据</a:t>
-            </a:r>
-            <a:endParaRPr lang="en-US" altLang="zh-CN" sz="1600" dirty="0"/>
+              <a:rPr lang="zh-CN" altLang="en-US" sz="1500" dirty="0">
+                <a:latin typeface="微软雅黑" panose="020B0503020204020204" pitchFamily="34" charset="-122"/>
+                <a:ea typeface="微软雅黑" panose="020B0503020204020204" pitchFamily="34" charset="-122"/>
+              </a:rPr>
+              <a:t>用以标识这个数据，自定义，和数据源无关</a:t>
+            </a:r>
+            <a:endParaRPr lang="en-US" altLang="zh-CN" sz="1500" dirty="0">
+              <a:latin typeface="微软雅黑" panose="020B0503020204020204" pitchFamily="34" charset="-122"/>
+              <a:ea typeface="微软雅黑" panose="020B0503020204020204" pitchFamily="34" charset="-122"/>
+            </a:endParaRPr>
           </a:p>
           <a:p>
             <a:pPr lvl="1">
+              <a:lnSpc>
+                <a:spcPct val="100000"/>
+              </a:lnSpc>
               <a:buFont typeface="Wingdings" panose="05000000000000000000" pitchFamily="2" charset="2"/>
               <a:buChar char="Ø"/>
             </a:pPr>
             <a:r>
-              <a:rPr lang="en-US" sz="1600" dirty="0"/>
+              <a:rPr lang="en-US" sz="1500" dirty="0">
+                <a:latin typeface="微软雅黑" panose="020B0503020204020204" pitchFamily="34" charset="-122"/>
+                <a:ea typeface="微软雅黑" panose="020B0503020204020204" pitchFamily="34" charset="-122"/>
+              </a:rPr>
               <a:t>depot – </a:t>
             </a:r>
             <a:r>
-              <a:rPr lang="zh-CN" altLang="en-US" sz="1600" dirty="0"/>
+              <a:rPr lang="zh-CN" altLang="en-US" sz="1500" dirty="0">
+                <a:latin typeface="微软雅黑" panose="020B0503020204020204" pitchFamily="34" charset="-122"/>
+                <a:ea typeface="微软雅黑" panose="020B0503020204020204" pitchFamily="34" charset="-122"/>
+              </a:rPr>
               <a:t>数据存储使用的仓库类型，通常使用</a:t>
             </a:r>
             <a:r>
-              <a:rPr lang="en-US" altLang="zh-CN" sz="1600" dirty="0" err="1"/>
+              <a:rPr lang="en-US" altLang="zh-CN" sz="1500" dirty="0" err="1">
+                <a:latin typeface="微软雅黑" panose="020B0503020204020204" pitchFamily="34" charset="-122"/>
+                <a:ea typeface="微软雅黑" panose="020B0503020204020204" pitchFamily="34" charset="-122"/>
+              </a:rPr>
               <a:t>DepotMongoDB</a:t>
             </a:r>
-            <a:endParaRPr lang="en-US" altLang="zh-CN" sz="1600" dirty="0"/>
+            <a:endParaRPr lang="en-US" altLang="zh-CN" sz="1500" dirty="0">
+              <a:latin typeface="微软雅黑" panose="020B0503020204020204" pitchFamily="34" charset="-122"/>
+              <a:ea typeface="微软雅黑" panose="020B0503020204020204" pitchFamily="34" charset="-122"/>
+            </a:endParaRPr>
           </a:p>
           <a:p>
             <a:pPr lvl="1">
+              <a:lnSpc>
+                <a:spcPct val="100000"/>
+              </a:lnSpc>
               <a:buFont typeface="Wingdings" panose="05000000000000000000" pitchFamily="2" charset="2"/>
               <a:buChar char="Ø"/>
             </a:pPr>
             <a:r>
-              <a:rPr lang="en-US" sz="1600" dirty="0" err="1"/>
+              <a:rPr lang="en-US" sz="1500" dirty="0" err="1">
+                <a:latin typeface="微软雅黑" panose="020B0503020204020204" pitchFamily="34" charset="-122"/>
+                <a:ea typeface="微软雅黑" panose="020B0503020204020204" pitchFamily="34" charset="-122"/>
+              </a:rPr>
               <a:t>identity_field</a:t>
             </a:r>
             <a:r>
-              <a:rPr lang="en-US" sz="1600" dirty="0"/>
+              <a:rPr lang="en-US" sz="1500" dirty="0">
+                <a:latin typeface="微软雅黑" panose="020B0503020204020204" pitchFamily="34" charset="-122"/>
+                <a:ea typeface="微软雅黑" panose="020B0503020204020204" pitchFamily="34" charset="-122"/>
+              </a:rPr>
               <a:t>, </a:t>
             </a:r>
             <a:r>
-              <a:rPr lang="en-US" sz="1600" dirty="0" err="1"/>
+              <a:rPr lang="en-US" sz="1500" dirty="0" err="1">
+                <a:latin typeface="微软雅黑" panose="020B0503020204020204" pitchFamily="34" charset="-122"/>
+                <a:ea typeface="微软雅黑" panose="020B0503020204020204" pitchFamily="34" charset="-122"/>
+              </a:rPr>
               <a:t>datetime_field</a:t>
             </a:r>
             <a:r>
-              <a:rPr lang="en-US" sz="1600" dirty="0"/>
+              <a:rPr lang="en-US" sz="1500" dirty="0">
+                <a:latin typeface="微软雅黑" panose="020B0503020204020204" pitchFamily="34" charset="-122"/>
+                <a:ea typeface="微软雅黑" panose="020B0503020204020204" pitchFamily="34" charset="-122"/>
+              </a:rPr>
               <a:t> </a:t>
             </a:r>
             <a:r>
-              <a:rPr lang="en-US" altLang="zh-CN" sz="1600" dirty="0"/>
+              <a:rPr lang="en-US" altLang="zh-CN" sz="1500" dirty="0">
+                <a:latin typeface="微软雅黑" panose="020B0503020204020204" pitchFamily="34" charset="-122"/>
+                <a:ea typeface="微软雅黑" panose="020B0503020204020204" pitchFamily="34" charset="-122"/>
+              </a:rPr>
               <a:t>– </a:t>
             </a:r>
             <a:r>
-              <a:rPr lang="zh-CN" altLang="en-US" sz="1600" dirty="0"/>
+              <a:rPr lang="zh-CN" altLang="en-US" sz="1500" dirty="0">
+                <a:latin typeface="微软雅黑" panose="020B0503020204020204" pitchFamily="34" charset="-122"/>
+                <a:ea typeface="微软雅黑" panose="020B0503020204020204" pitchFamily="34" charset="-122"/>
+              </a:rPr>
               <a:t>尽管不需要定义所有字段，但需要指明</a:t>
             </a:r>
             <a:r>
-              <a:rPr lang="en-US" altLang="zh-CN" sz="1600" dirty="0"/>
+              <a:rPr lang="en-US" altLang="zh-CN" sz="1500" dirty="0">
+                <a:latin typeface="微软雅黑" panose="020B0503020204020204" pitchFamily="34" charset="-122"/>
+                <a:ea typeface="微软雅黑" panose="020B0503020204020204" pitchFamily="34" charset="-122"/>
+              </a:rPr>
               <a:t>ID</a:t>
             </a:r>
             <a:r>
-              <a:rPr lang="zh-CN" altLang="en-US" sz="1600" dirty="0"/>
+              <a:rPr lang="zh-CN" altLang="en-US" sz="1500" dirty="0">
+                <a:latin typeface="微软雅黑" panose="020B0503020204020204" pitchFamily="34" charset="-122"/>
+                <a:ea typeface="微软雅黑" panose="020B0503020204020204" pitchFamily="34" charset="-122"/>
+              </a:rPr>
               <a:t>及时间字段，如果没有，则填写</a:t>
             </a:r>
             <a:r>
-              <a:rPr lang="en-US" altLang="zh-CN" sz="1600" dirty="0"/>
+              <a:rPr lang="en-US" altLang="zh-CN" sz="1500" dirty="0">
+                <a:latin typeface="微软雅黑" panose="020B0503020204020204" pitchFamily="34" charset="-122"/>
+                <a:ea typeface="微软雅黑" panose="020B0503020204020204" pitchFamily="34" charset="-122"/>
+              </a:rPr>
               <a:t>None</a:t>
             </a:r>
           </a:p>
           <a:p>
             <a:pPr lvl="1">
+              <a:lnSpc>
+                <a:spcPct val="100000"/>
+              </a:lnSpc>
               <a:buFont typeface="Wingdings" panose="05000000000000000000" pitchFamily="2" charset="2"/>
               <a:buChar char="Ø"/>
             </a:pPr>
             <a:r>
-              <a:rPr lang="en-US" sz="1600" dirty="0" err="1"/>
+              <a:rPr lang="en-US" sz="1500" dirty="0" err="1">
+                <a:latin typeface="微软雅黑" panose="020B0503020204020204" pitchFamily="34" charset="-122"/>
+                <a:ea typeface="微软雅黑" panose="020B0503020204020204" pitchFamily="34" charset="-122"/>
+              </a:rPr>
               <a:t>data_duration</a:t>
             </a:r>
             <a:r>
-              <a:rPr lang="en-US" sz="1600" dirty="0"/>
+              <a:rPr lang="en-US" sz="1500" dirty="0">
+                <a:latin typeface="微软雅黑" panose="020B0503020204020204" pitchFamily="34" charset="-122"/>
+                <a:ea typeface="微软雅黑" panose="020B0503020204020204" pitchFamily="34" charset="-122"/>
+              </a:rPr>
               <a:t> – </a:t>
             </a:r>
             <a:r>
-              <a:rPr lang="zh-CN" altLang="en-US" sz="1600" dirty="0"/>
+              <a:rPr lang="zh-CN" altLang="en-US" sz="1500" dirty="0">
+                <a:latin typeface="微软雅黑" panose="020B0503020204020204" pitchFamily="34" charset="-122"/>
+                <a:ea typeface="微软雅黑" panose="020B0503020204020204" pitchFamily="34" charset="-122"/>
+              </a:rPr>
               <a:t>数据周期，相同周期的数据能够合并，保留</a:t>
             </a:r>
-            <a:endParaRPr lang="en-US" altLang="zh-CN" sz="1600" dirty="0"/>
+            <a:endParaRPr lang="en-US" altLang="zh-CN" sz="1500" dirty="0">
+              <a:latin typeface="微软雅黑" panose="020B0503020204020204" pitchFamily="34" charset="-122"/>
+              <a:ea typeface="微软雅黑" panose="020B0503020204020204" pitchFamily="34" charset="-122"/>
+            </a:endParaRPr>
           </a:p>
           <a:p>
             <a:pPr lvl="1">
+              <a:lnSpc>
+                <a:spcPct val="100000"/>
+              </a:lnSpc>
               <a:buFont typeface="Wingdings" panose="05000000000000000000" pitchFamily="2" charset="2"/>
               <a:buChar char="Ø"/>
             </a:pPr>
             <a:r>
-              <a:rPr lang="en-US" sz="1600" dirty="0" err="1"/>
+              <a:rPr lang="en-US" sz="1500" dirty="0" err="1">
+                <a:latin typeface="微软雅黑" panose="020B0503020204020204" pitchFamily="34" charset="-122"/>
+                <a:ea typeface="微软雅黑" panose="020B0503020204020204" pitchFamily="34" charset="-122"/>
+              </a:rPr>
               <a:t>update_priority</a:t>
             </a:r>
             <a:r>
-              <a:rPr lang="en-US" sz="1600" dirty="0"/>
+              <a:rPr lang="en-US" sz="1500" dirty="0">
+                <a:latin typeface="微软雅黑" panose="020B0503020204020204" pitchFamily="34" charset="-122"/>
+                <a:ea typeface="微软雅黑" panose="020B0503020204020204" pitchFamily="34" charset="-122"/>
+              </a:rPr>
               <a:t> </a:t>
             </a:r>
             <a:r>
-              <a:rPr lang="en-US" altLang="zh-CN" sz="1600" dirty="0"/>
+              <a:rPr lang="en-US" altLang="zh-CN" sz="1500" dirty="0">
+                <a:latin typeface="微软雅黑" panose="020B0503020204020204" pitchFamily="34" charset="-122"/>
+                <a:ea typeface="微软雅黑" panose="020B0503020204020204" pitchFamily="34" charset="-122"/>
+              </a:rPr>
               <a:t>– </a:t>
             </a:r>
             <a:r>
-              <a:rPr lang="zh-CN" altLang="en-US" sz="1600" dirty="0"/>
+              <a:rPr lang="zh-CN" altLang="en-US" sz="1500" dirty="0">
+                <a:latin typeface="微软雅黑" panose="020B0503020204020204" pitchFamily="34" charset="-122"/>
+                <a:ea typeface="微软雅黑" panose="020B0503020204020204" pitchFamily="34" charset="-122"/>
+              </a:rPr>
               <a:t>优先级，优先级高的会优先更新，如股票列表和市场日历</a:t>
             </a:r>
-            <a:endParaRPr lang="en-US" altLang="zh-CN" sz="1600" dirty="0"/>
+            <a:endParaRPr lang="en-US" altLang="zh-CN" sz="1500" dirty="0">
+              <a:latin typeface="微软雅黑" panose="020B0503020204020204" pitchFamily="34" charset="-122"/>
+              <a:ea typeface="微软雅黑" panose="020B0503020204020204" pitchFamily="34" charset="-122"/>
+            </a:endParaRPr>
           </a:p>
           <a:p>
             <a:pPr lvl="1">
+              <a:lnSpc>
+                <a:spcPct val="100000"/>
+              </a:lnSpc>
               <a:buFont typeface="Wingdings" panose="05000000000000000000" pitchFamily="2" charset="2"/>
               <a:buChar char="Ø"/>
             </a:pPr>
             <a:r>
-              <a:rPr lang="en-US" sz="1600" dirty="0" err="1"/>
+              <a:rPr lang="en-US" sz="1500" dirty="0" err="1">
+                <a:latin typeface="微软雅黑" panose="020B0503020204020204" pitchFamily="34" charset="-122"/>
+                <a:ea typeface="微软雅黑" panose="020B0503020204020204" pitchFamily="34" charset="-122"/>
+              </a:rPr>
               <a:t>update_list</a:t>
             </a:r>
             <a:r>
-              <a:rPr lang="en-US" sz="1600" dirty="0"/>
+              <a:rPr lang="en-US" sz="1500" dirty="0">
+                <a:latin typeface="微软雅黑" panose="020B0503020204020204" pitchFamily="34" charset="-122"/>
+                <a:ea typeface="微软雅黑" panose="020B0503020204020204" pitchFamily="34" charset="-122"/>
+              </a:rPr>
               <a:t> – </a:t>
             </a:r>
             <a:r>
-              <a:rPr lang="zh-CN" altLang="en-US" sz="1600" dirty="0"/>
+              <a:rPr lang="zh-CN" altLang="en-US" sz="1500" dirty="0">
+                <a:latin typeface="微软雅黑" panose="020B0503020204020204" pitchFamily="34" charset="-122"/>
+                <a:ea typeface="微软雅黑" panose="020B0503020204020204" pitchFamily="34" charset="-122"/>
+              </a:rPr>
               <a:t>更新的子列表，其实是一个函数，返回这个数据需要更新的子项目</a:t>
             </a:r>
-            <a:endParaRPr lang="en-US" sz="1600" dirty="0"/>
+            <a:endParaRPr lang="en-US" sz="1500" dirty="0">
+              <a:latin typeface="微软雅黑" panose="020B0503020204020204" pitchFamily="34" charset="-122"/>
+              <a:ea typeface="微软雅黑" panose="020B0503020204020204" pitchFamily="34" charset="-122"/>
+            </a:endParaRPr>
           </a:p>
         </p:txBody>
       </p:sp>
@@ -5016,7 +5362,7 @@
         </p:blipFill>
         <p:spPr>
           <a:xfrm>
-            <a:off x="6609747" y="1779204"/>
+            <a:off x="6763166" y="1767645"/>
             <a:ext cx="4980136" cy="2116558"/>
           </a:xfrm>
           <a:prstGeom prst="rect">
@@ -5206,7 +5552,7 @@
         </p:blipFill>
         <p:spPr>
           <a:xfrm>
-            <a:off x="6647503" y="4056628"/>
+            <a:off x="6800922" y="4045069"/>
             <a:ext cx="4904628" cy="2084467"/>
           </a:xfrm>
           <a:prstGeom prst="rect">
@@ -5341,7 +5687,10 @@
           <a:lstStyle/>
           <a:p>
             <a:r>
-              <a:rPr lang="en-US" sz="5400"/>
+              <a:rPr lang="en-US" sz="5400" dirty="0">
+                <a:latin typeface="微软雅黑" panose="020B0503020204020204" pitchFamily="34" charset="-122"/>
+                <a:ea typeface="微软雅黑" panose="020B0503020204020204" pitchFamily="34" charset="-122"/>
+              </a:rPr>
               <a:t>How to write a Collector</a:t>
             </a:r>
           </a:p>
@@ -6028,62 +6377,98 @@
         <p:spPr>
           <a:xfrm>
             <a:off x="572492" y="1911493"/>
-            <a:ext cx="6869167" cy="4546999"/>
+            <a:ext cx="6869167" cy="4707968"/>
           </a:xfrm>
         </p:spPr>
         <p:txBody>
           <a:bodyPr anchor="t">
-            <a:normAutofit lnSpcReduction="10000"/>
+            <a:normAutofit fontScale="92500" lnSpcReduction="10000"/>
           </a:bodyPr>
           <a:lstStyle/>
           <a:p>
             <a:r>
-              <a:rPr lang="zh-CN" altLang="en-US" sz="1800" dirty="0"/>
+              <a:rPr lang="zh-CN" altLang="en-US" sz="1900" dirty="0">
+                <a:latin typeface="微软雅黑" panose="020B0503020204020204" pitchFamily="34" charset="-122"/>
+                <a:ea typeface="微软雅黑" panose="020B0503020204020204" pitchFamily="34" charset="-122"/>
+              </a:rPr>
               <a:t>插件位于</a:t>
             </a:r>
             <a:r>
-              <a:rPr lang="en-US" altLang="zh-CN" sz="1800" dirty="0"/>
+              <a:rPr lang="en-US" altLang="zh-CN" sz="1900" dirty="0">
+                <a:latin typeface="微软雅黑" panose="020B0503020204020204" pitchFamily="34" charset="-122"/>
+                <a:ea typeface="微软雅黑" panose="020B0503020204020204" pitchFamily="34" charset="-122"/>
+              </a:rPr>
               <a:t>project path</a:t>
             </a:r>
             <a:r>
-              <a:rPr lang="zh-CN" altLang="en-US" sz="1800" dirty="0"/>
+              <a:rPr lang="zh-CN" altLang="en-US" sz="1900" dirty="0">
+                <a:latin typeface="微软雅黑" panose="020B0503020204020204" pitchFamily="34" charset="-122"/>
+                <a:ea typeface="微软雅黑" panose="020B0503020204020204" pitchFamily="34" charset="-122"/>
+              </a:rPr>
               <a:t>（工程目录</a:t>
             </a:r>
             <a:r>
-              <a:rPr lang="en-US" altLang="zh-CN" sz="1800" dirty="0"/>
+              <a:rPr lang="en-US" altLang="zh-CN" sz="1900" dirty="0">
+                <a:latin typeface="微软雅黑" panose="020B0503020204020204" pitchFamily="34" charset="-122"/>
+                <a:ea typeface="微软雅黑" panose="020B0503020204020204" pitchFamily="34" charset="-122"/>
+              </a:rPr>
               <a:t>/</a:t>
             </a:r>
             <a:r>
-              <a:rPr lang="zh-CN" altLang="en-US" sz="1800" dirty="0"/>
+              <a:rPr lang="zh-CN" altLang="en-US" sz="1900" dirty="0">
+                <a:latin typeface="微软雅黑" panose="020B0503020204020204" pitchFamily="34" charset="-122"/>
+                <a:ea typeface="微软雅黑" panose="020B0503020204020204" pitchFamily="34" charset="-122"/>
+              </a:rPr>
               <a:t>工作目录，可配置，默认在内层的</a:t>
             </a:r>
             <a:r>
-              <a:rPr lang="en-US" sz="1800" dirty="0" err="1"/>
+              <a:rPr lang="en-US" sz="1900" dirty="0" err="1">
+                <a:latin typeface="微软雅黑" panose="020B0503020204020204" pitchFamily="34" charset="-122"/>
+                <a:ea typeface="微软雅黑" panose="020B0503020204020204" pitchFamily="34" charset="-122"/>
+              </a:rPr>
               <a:t>StockAnalysisSystem</a:t>
             </a:r>
             <a:r>
-              <a:rPr lang="zh-CN" altLang="en-US" sz="1800" dirty="0"/>
+              <a:rPr lang="zh-CN" altLang="en-US" sz="1900" dirty="0">
+                <a:latin typeface="微软雅黑" panose="020B0503020204020204" pitchFamily="34" charset="-122"/>
+                <a:ea typeface="微软雅黑" panose="020B0503020204020204" pitchFamily="34" charset="-122"/>
+              </a:rPr>
               <a:t>下）下的</a:t>
             </a:r>
             <a:r>
-              <a:rPr lang="en-US" altLang="zh-CN" sz="1800" dirty="0"/>
+              <a:rPr lang="en-US" altLang="zh-CN" sz="1900" dirty="0">
+                <a:latin typeface="微软雅黑" panose="020B0503020204020204" pitchFamily="34" charset="-122"/>
+                <a:ea typeface="微软雅黑" panose="020B0503020204020204" pitchFamily="34" charset="-122"/>
+              </a:rPr>
               <a:t>plugin/Collector</a:t>
             </a:r>
           </a:p>
           <a:p>
             <a:r>
-              <a:rPr lang="zh-CN" altLang="en-US" sz="1800" dirty="0"/>
+              <a:rPr lang="zh-CN" altLang="en-US" sz="1900" dirty="0">
+                <a:latin typeface="微软雅黑" panose="020B0503020204020204" pitchFamily="34" charset="-122"/>
+                <a:ea typeface="微软雅黑" panose="020B0503020204020204" pitchFamily="34" charset="-122"/>
+              </a:rPr>
               <a:t>要使</a:t>
             </a:r>
             <a:r>
-              <a:rPr lang="en-US" altLang="zh-CN" sz="1800" dirty="0"/>
+              <a:rPr lang="en-US" altLang="zh-CN" sz="1900" dirty="0">
+                <a:latin typeface="微软雅黑" panose="020B0503020204020204" pitchFamily="34" charset="-122"/>
+                <a:ea typeface="微软雅黑" panose="020B0503020204020204" pitchFamily="34" charset="-122"/>
+              </a:rPr>
               <a:t>python</a:t>
             </a:r>
             <a:r>
-              <a:rPr lang="zh-CN" altLang="en-US" sz="1800" dirty="0"/>
+              <a:rPr lang="zh-CN" altLang="en-US" sz="1900" dirty="0">
+                <a:latin typeface="微软雅黑" panose="020B0503020204020204" pitchFamily="34" charset="-122"/>
+                <a:ea typeface="微软雅黑" panose="020B0503020204020204" pitchFamily="34" charset="-122"/>
+              </a:rPr>
               <a:t>文件被认作插件，需要实现三个函数</a:t>
             </a:r>
-            <a:endParaRPr lang="en-US" altLang="zh-CN" sz="1800" dirty="0"/>
+            <a:endParaRPr lang="en-US" altLang="zh-CN" sz="1900" dirty="0">
+              <a:latin typeface="微软雅黑" panose="020B0503020204020204" pitchFamily="34" charset="-122"/>
+              <a:ea typeface="微软雅黑" panose="020B0503020204020204" pitchFamily="34" charset="-122"/>
+            </a:endParaRPr>
           </a:p>
           <a:p>
             <a:pPr lvl="1">
@@ -6091,26 +6476,44 @@
               <a:buChar char="Ø"/>
             </a:pPr>
             <a:r>
-              <a:rPr lang="en-US" altLang="zh-CN" sz="1600" dirty="0" err="1"/>
+              <a:rPr lang="en-US" altLang="zh-CN" sz="1600" dirty="0" err="1">
+                <a:latin typeface="微软雅黑" panose="020B0503020204020204" pitchFamily="34" charset="-122"/>
+                <a:ea typeface="微软雅黑" panose="020B0503020204020204" pitchFamily="34" charset="-122"/>
+              </a:rPr>
               <a:t>plugin_prob</a:t>
             </a:r>
             <a:r>
-              <a:rPr lang="en-US" altLang="zh-CN" sz="1600" dirty="0"/>
+              <a:rPr lang="en-US" altLang="zh-CN" sz="1600" dirty="0">
+                <a:latin typeface="微软雅黑" panose="020B0503020204020204" pitchFamily="34" charset="-122"/>
+                <a:ea typeface="微软雅黑" panose="020B0503020204020204" pitchFamily="34" charset="-122"/>
+              </a:rPr>
               <a:t> – </a:t>
             </a:r>
             <a:r>
-              <a:rPr lang="zh-CN" altLang="en-US" sz="1600" dirty="0"/>
+              <a:rPr lang="zh-CN" altLang="en-US" sz="1600" dirty="0">
+                <a:latin typeface="微软雅黑" panose="020B0503020204020204" pitchFamily="34" charset="-122"/>
+                <a:ea typeface="微软雅黑" panose="020B0503020204020204" pitchFamily="34" charset="-122"/>
+              </a:rPr>
               <a:t>返回一个</a:t>
             </a:r>
             <a:r>
-              <a:rPr lang="en-US" altLang="zh-CN" sz="1600" dirty="0" err="1"/>
+              <a:rPr lang="en-US" altLang="zh-CN" sz="1600" dirty="0" err="1">
+                <a:latin typeface="微软雅黑" panose="020B0503020204020204" pitchFamily="34" charset="-122"/>
+                <a:ea typeface="微软雅黑" panose="020B0503020204020204" pitchFamily="34" charset="-122"/>
+              </a:rPr>
               <a:t>dict</a:t>
             </a:r>
             <a:r>
-              <a:rPr lang="zh-CN" altLang="en-US" sz="1600" dirty="0"/>
+              <a:rPr lang="zh-CN" altLang="en-US" sz="1600" dirty="0">
+                <a:latin typeface="微软雅黑" panose="020B0503020204020204" pitchFamily="34" charset="-122"/>
+                <a:ea typeface="微软雅黑" panose="020B0503020204020204" pitchFamily="34" charset="-122"/>
+              </a:rPr>
               <a:t>，里面是这个插件的名字和其它信息</a:t>
             </a:r>
-            <a:endParaRPr lang="en-US" altLang="zh-CN" sz="1600" dirty="0"/>
+            <a:endParaRPr lang="en-US" altLang="zh-CN" sz="1600" dirty="0">
+              <a:latin typeface="微软雅黑" panose="020B0503020204020204" pitchFamily="34" charset="-122"/>
+              <a:ea typeface="微软雅黑" panose="020B0503020204020204" pitchFamily="34" charset="-122"/>
+            </a:endParaRPr>
           </a:p>
           <a:p>
             <a:pPr lvl="1">
@@ -6118,35 +6521,59 @@
               <a:buChar char="Ø"/>
             </a:pPr>
             <a:r>
-              <a:rPr lang="en-US" altLang="zh-CN" sz="1600" dirty="0" err="1"/>
+              <a:rPr lang="en-US" altLang="zh-CN" sz="1600" dirty="0" err="1">
+                <a:latin typeface="微软雅黑" panose="020B0503020204020204" pitchFamily="34" charset="-122"/>
+                <a:ea typeface="微软雅黑" panose="020B0503020204020204" pitchFamily="34" charset="-122"/>
+              </a:rPr>
               <a:t>plugin_adapt</a:t>
             </a:r>
             <a:r>
-              <a:rPr lang="en-US" altLang="zh-CN" sz="1600" dirty="0"/>
+              <a:rPr lang="en-US" altLang="zh-CN" sz="1600" dirty="0">
+                <a:latin typeface="微软雅黑" panose="020B0503020204020204" pitchFamily="34" charset="-122"/>
+                <a:ea typeface="微软雅黑" panose="020B0503020204020204" pitchFamily="34" charset="-122"/>
+              </a:rPr>
               <a:t> – </a:t>
             </a:r>
             <a:r>
-              <a:rPr lang="zh-CN" altLang="en-US" sz="1600" dirty="0"/>
+              <a:rPr lang="zh-CN" altLang="en-US" sz="1600" dirty="0">
+                <a:latin typeface="微软雅黑" panose="020B0503020204020204" pitchFamily="34" charset="-122"/>
+                <a:ea typeface="微软雅黑" panose="020B0503020204020204" pitchFamily="34" charset="-122"/>
+              </a:rPr>
               <a:t>根据传入的</a:t>
             </a:r>
             <a:r>
-              <a:rPr lang="en-US" altLang="zh-CN" sz="1600" dirty="0" err="1"/>
+              <a:rPr lang="en-US" altLang="zh-CN" sz="1600" dirty="0" err="1">
+                <a:latin typeface="微软雅黑" panose="020B0503020204020204" pitchFamily="34" charset="-122"/>
+                <a:ea typeface="微软雅黑" panose="020B0503020204020204" pitchFamily="34" charset="-122"/>
+              </a:rPr>
               <a:t>uri</a:t>
             </a:r>
             <a:r>
-              <a:rPr lang="zh-CN" altLang="en-US" sz="1600" dirty="0"/>
+              <a:rPr lang="zh-CN" altLang="en-US" sz="1600" dirty="0">
+                <a:latin typeface="微软雅黑" panose="020B0503020204020204" pitchFamily="34" charset="-122"/>
+                <a:ea typeface="微软雅黑" panose="020B0503020204020204" pitchFamily="34" charset="-122"/>
+              </a:rPr>
               <a:t>，如果能提供数据则返回</a:t>
             </a:r>
             <a:r>
-              <a:rPr lang="en-US" altLang="zh-CN" sz="1600" dirty="0"/>
+              <a:rPr lang="en-US" altLang="zh-CN" sz="1600" dirty="0">
+                <a:latin typeface="微软雅黑" panose="020B0503020204020204" pitchFamily="34" charset="-122"/>
+                <a:ea typeface="微软雅黑" panose="020B0503020204020204" pitchFamily="34" charset="-122"/>
+              </a:rPr>
               <a:t>True</a:t>
             </a:r>
             <a:r>
-              <a:rPr lang="zh-CN" altLang="en-US" sz="1600" dirty="0"/>
+              <a:rPr lang="zh-CN" altLang="en-US" sz="1600" dirty="0">
+                <a:latin typeface="微软雅黑" panose="020B0503020204020204" pitchFamily="34" charset="-122"/>
+                <a:ea typeface="微软雅黑" panose="020B0503020204020204" pitchFamily="34" charset="-122"/>
+              </a:rPr>
               <a:t>，反之</a:t>
             </a:r>
             <a:r>
-              <a:rPr lang="en-US" altLang="zh-CN" sz="1600" dirty="0"/>
+              <a:rPr lang="en-US" altLang="zh-CN" sz="1600" dirty="0">
+                <a:latin typeface="微软雅黑" panose="020B0503020204020204" pitchFamily="34" charset="-122"/>
+                <a:ea typeface="微软雅黑" panose="020B0503020204020204" pitchFamily="34" charset="-122"/>
+              </a:rPr>
               <a:t>False</a:t>
             </a:r>
           </a:p>
@@ -6156,41 +6583,71 @@
               <a:buChar char="Ø"/>
             </a:pPr>
             <a:r>
-              <a:rPr lang="en-US" altLang="zh-CN" sz="1600" dirty="0" err="1"/>
+              <a:rPr lang="en-US" altLang="zh-CN" sz="1600" dirty="0" err="1">
+                <a:latin typeface="微软雅黑" panose="020B0503020204020204" pitchFamily="34" charset="-122"/>
+                <a:ea typeface="微软雅黑" panose="020B0503020204020204" pitchFamily="34" charset="-122"/>
+              </a:rPr>
               <a:t>plugin_capacities</a:t>
             </a:r>
             <a:r>
-              <a:rPr lang="en-US" altLang="zh-CN" sz="1600" dirty="0"/>
+              <a:rPr lang="en-US" altLang="zh-CN" sz="1600" dirty="0">
+                <a:latin typeface="微软雅黑" panose="020B0503020204020204" pitchFamily="34" charset="-122"/>
+                <a:ea typeface="微软雅黑" panose="020B0503020204020204" pitchFamily="34" charset="-122"/>
+              </a:rPr>
               <a:t> – </a:t>
             </a:r>
             <a:r>
-              <a:rPr lang="zh-CN" altLang="en-US" sz="1600" dirty="0"/>
+              <a:rPr lang="zh-CN" altLang="en-US" sz="1600" dirty="0">
+                <a:latin typeface="微软雅黑" panose="020B0503020204020204" pitchFamily="34" charset="-122"/>
+                <a:ea typeface="微软雅黑" panose="020B0503020204020204" pitchFamily="34" charset="-122"/>
+              </a:rPr>
               <a:t>返回插件能支持的</a:t>
             </a:r>
             <a:r>
-              <a:rPr lang="en-US" altLang="zh-CN" sz="1600" dirty="0" err="1"/>
+              <a:rPr lang="en-US" altLang="zh-CN" sz="1600" dirty="0" err="1">
+                <a:latin typeface="微软雅黑" panose="020B0503020204020204" pitchFamily="34" charset="-122"/>
+                <a:ea typeface="微软雅黑" panose="020B0503020204020204" pitchFamily="34" charset="-122"/>
+              </a:rPr>
               <a:t>uri</a:t>
             </a:r>
             <a:r>
-              <a:rPr lang="zh-CN" altLang="en-US" sz="1600" dirty="0"/>
+              <a:rPr lang="zh-CN" altLang="en-US" sz="1600" dirty="0">
+                <a:latin typeface="微软雅黑" panose="020B0503020204020204" pitchFamily="34" charset="-122"/>
+                <a:ea typeface="微软雅黑" panose="020B0503020204020204" pitchFamily="34" charset="-122"/>
+              </a:rPr>
               <a:t>列表</a:t>
             </a:r>
-            <a:endParaRPr lang="en-US" altLang="zh-CN" sz="1600" dirty="0"/>
-          </a:p>
-          <a:p>
-            <a:r>
-              <a:rPr lang="zh-CN" altLang="en-US" sz="1800" dirty="0"/>
+            <a:endParaRPr lang="en-US" altLang="zh-CN" sz="1600" dirty="0">
+              <a:latin typeface="微软雅黑" panose="020B0503020204020204" pitchFamily="34" charset="-122"/>
+              <a:ea typeface="微软雅黑" panose="020B0503020204020204" pitchFamily="34" charset="-122"/>
+            </a:endParaRPr>
+          </a:p>
+          <a:p>
+            <a:r>
+              <a:rPr lang="zh-CN" altLang="en-US" sz="1900" dirty="0">
+                <a:latin typeface="微软雅黑" panose="020B0503020204020204" pitchFamily="34" charset="-122"/>
+                <a:ea typeface="微软雅黑" panose="020B0503020204020204" pitchFamily="34" charset="-122"/>
+              </a:rPr>
               <a:t>要让插件实现</a:t>
             </a:r>
             <a:r>
-              <a:rPr lang="en-US" altLang="zh-CN" sz="1800" dirty="0"/>
+              <a:rPr lang="en-US" altLang="zh-CN" sz="1900" dirty="0">
+                <a:latin typeface="微软雅黑" panose="020B0503020204020204" pitchFamily="34" charset="-122"/>
+                <a:ea typeface="微软雅黑" panose="020B0503020204020204" pitchFamily="34" charset="-122"/>
+              </a:rPr>
               <a:t>Collector</a:t>
             </a:r>
             <a:r>
-              <a:rPr lang="zh-CN" altLang="en-US" sz="1800" dirty="0"/>
+              <a:rPr lang="zh-CN" altLang="en-US" sz="1900" dirty="0">
+                <a:latin typeface="微软雅黑" panose="020B0503020204020204" pitchFamily="34" charset="-122"/>
+                <a:ea typeface="微软雅黑" panose="020B0503020204020204" pitchFamily="34" charset="-122"/>
+              </a:rPr>
               <a:t>功能，需要实现三个函数</a:t>
             </a:r>
-            <a:endParaRPr lang="en-US" altLang="zh-CN" sz="1800" dirty="0"/>
+            <a:endParaRPr lang="en-US" altLang="zh-CN" sz="1900" dirty="0">
+              <a:latin typeface="微软雅黑" panose="020B0503020204020204" pitchFamily="34" charset="-122"/>
+              <a:ea typeface="微软雅黑" panose="020B0503020204020204" pitchFamily="34" charset="-122"/>
+            </a:endParaRPr>
           </a:p>
           <a:p>
             <a:pPr lvl="1">
@@ -6198,31 +6655,52 @@
               <a:buChar char="Ø"/>
             </a:pPr>
             <a:r>
-              <a:rPr lang="en-US" sz="1600" dirty="0"/>
+              <a:rPr lang="en-US" sz="1600" dirty="0">
+                <a:latin typeface="微软雅黑" panose="020B0503020204020204" pitchFamily="34" charset="-122"/>
+                <a:ea typeface="微软雅黑" panose="020B0503020204020204" pitchFamily="34" charset="-122"/>
+              </a:rPr>
               <a:t>query() – </a:t>
             </a:r>
             <a:r>
-              <a:rPr lang="zh-CN" altLang="en-US" sz="1600" dirty="0"/>
+              <a:rPr lang="zh-CN" altLang="en-US" sz="1600" dirty="0">
+                <a:latin typeface="微软雅黑" panose="020B0503020204020204" pitchFamily="34" charset="-122"/>
+                <a:ea typeface="微软雅黑" panose="020B0503020204020204" pitchFamily="34" charset="-122"/>
+              </a:rPr>
               <a:t>核心函数，根据</a:t>
             </a:r>
             <a:r>
-              <a:rPr lang="en-US" altLang="zh-CN" sz="1600" dirty="0" err="1"/>
+              <a:rPr lang="en-US" altLang="zh-CN" sz="1600" dirty="0" err="1">
+                <a:latin typeface="微软雅黑" panose="020B0503020204020204" pitchFamily="34" charset="-122"/>
+                <a:ea typeface="微软雅黑" panose="020B0503020204020204" pitchFamily="34" charset="-122"/>
+              </a:rPr>
               <a:t>uri</a:t>
             </a:r>
             <a:r>
-              <a:rPr lang="zh-CN" altLang="en-US" sz="1600" dirty="0"/>
+              <a:rPr lang="zh-CN" altLang="en-US" sz="1600" dirty="0">
+                <a:latin typeface="微软雅黑" panose="020B0503020204020204" pitchFamily="34" charset="-122"/>
+                <a:ea typeface="微软雅黑" panose="020B0503020204020204" pitchFamily="34" charset="-122"/>
+              </a:rPr>
               <a:t>以</a:t>
             </a:r>
             <a:r>
-              <a:rPr lang="en-US" altLang="zh-CN" sz="1600" dirty="0" err="1"/>
+              <a:rPr lang="en-US" altLang="zh-CN" sz="1600" dirty="0" err="1">
+                <a:latin typeface="微软雅黑" panose="020B0503020204020204" pitchFamily="34" charset="-122"/>
+                <a:ea typeface="微软雅黑" panose="020B0503020204020204" pitchFamily="34" charset="-122"/>
+              </a:rPr>
               <a:t>DataFrame</a:t>
             </a:r>
             <a:r>
-              <a:rPr lang="zh-CN" altLang="en-US" sz="1600" dirty="0"/>
+              <a:rPr lang="zh-CN" altLang="en-US" sz="1600" dirty="0">
+                <a:latin typeface="微软雅黑" panose="020B0503020204020204" pitchFamily="34" charset="-122"/>
+                <a:ea typeface="微软雅黑" panose="020B0503020204020204" pitchFamily="34" charset="-122"/>
+              </a:rPr>
               <a:t>的形式返回数据，出错或不支持则返回</a:t>
             </a:r>
             <a:r>
-              <a:rPr lang="en-US" altLang="zh-CN" sz="1600" dirty="0"/>
+              <a:rPr lang="en-US" altLang="zh-CN" sz="1600" dirty="0">
+                <a:latin typeface="微软雅黑" panose="020B0503020204020204" pitchFamily="34" charset="-122"/>
+                <a:ea typeface="微软雅黑" panose="020B0503020204020204" pitchFamily="34" charset="-122"/>
+              </a:rPr>
               <a:t>None</a:t>
             </a:r>
           </a:p>
@@ -6232,34 +6710,58 @@
               <a:buChar char="§"/>
             </a:pPr>
             <a:r>
-              <a:rPr lang="zh-CN" altLang="en-US" sz="1600" dirty="0"/>
+              <a:rPr lang="zh-CN" altLang="en-US" sz="1600" dirty="0">
+                <a:latin typeface="微软雅黑" panose="020B0503020204020204" pitchFamily="34" charset="-122"/>
+                <a:ea typeface="微软雅黑" panose="020B0503020204020204" pitchFamily="34" charset="-122"/>
+              </a:rPr>
               <a:t>参数主要是</a:t>
             </a:r>
             <a:r>
-              <a:rPr lang="en-US" sz="1600" dirty="0" err="1"/>
+              <a:rPr lang="en-US" sz="1600" dirty="0" err="1">
+                <a:latin typeface="微软雅黑" panose="020B0503020204020204" pitchFamily="34" charset="-122"/>
+                <a:ea typeface="微软雅黑" panose="020B0503020204020204" pitchFamily="34" charset="-122"/>
+              </a:rPr>
               <a:t>identity_field</a:t>
             </a:r>
             <a:r>
-              <a:rPr lang="zh-CN" altLang="en-US" sz="1600" dirty="0"/>
+              <a:rPr lang="zh-CN" altLang="en-US" sz="1600" dirty="0">
+                <a:latin typeface="微软雅黑" panose="020B0503020204020204" pitchFamily="34" charset="-122"/>
+                <a:ea typeface="微软雅黑" panose="020B0503020204020204" pitchFamily="34" charset="-122"/>
+              </a:rPr>
               <a:t>和</a:t>
             </a:r>
             <a:r>
-              <a:rPr lang="en-US" sz="1600" dirty="0" err="1"/>
+              <a:rPr lang="en-US" sz="1600" dirty="0" err="1">
+                <a:latin typeface="微软雅黑" panose="020B0503020204020204" pitchFamily="34" charset="-122"/>
+                <a:ea typeface="微软雅黑" panose="020B0503020204020204" pitchFamily="34" charset="-122"/>
+              </a:rPr>
               <a:t>datetime_field</a:t>
             </a:r>
             <a:r>
-              <a:rPr lang="zh-CN" altLang="en-US" sz="1600" dirty="0"/>
+              <a:rPr lang="zh-CN" altLang="en-US" sz="1600" dirty="0">
+                <a:latin typeface="微软雅黑" panose="020B0503020204020204" pitchFamily="34" charset="-122"/>
+                <a:ea typeface="微软雅黑" panose="020B0503020204020204" pitchFamily="34" charset="-122"/>
+              </a:rPr>
               <a:t>，并与</a:t>
             </a:r>
             <a:r>
-              <a:rPr lang="en-US" altLang="zh-CN" sz="1600" dirty="0" err="1"/>
+              <a:rPr lang="en-US" altLang="zh-CN" sz="1600" dirty="0" err="1">
+                <a:latin typeface="微软雅黑" panose="020B0503020204020204" pitchFamily="34" charset="-122"/>
+                <a:ea typeface="微软雅黑" panose="020B0503020204020204" pitchFamily="34" charset="-122"/>
+              </a:rPr>
               <a:t>DataAgent</a:t>
             </a:r>
             <a:r>
-              <a:rPr lang="zh-CN" altLang="en-US" sz="1600" dirty="0"/>
+              <a:rPr lang="zh-CN" altLang="en-US" sz="1600" dirty="0">
+                <a:latin typeface="微软雅黑" panose="020B0503020204020204" pitchFamily="34" charset="-122"/>
+                <a:ea typeface="微软雅黑" panose="020B0503020204020204" pitchFamily="34" charset="-122"/>
+              </a:rPr>
               <a:t>中的定义一致</a:t>
             </a:r>
-            <a:endParaRPr lang="en-US" altLang="zh-CN" sz="1600" dirty="0"/>
+            <a:endParaRPr lang="en-US" altLang="zh-CN" sz="1600" dirty="0">
+              <a:latin typeface="微软雅黑" panose="020B0503020204020204" pitchFamily="34" charset="-122"/>
+              <a:ea typeface="微软雅黑" panose="020B0503020204020204" pitchFamily="34" charset="-122"/>
+            </a:endParaRPr>
           </a:p>
           <a:p>
             <a:pPr lvl="1">
@@ -6267,15 +6769,24 @@
               <a:buChar char="Ø"/>
             </a:pPr>
             <a:r>
-              <a:rPr lang="en-US" sz="1600" dirty="0"/>
+              <a:rPr lang="en-US" sz="1600" dirty="0">
+                <a:latin typeface="微软雅黑" panose="020B0503020204020204" pitchFamily="34" charset="-122"/>
+                <a:ea typeface="微软雅黑" panose="020B0503020204020204" pitchFamily="34" charset="-122"/>
+              </a:rPr>
               <a:t>validate() – </a:t>
             </a:r>
             <a:r>
-              <a:rPr lang="zh-CN" altLang="en-US" sz="1600" dirty="0"/>
+              <a:rPr lang="zh-CN" altLang="en-US" sz="1600" dirty="0">
+                <a:latin typeface="微软雅黑" panose="020B0503020204020204" pitchFamily="34" charset="-122"/>
+                <a:ea typeface="微软雅黑" panose="020B0503020204020204" pitchFamily="34" charset="-122"/>
+              </a:rPr>
               <a:t>保留，返回</a:t>
             </a:r>
             <a:r>
-              <a:rPr lang="en-US" altLang="zh-CN" sz="1600" dirty="0"/>
+              <a:rPr lang="en-US" altLang="zh-CN" sz="1600" dirty="0">
+                <a:latin typeface="微软雅黑" panose="020B0503020204020204" pitchFamily="34" charset="-122"/>
+                <a:ea typeface="微软雅黑" panose="020B0503020204020204" pitchFamily="34" charset="-122"/>
+              </a:rPr>
               <a:t>True</a:t>
             </a:r>
           </a:p>
@@ -6285,84 +6796,144 @@
               <a:buChar char="Ø"/>
             </a:pPr>
             <a:r>
-              <a:rPr lang="en-US" altLang="zh-CN" sz="1600" dirty="0"/>
+              <a:rPr lang="en-US" altLang="zh-CN" sz="1600" dirty="0">
+                <a:latin typeface="微软雅黑" panose="020B0503020204020204" pitchFamily="34" charset="-122"/>
+                <a:ea typeface="微软雅黑" panose="020B0503020204020204" pitchFamily="34" charset="-122"/>
+              </a:rPr>
               <a:t>fields() – </a:t>
             </a:r>
             <a:r>
-              <a:rPr lang="zh-CN" altLang="en-US" sz="1600" dirty="0"/>
+              <a:rPr lang="zh-CN" altLang="en-US" sz="1600" dirty="0">
+                <a:latin typeface="微软雅黑" panose="020B0503020204020204" pitchFamily="34" charset="-122"/>
+                <a:ea typeface="微软雅黑" panose="020B0503020204020204" pitchFamily="34" charset="-122"/>
+              </a:rPr>
               <a:t>返回字段名表，格式为</a:t>
             </a:r>
             <a:r>
-              <a:rPr lang="en-US" altLang="zh-CN" sz="1600" dirty="0"/>
+              <a:rPr lang="en-US" altLang="zh-CN" sz="1600" dirty="0">
+                <a:latin typeface="微软雅黑" panose="020B0503020204020204" pitchFamily="34" charset="-122"/>
+                <a:ea typeface="微软雅黑" panose="020B0503020204020204" pitchFamily="34" charset="-122"/>
+              </a:rPr>
               <a:t>{</a:t>
             </a:r>
             <a:r>
-              <a:rPr lang="en-US" altLang="zh-CN" sz="1600" dirty="0" err="1"/>
+              <a:rPr lang="en-US" altLang="zh-CN" sz="1600" dirty="0" err="1">
+                <a:latin typeface="微软雅黑" panose="020B0503020204020204" pitchFamily="34" charset="-122"/>
+                <a:ea typeface="微软雅黑" panose="020B0503020204020204" pitchFamily="34" charset="-122"/>
+              </a:rPr>
               <a:t>uri</a:t>
             </a:r>
             <a:r>
-              <a:rPr lang="en-US" altLang="zh-CN" sz="1600" dirty="0"/>
+              <a:rPr lang="en-US" altLang="zh-CN" sz="1600" dirty="0">
+                <a:latin typeface="微软雅黑" panose="020B0503020204020204" pitchFamily="34" charset="-122"/>
+                <a:ea typeface="微软雅黑" panose="020B0503020204020204" pitchFamily="34" charset="-122"/>
+              </a:rPr>
               <a:t>: {field1: name1, field2: name2, …}}</a:t>
             </a:r>
           </a:p>
           <a:p>
             <a:r>
-              <a:rPr lang="zh-CN" altLang="en-US" sz="1800" dirty="0"/>
+              <a:rPr lang="zh-CN" altLang="en-US" sz="1900" dirty="0">
+                <a:latin typeface="微软雅黑" panose="020B0503020204020204" pitchFamily="34" charset="-122"/>
+                <a:ea typeface="微软雅黑" panose="020B0503020204020204" pitchFamily="34" charset="-122"/>
+              </a:rPr>
               <a:t>注意在编写</a:t>
             </a:r>
             <a:r>
-              <a:rPr lang="en-US" altLang="zh-CN" sz="1800" dirty="0"/>
+              <a:rPr lang="en-US" altLang="zh-CN" sz="1900" dirty="0">
+                <a:latin typeface="微软雅黑" panose="020B0503020204020204" pitchFamily="34" charset="-122"/>
+                <a:ea typeface="微软雅黑" panose="020B0503020204020204" pitchFamily="34" charset="-122"/>
+              </a:rPr>
               <a:t>Collector</a:t>
             </a:r>
             <a:r>
-              <a:rPr lang="zh-CN" altLang="en-US" sz="1800" dirty="0"/>
+              <a:rPr lang="zh-CN" altLang="en-US" sz="1900" dirty="0">
+                <a:latin typeface="微软雅黑" panose="020B0503020204020204" pitchFamily="34" charset="-122"/>
+                <a:ea typeface="微软雅黑" panose="020B0503020204020204" pitchFamily="34" charset="-122"/>
+              </a:rPr>
               <a:t>时，</a:t>
             </a:r>
             <a:r>
-              <a:rPr lang="en-US" sz="1800" dirty="0"/>
+              <a:rPr lang="en-US" sz="1900" dirty="0">
+                <a:latin typeface="微软雅黑" panose="020B0503020204020204" pitchFamily="34" charset="-122"/>
+                <a:ea typeface="微软雅黑" panose="020B0503020204020204" pitchFamily="34" charset="-122"/>
+              </a:rPr>
               <a:t> </a:t>
             </a:r>
             <a:r>
-              <a:rPr lang="en-US" sz="1800" dirty="0" err="1"/>
+              <a:rPr lang="en-US" sz="1900" dirty="0" err="1">
+                <a:latin typeface="微软雅黑" panose="020B0503020204020204" pitchFamily="34" charset="-122"/>
+                <a:ea typeface="微软雅黑" panose="020B0503020204020204" pitchFamily="34" charset="-122"/>
+              </a:rPr>
               <a:t>identity_field</a:t>
             </a:r>
             <a:r>
-              <a:rPr lang="zh-CN" altLang="en-US" sz="1800" dirty="0"/>
+              <a:rPr lang="zh-CN" altLang="en-US" sz="1900" dirty="0">
+                <a:latin typeface="微软雅黑" panose="020B0503020204020204" pitchFamily="34" charset="-122"/>
+                <a:ea typeface="微软雅黑" panose="020B0503020204020204" pitchFamily="34" charset="-122"/>
+              </a:rPr>
               <a:t>需要转换为软件约定的形式。如：</a:t>
             </a:r>
             <a:r>
-              <a:rPr lang="en-US" altLang="zh-CN" sz="1800" dirty="0"/>
+              <a:rPr lang="en-US" altLang="zh-CN" sz="1900" dirty="0">
+                <a:latin typeface="微软雅黑" panose="020B0503020204020204" pitchFamily="34" charset="-122"/>
+                <a:ea typeface="微软雅黑" panose="020B0503020204020204" pitchFamily="34" charset="-122"/>
+              </a:rPr>
               <a:t>000001.SZSE</a:t>
             </a:r>
             <a:r>
-              <a:rPr lang="zh-CN" altLang="en-US" sz="1800" dirty="0"/>
+              <a:rPr lang="zh-CN" altLang="en-US" sz="1900" dirty="0">
+                <a:latin typeface="微软雅黑" panose="020B0503020204020204" pitchFamily="34" charset="-122"/>
+                <a:ea typeface="微软雅黑" panose="020B0503020204020204" pitchFamily="34" charset="-122"/>
+              </a:rPr>
               <a:t>，</a:t>
             </a:r>
             <a:r>
-              <a:rPr lang="en-US" altLang="zh-CN" sz="1800" dirty="0"/>
+              <a:rPr lang="en-US" altLang="zh-CN" sz="1900" dirty="0">
+                <a:latin typeface="微软雅黑" panose="020B0503020204020204" pitchFamily="34" charset="-122"/>
+                <a:ea typeface="微软雅黑" panose="020B0503020204020204" pitchFamily="34" charset="-122"/>
+              </a:rPr>
               <a:t>600000.SSE</a:t>
             </a:r>
             <a:r>
-              <a:rPr lang="zh-CN" altLang="en-US" sz="1800" dirty="0"/>
+              <a:rPr lang="zh-CN" altLang="en-US" sz="1900" dirty="0">
+                <a:latin typeface="微软雅黑" panose="020B0503020204020204" pitchFamily="34" charset="-122"/>
+                <a:ea typeface="微软雅黑" panose="020B0503020204020204" pitchFamily="34" charset="-122"/>
+              </a:rPr>
               <a:t>；同时</a:t>
             </a:r>
             <a:r>
-              <a:rPr lang="en-US" sz="1800" dirty="0" err="1"/>
+              <a:rPr lang="en-US" sz="1900" dirty="0" err="1">
+                <a:latin typeface="微软雅黑" panose="020B0503020204020204" pitchFamily="34" charset="-122"/>
+                <a:ea typeface="微软雅黑" panose="020B0503020204020204" pitchFamily="34" charset="-122"/>
+              </a:rPr>
               <a:t>datetime_field</a:t>
             </a:r>
             <a:r>
-              <a:rPr lang="zh-CN" altLang="en-US" sz="1800" dirty="0"/>
+              <a:rPr lang="zh-CN" altLang="en-US" sz="1900" dirty="0">
+                <a:latin typeface="微软雅黑" panose="020B0503020204020204" pitchFamily="34" charset="-122"/>
+                <a:ea typeface="微软雅黑" panose="020B0503020204020204" pitchFamily="34" charset="-122"/>
+              </a:rPr>
               <a:t>应转换为</a:t>
             </a:r>
             <a:r>
-              <a:rPr lang="en-US" altLang="zh-CN" sz="1800" dirty="0"/>
+              <a:rPr lang="en-US" altLang="zh-CN" sz="1900" dirty="0">
+                <a:latin typeface="微软雅黑" panose="020B0503020204020204" pitchFamily="34" charset="-122"/>
+                <a:ea typeface="微软雅黑" panose="020B0503020204020204" pitchFamily="34" charset="-122"/>
+              </a:rPr>
               <a:t>datetime</a:t>
             </a:r>
             <a:r>
-              <a:rPr lang="zh-CN" altLang="en-US" sz="1800" dirty="0"/>
+              <a:rPr lang="zh-CN" altLang="en-US" sz="1900" dirty="0">
+                <a:latin typeface="微软雅黑" panose="020B0503020204020204" pitchFamily="34" charset="-122"/>
+                <a:ea typeface="微软雅黑" panose="020B0503020204020204" pitchFamily="34" charset="-122"/>
+              </a:rPr>
               <a:t>格式</a:t>
             </a:r>
-            <a:endParaRPr lang="en-US" altLang="zh-CN" sz="1800" dirty="0"/>
+            <a:endParaRPr lang="en-US" altLang="zh-CN" sz="1900" dirty="0">
+              <a:latin typeface="微软雅黑" panose="020B0503020204020204" pitchFamily="34" charset="-122"/>
+              <a:ea typeface="微软雅黑" panose="020B0503020204020204" pitchFamily="34" charset="-122"/>
+            </a:endParaRPr>
           </a:p>
         </p:txBody>
       </p:sp>
@@ -6447,7 +7018,10 @@
           <a:lstStyle/>
           <a:p>
             <a:r>
-              <a:rPr lang="en-US" dirty="0"/>
+              <a:rPr lang="en-US" dirty="0">
+                <a:latin typeface="微软雅黑" panose="020B0503020204020204" pitchFamily="34" charset="-122"/>
+                <a:ea typeface="微软雅黑" panose="020B0503020204020204" pitchFamily="34" charset="-122"/>
+              </a:rPr>
               <a:t>Conclusion</a:t>
             </a:r>
           </a:p>
@@ -6475,87 +7049,153 @@
           <a:lstStyle/>
           <a:p>
             <a:r>
-              <a:rPr lang="zh-CN" altLang="en-US" dirty="0"/>
+              <a:rPr lang="zh-CN" altLang="en-US" dirty="0">
+                <a:latin typeface="微软雅黑" panose="020B0503020204020204" pitchFamily="34" charset="-122"/>
+                <a:ea typeface="微软雅黑" panose="020B0503020204020204" pitchFamily="34" charset="-122"/>
+              </a:rPr>
               <a:t>只要定义了</a:t>
             </a:r>
             <a:r>
-              <a:rPr lang="en-US" altLang="zh-CN" dirty="0" err="1"/>
+              <a:rPr lang="en-US" altLang="zh-CN" dirty="0" err="1">
+                <a:latin typeface="微软雅黑" panose="020B0503020204020204" pitchFamily="34" charset="-122"/>
+                <a:ea typeface="微软雅黑" panose="020B0503020204020204" pitchFamily="34" charset="-122"/>
+              </a:rPr>
               <a:t>DataAgent</a:t>
             </a:r>
             <a:r>
-              <a:rPr lang="zh-CN" altLang="en-US" dirty="0"/>
+              <a:rPr lang="zh-CN" altLang="en-US" dirty="0">
+                <a:latin typeface="微软雅黑" panose="020B0503020204020204" pitchFamily="34" charset="-122"/>
+                <a:ea typeface="微软雅黑" panose="020B0503020204020204" pitchFamily="34" charset="-122"/>
+              </a:rPr>
               <a:t>并实现了相应的</a:t>
             </a:r>
             <a:r>
-              <a:rPr lang="en-US" altLang="zh-CN" dirty="0"/>
+              <a:rPr lang="en-US" altLang="zh-CN" dirty="0">
+                <a:latin typeface="微软雅黑" panose="020B0503020204020204" pitchFamily="34" charset="-122"/>
+                <a:ea typeface="微软雅黑" panose="020B0503020204020204" pitchFamily="34" charset="-122"/>
+              </a:rPr>
+              <a:t>Collector</a:t>
+            </a:r>
+            <a:r>
+              <a:rPr lang="zh-CN" altLang="en-US" dirty="0">
+                <a:latin typeface="微软雅黑" panose="020B0503020204020204" pitchFamily="34" charset="-122"/>
+                <a:ea typeface="微软雅黑" panose="020B0503020204020204" pitchFamily="34" charset="-122"/>
+              </a:rPr>
+              <a:t>，数据就能通过</a:t>
+            </a:r>
+            <a:r>
+              <a:rPr lang="en-US" altLang="zh-CN" dirty="0" err="1">
+                <a:latin typeface="微软雅黑" panose="020B0503020204020204" pitchFamily="34" charset="-122"/>
+                <a:ea typeface="微软雅黑" panose="020B0503020204020204" pitchFamily="34" charset="-122"/>
+              </a:rPr>
+              <a:t>StockAnalysisSystem</a:t>
+            </a:r>
+            <a:r>
+              <a:rPr lang="zh-CN" altLang="en-US" dirty="0">
+                <a:latin typeface="微软雅黑" panose="020B0503020204020204" pitchFamily="34" charset="-122"/>
+                <a:ea typeface="微软雅黑" panose="020B0503020204020204" pitchFamily="34" charset="-122"/>
+              </a:rPr>
+              <a:t>进行存取和更新了</a:t>
+            </a:r>
+            <a:endParaRPr lang="en-US" altLang="zh-CN" dirty="0">
+              <a:latin typeface="微软雅黑" panose="020B0503020204020204" pitchFamily="34" charset="-122"/>
+              <a:ea typeface="微软雅黑" panose="020B0503020204020204" pitchFamily="34" charset="-122"/>
+            </a:endParaRPr>
+          </a:p>
+          <a:p>
+            <a:r>
+              <a:rPr lang="zh-CN" altLang="en-US" dirty="0">
+                <a:latin typeface="微软雅黑" panose="020B0503020204020204" pitchFamily="34" charset="-122"/>
+                <a:ea typeface="微软雅黑" panose="020B0503020204020204" pitchFamily="34" charset="-122"/>
+              </a:rPr>
+              <a:t>除了按照需求特意转换的字段，其它所有字段均可以保持原始数据格式</a:t>
+            </a:r>
+            <a:endParaRPr lang="en-US" altLang="zh-CN" dirty="0">
+              <a:latin typeface="微软雅黑" panose="020B0503020204020204" pitchFamily="34" charset="-122"/>
+              <a:ea typeface="微软雅黑" panose="020B0503020204020204" pitchFamily="34" charset="-122"/>
+            </a:endParaRPr>
+          </a:p>
+          <a:p>
+            <a:r>
+              <a:rPr lang="zh-CN" altLang="en-US" dirty="0">
+                <a:latin typeface="微软雅黑" panose="020B0503020204020204" pitchFamily="34" charset="-122"/>
+                <a:ea typeface="微软雅黑" panose="020B0503020204020204" pitchFamily="34" charset="-122"/>
+              </a:rPr>
+              <a:t>如果同时定义了</a:t>
+            </a:r>
+            <a:r>
+              <a:rPr lang="en-US" dirty="0" err="1">
+                <a:latin typeface="微软雅黑" panose="020B0503020204020204" pitchFamily="34" charset="-122"/>
+                <a:ea typeface="微软雅黑" panose="020B0503020204020204" pitchFamily="34" charset="-122"/>
+              </a:rPr>
+              <a:t>identity_field</a:t>
+            </a:r>
+            <a:r>
+              <a:rPr lang="zh-CN" altLang="en-US" dirty="0">
+                <a:latin typeface="微软雅黑" panose="020B0503020204020204" pitchFamily="34" charset="-122"/>
+                <a:ea typeface="微软雅黑" panose="020B0503020204020204" pitchFamily="34" charset="-122"/>
+              </a:rPr>
+              <a:t>和</a:t>
+            </a:r>
+            <a:r>
+              <a:rPr lang="en-US" dirty="0" err="1">
+                <a:latin typeface="微软雅黑" panose="020B0503020204020204" pitchFamily="34" charset="-122"/>
+                <a:ea typeface="微软雅黑" panose="020B0503020204020204" pitchFamily="34" charset="-122"/>
+              </a:rPr>
+              <a:t>datetime_field</a:t>
+            </a:r>
+            <a:r>
+              <a:rPr lang="zh-CN" altLang="en-US" dirty="0">
+                <a:latin typeface="微软雅黑" panose="020B0503020204020204" pitchFamily="34" charset="-122"/>
+                <a:ea typeface="微软雅黑" panose="020B0503020204020204" pitchFamily="34" charset="-122"/>
+              </a:rPr>
+              <a:t>，那么它们将共同成为数据行的主键；如果只定义了其中一个，那么它即为数据行的主键。</a:t>
+            </a:r>
+            <a:endParaRPr lang="en-US" altLang="zh-CN" dirty="0">
+              <a:latin typeface="微软雅黑" panose="020B0503020204020204" pitchFamily="34" charset="-122"/>
+              <a:ea typeface="微软雅黑" panose="020B0503020204020204" pitchFamily="34" charset="-122"/>
+            </a:endParaRPr>
+          </a:p>
+          <a:p>
+            <a:r>
+              <a:rPr lang="zh-CN" altLang="en-US" dirty="0">
+                <a:latin typeface="微软雅黑" panose="020B0503020204020204" pitchFamily="34" charset="-122"/>
+                <a:ea typeface="微软雅黑" panose="020B0503020204020204" pitchFamily="34" charset="-122"/>
+              </a:rPr>
+              <a:t>如果不同</a:t>
+            </a:r>
+            <a:r>
+              <a:rPr lang="en-US" altLang="zh-CN" dirty="0">
+                <a:latin typeface="微软雅黑" panose="020B0503020204020204" pitchFamily="34" charset="-122"/>
+                <a:ea typeface="微软雅黑" panose="020B0503020204020204" pitchFamily="34" charset="-122"/>
+              </a:rPr>
               <a:t>collector</a:t>
             </a:r>
             <a:r>
-              <a:rPr lang="zh-CN" altLang="en-US" dirty="0"/>
-              <a:t>，数据就能通过</a:t>
-            </a:r>
-            <a:r>
-              <a:rPr lang="en-US" altLang="zh-CN" dirty="0" err="1"/>
-              <a:t>StockAnalysisSystem</a:t>
-            </a:r>
-            <a:r>
-              <a:rPr lang="zh-CN" altLang="en-US" dirty="0"/>
-              <a:t>进行存取和更新了</a:t>
-            </a:r>
-            <a:endParaRPr lang="en-US" altLang="zh-CN" dirty="0"/>
-          </a:p>
-          <a:p>
-            <a:r>
-              <a:rPr lang="zh-CN" altLang="en-US" dirty="0"/>
-              <a:t>除了按照需要特意转换的字段，其它所有字段均保持原始数据格式</a:t>
-            </a:r>
-            <a:endParaRPr lang="en-US" altLang="zh-CN" dirty="0"/>
-          </a:p>
-          <a:p>
-            <a:r>
-              <a:rPr lang="zh-CN" altLang="en-US" dirty="0"/>
-              <a:t>如果同时定义了</a:t>
-            </a:r>
-            <a:r>
-              <a:rPr lang="en-US" dirty="0" err="1"/>
-              <a:t>identity_field</a:t>
-            </a:r>
-            <a:r>
-              <a:rPr lang="zh-CN" altLang="en-US" dirty="0"/>
-              <a:t>和</a:t>
-            </a:r>
-            <a:r>
-              <a:rPr lang="en-US" dirty="0" err="1"/>
-              <a:t>datetime_field</a:t>
-            </a:r>
-            <a:r>
-              <a:rPr lang="zh-CN" altLang="en-US" dirty="0"/>
-              <a:t>，那么它们将共同成为数据行的主键；如果只定义了其中一个，那么它即为数据行的主键。</a:t>
-            </a:r>
-            <a:endParaRPr lang="en-US" altLang="zh-CN" dirty="0"/>
-          </a:p>
-          <a:p>
-            <a:r>
-              <a:rPr lang="zh-CN" altLang="en-US" dirty="0"/>
-              <a:t>如果不同</a:t>
-            </a:r>
-            <a:r>
-              <a:rPr lang="en-US" altLang="zh-CN" dirty="0"/>
-              <a:t>collector</a:t>
-            </a:r>
-            <a:r>
-              <a:rPr lang="zh-CN" altLang="en-US" dirty="0"/>
+              <a:rPr lang="zh-CN" altLang="en-US" dirty="0">
+                <a:latin typeface="微软雅黑" panose="020B0503020204020204" pitchFamily="34" charset="-122"/>
+                <a:ea typeface="微软雅黑" panose="020B0503020204020204" pitchFamily="34" charset="-122"/>
+              </a:rPr>
               <a:t>为相同的</a:t>
             </a:r>
             <a:r>
-              <a:rPr lang="en-US" altLang="zh-CN" dirty="0" err="1"/>
+              <a:rPr lang="en-US" altLang="zh-CN" dirty="0" err="1">
+                <a:latin typeface="微软雅黑" panose="020B0503020204020204" pitchFamily="34" charset="-122"/>
+                <a:ea typeface="微软雅黑" panose="020B0503020204020204" pitchFamily="34" charset="-122"/>
+              </a:rPr>
               <a:t>uri</a:t>
             </a:r>
             <a:r>
-              <a:rPr lang="zh-CN" altLang="en-US" dirty="0"/>
+              <a:rPr lang="zh-CN" altLang="en-US" dirty="0">
+                <a:latin typeface="微软雅黑" panose="020B0503020204020204" pitchFamily="34" charset="-122"/>
+                <a:ea typeface="微软雅黑" panose="020B0503020204020204" pitchFamily="34" charset="-122"/>
+              </a:rPr>
               <a:t>提供数据，那么主键相同且字段相同的数据将被后来者更新（字段不同则保留）。暂时没实现数据源优先选择策略。</a:t>
             </a:r>
-            <a:endParaRPr lang="en-US" dirty="0"/>
+            <a:endParaRPr lang="en-US" dirty="0">
+              <a:latin typeface="微软雅黑" panose="020B0503020204020204" pitchFamily="34" charset="-122"/>
+              <a:ea typeface="微软雅黑" panose="020B0503020204020204" pitchFamily="34" charset="-122"/>
+            </a:endParaRPr>
           </a:p>
         </p:txBody>
       </p:sp>
@@ -6563,6 +7203,2484 @@
     <p:extLst>
       <p:ext uri="{BB962C8B-B14F-4D97-AF65-F5344CB8AC3E}">
         <p14:creationId xmlns:p14="http://schemas.microsoft.com/office/powerpoint/2010/main" val="3487277422"/>
+      </p:ext>
+    </p:extLst>
+  </p:cSld>
+  <p:clrMapOvr>
+    <a:masterClrMapping/>
+  </p:clrMapOvr>
+</p:sld>
+</file>
+
+<file path=ppt/slides/slide6.xml><?xml version="1.0" encoding="utf-8"?>
+<p:sld xmlns:a="http://schemas.openxmlformats.org/drawingml/2006/main" xmlns:r="http://schemas.openxmlformats.org/officeDocument/2006/relationships" xmlns:p="http://schemas.openxmlformats.org/presentationml/2006/main">
+  <p:cSld>
+    <p:bg>
+      <p:bgPr>
+        <a:solidFill>
+          <a:schemeClr val="bg1"/>
+        </a:solidFill>
+        <a:effectLst/>
+      </p:bgPr>
+    </p:bg>
+    <p:spTree>
+      <p:nvGrpSpPr>
+        <p:cNvPr id="1" name=""/>
+        <p:cNvGrpSpPr/>
+        <p:nvPr/>
+      </p:nvGrpSpPr>
+      <p:grpSpPr>
+        <a:xfrm>
+          <a:off x="0" y="0"/>
+          <a:ext cx="0" cy="0"/>
+          <a:chOff x="0" y="0"/>
+          <a:chExt cx="0" cy="0"/>
+        </a:xfrm>
+      </p:grpSpPr>
+      <p:sp>
+        <p:nvSpPr>
+          <p:cNvPr id="10" name="Rectangle 9">
+            <a:extLst>
+              <a:ext uri="{FF2B5EF4-FFF2-40B4-BE49-F238E27FC236}">
+                <a16:creationId xmlns:a16="http://schemas.microsoft.com/office/drawing/2014/main" id="{2B566528-1B12-4246-9431-5C2D7D081168}"/>
+              </a:ext>
+              <a:ext uri="{C183D7F6-B498-43B3-948B-1728B52AA6E4}">
+                <adec:decorative xmlns:adec="http://schemas.microsoft.com/office/drawing/2017/decorative" val="1"/>
+              </a:ext>
+            </a:extLst>
+          </p:cNvPr>
+          <p:cNvSpPr>
+            <a:spLocks noGrp="1" noRot="1" noChangeAspect="1" noMove="1" noResize="1" noEditPoints="1" noAdjustHandles="1" noChangeArrowheads="1" noChangeShapeType="1" noTextEdit="1"/>
+          </p:cNvSpPr>
+          <p:nvPr>
+            <p:extLst>
+              <p:ext uri="{386F3935-93C4-4BCD-93E2-E3B085C9AB24}">
+                <p16:designElem xmlns:p16="http://schemas.microsoft.com/office/powerpoint/2015/main" val="1"/>
+              </p:ext>
+            </p:extLst>
+          </p:nvPr>
+        </p:nvSpPr>
+        <p:spPr>
+          <a:xfrm>
+            <a:off x="0" y="0"/>
+            <a:ext cx="12192000" cy="6858000"/>
+          </a:xfrm>
+          <a:prstGeom prst="rect">
+            <a:avLst/>
+          </a:prstGeom>
+          <a:solidFill>
+            <a:schemeClr val="bg1"/>
+          </a:solidFill>
+          <a:ln>
+            <a:noFill/>
+          </a:ln>
+        </p:spPr>
+        <p:style>
+          <a:lnRef idx="2">
+            <a:schemeClr val="accent1">
+              <a:shade val="50000"/>
+            </a:schemeClr>
+          </a:lnRef>
+          <a:fillRef idx="1">
+            <a:schemeClr val="accent1"/>
+          </a:fillRef>
+          <a:effectRef idx="0">
+            <a:schemeClr val="accent1"/>
+          </a:effectRef>
+          <a:fontRef idx="minor">
+            <a:schemeClr val="lt1"/>
+          </a:fontRef>
+        </p:style>
+        <p:txBody>
+          <a:bodyPr rtlCol="0" anchor="ctr"/>
+          <a:lstStyle/>
+          <a:p>
+            <a:pPr algn="ctr"/>
+            <a:endParaRPr lang="en-US" dirty="0"/>
+          </a:p>
+        </p:txBody>
+      </p:sp>
+      <p:sp>
+        <p:nvSpPr>
+          <p:cNvPr id="2" name="Title 1">
+            <a:extLst>
+              <a:ext uri="{FF2B5EF4-FFF2-40B4-BE49-F238E27FC236}">
+                <a16:creationId xmlns:a16="http://schemas.microsoft.com/office/drawing/2014/main" id="{DE2DED35-72F2-4162-B81C-D76C3122A63B}"/>
+              </a:ext>
+            </a:extLst>
+          </p:cNvPr>
+          <p:cNvSpPr>
+            <a:spLocks noGrp="1"/>
+          </p:cNvSpPr>
+          <p:nvPr>
+            <p:ph type="title"/>
+          </p:nvPr>
+        </p:nvSpPr>
+        <p:spPr>
+          <a:xfrm>
+            <a:off x="643467" y="321734"/>
+            <a:ext cx="10905066" cy="1135737"/>
+          </a:xfrm>
+        </p:spPr>
+        <p:txBody>
+          <a:bodyPr>
+            <a:normAutofit/>
+          </a:bodyPr>
+          <a:lstStyle/>
+          <a:p>
+            <a:r>
+              <a:rPr lang="en-US" sz="3600" dirty="0">
+                <a:latin typeface="微软雅黑" panose="020B0503020204020204" pitchFamily="34" charset="-122"/>
+                <a:ea typeface="微软雅黑" panose="020B0503020204020204" pitchFamily="34" charset="-122"/>
+              </a:rPr>
+              <a:t>E</a:t>
+            </a:r>
+            <a:r>
+              <a:rPr lang="en-US" altLang="zh-CN" sz="3600" dirty="0">
+                <a:latin typeface="微软雅黑" panose="020B0503020204020204" pitchFamily="34" charset="-122"/>
+                <a:ea typeface="微软雅黑" panose="020B0503020204020204" pitchFamily="34" charset="-122"/>
+              </a:rPr>
+              <a:t>xample – Add </a:t>
+            </a:r>
+            <a:r>
+              <a:rPr lang="en-US" altLang="zh-CN" sz="3600" dirty="0" err="1">
+                <a:latin typeface="微软雅黑" panose="020B0503020204020204" pitchFamily="34" charset="-122"/>
+                <a:ea typeface="微软雅黑" panose="020B0503020204020204" pitchFamily="34" charset="-122"/>
+              </a:rPr>
+              <a:t>DataAgent</a:t>
+            </a:r>
+            <a:endParaRPr lang="en-US" sz="3600" dirty="0">
+              <a:latin typeface="微软雅黑" panose="020B0503020204020204" pitchFamily="34" charset="-122"/>
+              <a:ea typeface="微软雅黑" panose="020B0503020204020204" pitchFamily="34" charset="-122"/>
+            </a:endParaRPr>
+          </a:p>
+        </p:txBody>
+      </p:sp>
+      <p:sp>
+        <p:nvSpPr>
+          <p:cNvPr id="3" name="Content Placeholder 2">
+            <a:extLst>
+              <a:ext uri="{FF2B5EF4-FFF2-40B4-BE49-F238E27FC236}">
+                <a16:creationId xmlns:a16="http://schemas.microsoft.com/office/drawing/2014/main" id="{1CD34CC2-DBA6-4CC6-80EA-0DE6833095FF}"/>
+              </a:ext>
+            </a:extLst>
+          </p:cNvPr>
+          <p:cNvSpPr>
+            <a:spLocks noGrp="1"/>
+          </p:cNvSpPr>
+          <p:nvPr>
+            <p:ph idx="1"/>
+          </p:nvPr>
+        </p:nvSpPr>
+        <p:spPr>
+          <a:xfrm>
+            <a:off x="643468" y="1670240"/>
+            <a:ext cx="6859041" cy="4740287"/>
+          </a:xfrm>
+        </p:spPr>
+        <p:txBody>
+          <a:bodyPr>
+            <a:normAutofit/>
+          </a:bodyPr>
+          <a:lstStyle/>
+          <a:p>
+            <a:r>
+              <a:rPr lang="zh-CN" altLang="en-US" sz="2000" dirty="0">
+                <a:latin typeface="微软雅黑" panose="020B0503020204020204" pitchFamily="34" charset="-122"/>
+                <a:ea typeface="微软雅黑" panose="020B0503020204020204" pitchFamily="34" charset="-122"/>
+              </a:rPr>
+              <a:t>打开</a:t>
+            </a:r>
+            <a:r>
+              <a:rPr lang="en-US" altLang="zh-CN" sz="2000" dirty="0">
+                <a:latin typeface="微软雅黑" panose="020B0503020204020204" pitchFamily="34" charset="-122"/>
+                <a:ea typeface="微软雅黑" panose="020B0503020204020204" pitchFamily="34" charset="-122"/>
+              </a:rPr>
+              <a:t>DataAgentBuilder.py</a:t>
+            </a:r>
+            <a:r>
+              <a:rPr lang="zh-CN" altLang="en-US" sz="2000" dirty="0">
+                <a:latin typeface="微软雅黑" panose="020B0503020204020204" pitchFamily="34" charset="-122"/>
+                <a:ea typeface="微软雅黑" panose="020B0503020204020204" pitchFamily="34" charset="-122"/>
+              </a:rPr>
+              <a:t>，在</a:t>
+            </a:r>
+            <a:r>
+              <a:rPr lang="en-US" altLang="zh-CN" sz="2000" dirty="0" err="1">
+                <a:latin typeface="微软雅黑" panose="020B0503020204020204" pitchFamily="34" charset="-122"/>
+                <a:ea typeface="微软雅黑" panose="020B0503020204020204" pitchFamily="34" charset="-122"/>
+              </a:rPr>
+              <a:t>build_data_agent</a:t>
+            </a:r>
+            <a:r>
+              <a:rPr lang="en-US" altLang="zh-CN" sz="2000" dirty="0">
+                <a:latin typeface="微软雅黑" panose="020B0503020204020204" pitchFamily="34" charset="-122"/>
+                <a:ea typeface="微软雅黑" panose="020B0503020204020204" pitchFamily="34" charset="-122"/>
+              </a:rPr>
+              <a:t>()</a:t>
+            </a:r>
+            <a:r>
+              <a:rPr lang="zh-CN" altLang="en-US" sz="2000" dirty="0">
+                <a:latin typeface="微软雅黑" panose="020B0503020204020204" pitchFamily="34" charset="-122"/>
+                <a:ea typeface="微软雅黑" panose="020B0503020204020204" pitchFamily="34" charset="-122"/>
+              </a:rPr>
+              <a:t>最下方添加一个声明</a:t>
+            </a:r>
+            <a:endParaRPr lang="en-US" altLang="zh-CN" sz="2000" dirty="0">
+              <a:latin typeface="微软雅黑" panose="020B0503020204020204" pitchFamily="34" charset="-122"/>
+              <a:ea typeface="微软雅黑" panose="020B0503020204020204" pitchFamily="34" charset="-122"/>
+            </a:endParaRPr>
+          </a:p>
+          <a:p>
+            <a:pPr lvl="1">
+              <a:buFont typeface="Wingdings" panose="05000000000000000000" pitchFamily="2" charset="2"/>
+              <a:buChar char="Ø"/>
+            </a:pPr>
+            <a:r>
+              <a:rPr lang="en-US" altLang="zh-CN" sz="1800" dirty="0" err="1">
+                <a:latin typeface="微软雅黑" panose="020B0503020204020204" pitchFamily="34" charset="-122"/>
+                <a:ea typeface="微软雅黑" panose="020B0503020204020204" pitchFamily="34" charset="-122"/>
+              </a:rPr>
+              <a:t>uri</a:t>
+            </a:r>
+            <a:r>
+              <a:rPr lang="zh-CN" altLang="en-US" sz="1800" dirty="0">
+                <a:latin typeface="微软雅黑" panose="020B0503020204020204" pitchFamily="34" charset="-122"/>
+                <a:ea typeface="微软雅黑" panose="020B0503020204020204" pitchFamily="34" charset="-122"/>
+              </a:rPr>
+              <a:t>为“</a:t>
+            </a:r>
+            <a:r>
+              <a:rPr lang="en-US" altLang="zh-CN" sz="1800" dirty="0" err="1">
+                <a:latin typeface="微软雅黑" panose="020B0503020204020204" pitchFamily="34" charset="-122"/>
+                <a:ea typeface="微软雅黑" panose="020B0503020204020204" pitchFamily="34" charset="-122"/>
+              </a:rPr>
+              <a:t>Example.Collector</a:t>
+            </a:r>
+            <a:r>
+              <a:rPr lang="zh-CN" altLang="en-US" sz="1800" dirty="0">
+                <a:latin typeface="微软雅黑" panose="020B0503020204020204" pitchFamily="34" charset="-122"/>
+                <a:ea typeface="微软雅黑" panose="020B0503020204020204" pitchFamily="34" charset="-122"/>
+              </a:rPr>
+              <a:t>”</a:t>
+            </a:r>
+            <a:endParaRPr lang="en-US" altLang="zh-CN" sz="1800" dirty="0">
+              <a:latin typeface="微软雅黑" panose="020B0503020204020204" pitchFamily="34" charset="-122"/>
+              <a:ea typeface="微软雅黑" panose="020B0503020204020204" pitchFamily="34" charset="-122"/>
+            </a:endParaRPr>
+          </a:p>
+          <a:p>
+            <a:pPr lvl="1">
+              <a:buFont typeface="Wingdings" panose="05000000000000000000" pitchFamily="2" charset="2"/>
+              <a:buChar char="Ø"/>
+            </a:pPr>
+            <a:r>
+              <a:rPr lang="en-US" altLang="zh-CN" sz="1800" dirty="0">
+                <a:latin typeface="微软雅黑" panose="020B0503020204020204" pitchFamily="34" charset="-122"/>
+                <a:ea typeface="微软雅黑" panose="020B0503020204020204" pitchFamily="34" charset="-122"/>
+              </a:rPr>
+              <a:t>depot</a:t>
+            </a:r>
+            <a:r>
+              <a:rPr lang="zh-CN" altLang="en-US" sz="1800" dirty="0">
+                <a:latin typeface="微软雅黑" panose="020B0503020204020204" pitchFamily="34" charset="-122"/>
+                <a:ea typeface="微软雅黑" panose="020B0503020204020204" pitchFamily="34" charset="-122"/>
+              </a:rPr>
+              <a:t>使用</a:t>
+            </a:r>
+            <a:r>
+              <a:rPr lang="en-US" altLang="zh-CN" sz="1800" dirty="0">
+                <a:latin typeface="微软雅黑" panose="020B0503020204020204" pitchFamily="34" charset="-122"/>
+                <a:ea typeface="微软雅黑" panose="020B0503020204020204" pitchFamily="34" charset="-122"/>
+              </a:rPr>
+              <a:t>MongoDB</a:t>
+            </a:r>
+          </a:p>
+          <a:p>
+            <a:pPr lvl="2">
+              <a:buFont typeface="Wingdings" panose="05000000000000000000" pitchFamily="2" charset="2"/>
+              <a:buChar char="§"/>
+            </a:pPr>
+            <a:r>
+              <a:rPr lang="zh-CN" altLang="en-US" sz="1600" dirty="0">
+                <a:latin typeface="微软雅黑" panose="020B0503020204020204" pitchFamily="34" charset="-122"/>
+                <a:ea typeface="微软雅黑" panose="020B0503020204020204" pitchFamily="34" charset="-122"/>
+              </a:rPr>
+              <a:t>其中主键为</a:t>
+            </a:r>
+            <a:r>
+              <a:rPr lang="en-US" altLang="zh-CN" sz="1600" dirty="0">
+                <a:latin typeface="微软雅黑" panose="020B0503020204020204" pitchFamily="34" charset="-122"/>
+                <a:ea typeface="微软雅黑" panose="020B0503020204020204" pitchFamily="34" charset="-122"/>
+              </a:rPr>
+              <a:t>id</a:t>
+            </a:r>
+            <a:r>
+              <a:rPr lang="zh-CN" altLang="en-US" sz="1600" dirty="0">
+                <a:latin typeface="微软雅黑" panose="020B0503020204020204" pitchFamily="34" charset="-122"/>
+                <a:ea typeface="微软雅黑" panose="020B0503020204020204" pitchFamily="34" charset="-122"/>
+              </a:rPr>
+              <a:t>和</a:t>
+            </a:r>
+            <a:r>
+              <a:rPr lang="en-US" altLang="zh-CN" sz="1600" dirty="0">
+                <a:latin typeface="微软雅黑" panose="020B0503020204020204" pitchFamily="34" charset="-122"/>
+                <a:ea typeface="微软雅黑" panose="020B0503020204020204" pitchFamily="34" charset="-122"/>
+              </a:rPr>
+              <a:t>time</a:t>
+            </a:r>
+            <a:r>
+              <a:rPr lang="zh-CN" altLang="en-US" sz="1600" dirty="0">
+                <a:latin typeface="微软雅黑" panose="020B0503020204020204" pitchFamily="34" charset="-122"/>
+                <a:ea typeface="微软雅黑" panose="020B0503020204020204" pitchFamily="34" charset="-122"/>
+              </a:rPr>
+              <a:t>，与下面的两个字段对应</a:t>
+            </a:r>
+            <a:endParaRPr lang="en-US" altLang="zh-CN" sz="1600" dirty="0">
+              <a:latin typeface="微软雅黑" panose="020B0503020204020204" pitchFamily="34" charset="-122"/>
+              <a:ea typeface="微软雅黑" panose="020B0503020204020204" pitchFamily="34" charset="-122"/>
+            </a:endParaRPr>
+          </a:p>
+          <a:p>
+            <a:pPr lvl="2">
+              <a:buFont typeface="Wingdings" panose="05000000000000000000" pitchFamily="2" charset="2"/>
+              <a:buChar char="§"/>
+            </a:pPr>
+            <a:r>
+              <a:rPr lang="zh-CN" altLang="en-US" sz="1600" dirty="0">
+                <a:latin typeface="微软雅黑" panose="020B0503020204020204" pitchFamily="34" charset="-122"/>
+                <a:ea typeface="微软雅黑" panose="020B0503020204020204" pitchFamily="34" charset="-122"/>
+              </a:rPr>
+              <a:t>使用</a:t>
+            </a:r>
+            <a:r>
+              <a:rPr lang="en-US" altLang="zh-CN" sz="1600" dirty="0" err="1">
+                <a:latin typeface="微软雅黑" panose="020B0503020204020204" pitchFamily="34" charset="-122"/>
+                <a:ea typeface="微软雅黑" panose="020B0503020204020204" pitchFamily="34" charset="-122"/>
+              </a:rPr>
+              <a:t>TestDataBase</a:t>
+            </a:r>
+            <a:r>
+              <a:rPr lang="zh-CN" altLang="en-US" sz="1600" dirty="0">
+                <a:latin typeface="微软雅黑" panose="020B0503020204020204" pitchFamily="34" charset="-122"/>
+                <a:ea typeface="微软雅黑" panose="020B0503020204020204" pitchFamily="34" charset="-122"/>
+              </a:rPr>
+              <a:t>数据库</a:t>
+            </a:r>
+            <a:endParaRPr lang="en-US" altLang="zh-CN" sz="1600" dirty="0">
+              <a:latin typeface="微软雅黑" panose="020B0503020204020204" pitchFamily="34" charset="-122"/>
+              <a:ea typeface="微软雅黑" panose="020B0503020204020204" pitchFamily="34" charset="-122"/>
+            </a:endParaRPr>
+          </a:p>
+          <a:p>
+            <a:pPr lvl="2">
+              <a:buFont typeface="Wingdings" panose="05000000000000000000" pitchFamily="2" charset="2"/>
+              <a:buChar char="§"/>
+            </a:pPr>
+            <a:r>
+              <a:rPr lang="zh-CN" altLang="en-US" sz="1600" dirty="0">
+                <a:latin typeface="微软雅黑" panose="020B0503020204020204" pitchFamily="34" charset="-122"/>
+                <a:ea typeface="微软雅黑" panose="020B0503020204020204" pitchFamily="34" charset="-122"/>
+              </a:rPr>
+              <a:t>表名使用默认转换（将</a:t>
+            </a:r>
+            <a:r>
+              <a:rPr lang="en-US" altLang="zh-CN" sz="1600" dirty="0" err="1">
+                <a:latin typeface="微软雅黑" panose="020B0503020204020204" pitchFamily="34" charset="-122"/>
+                <a:ea typeface="微软雅黑" panose="020B0503020204020204" pitchFamily="34" charset="-122"/>
+              </a:rPr>
+              <a:t>uri</a:t>
+            </a:r>
+            <a:r>
+              <a:rPr lang="zh-CN" altLang="en-US" sz="1600" dirty="0">
+                <a:latin typeface="微软雅黑" panose="020B0503020204020204" pitchFamily="34" charset="-122"/>
+                <a:ea typeface="微软雅黑" panose="020B0503020204020204" pitchFamily="34" charset="-122"/>
+              </a:rPr>
+              <a:t>中的“</a:t>
+            </a:r>
+            <a:r>
+              <a:rPr lang="en-US" altLang="zh-CN" sz="1600" dirty="0">
+                <a:latin typeface="微软雅黑" panose="020B0503020204020204" pitchFamily="34" charset="-122"/>
+                <a:ea typeface="微软雅黑" panose="020B0503020204020204" pitchFamily="34" charset="-122"/>
+              </a:rPr>
+              <a:t>.</a:t>
+            </a:r>
+            <a:r>
+              <a:rPr lang="zh-CN" altLang="en-US" sz="1600" dirty="0">
+                <a:latin typeface="微软雅黑" panose="020B0503020204020204" pitchFamily="34" charset="-122"/>
+                <a:ea typeface="微软雅黑" panose="020B0503020204020204" pitchFamily="34" charset="-122"/>
+              </a:rPr>
+              <a:t>”替换为下划线）</a:t>
+            </a:r>
+            <a:endParaRPr lang="en-US" altLang="zh-CN" sz="1600" dirty="0">
+              <a:latin typeface="微软雅黑" panose="020B0503020204020204" pitchFamily="34" charset="-122"/>
+              <a:ea typeface="微软雅黑" panose="020B0503020204020204" pitchFamily="34" charset="-122"/>
+            </a:endParaRPr>
+          </a:p>
+          <a:p>
+            <a:pPr lvl="1">
+              <a:buFont typeface="Wingdings" panose="05000000000000000000" pitchFamily="2" charset="2"/>
+              <a:buChar char="Ø"/>
+            </a:pPr>
+            <a:r>
+              <a:rPr lang="zh-CN" altLang="en-US" sz="1800" dirty="0">
+                <a:latin typeface="微软雅黑" panose="020B0503020204020204" pitchFamily="34" charset="-122"/>
+                <a:ea typeface="微软雅黑" panose="020B0503020204020204" pitchFamily="34" charset="-122"/>
+              </a:rPr>
+              <a:t>定义</a:t>
+            </a:r>
+            <a:r>
+              <a:rPr lang="en-US" sz="1800" dirty="0" err="1">
+                <a:latin typeface="微软雅黑" panose="020B0503020204020204" pitchFamily="34" charset="-122"/>
+                <a:ea typeface="微软雅黑" panose="020B0503020204020204" pitchFamily="34" charset="-122"/>
+              </a:rPr>
+              <a:t>identity_field</a:t>
+            </a:r>
+            <a:r>
+              <a:rPr lang="zh-CN" altLang="en-US" sz="1800" dirty="0">
+                <a:latin typeface="微软雅黑" panose="020B0503020204020204" pitchFamily="34" charset="-122"/>
+                <a:ea typeface="微软雅黑" panose="020B0503020204020204" pitchFamily="34" charset="-122"/>
+              </a:rPr>
+              <a:t>为“</a:t>
+            </a:r>
+            <a:r>
+              <a:rPr lang="en-US" altLang="zh-CN" sz="1800" dirty="0">
+                <a:latin typeface="微软雅黑" panose="020B0503020204020204" pitchFamily="34" charset="-122"/>
+                <a:ea typeface="微软雅黑" panose="020B0503020204020204" pitchFamily="34" charset="-122"/>
+              </a:rPr>
+              <a:t>id</a:t>
+            </a:r>
+            <a:r>
+              <a:rPr lang="zh-CN" altLang="en-US" sz="1800" dirty="0">
+                <a:latin typeface="微软雅黑" panose="020B0503020204020204" pitchFamily="34" charset="-122"/>
+                <a:ea typeface="微软雅黑" panose="020B0503020204020204" pitchFamily="34" charset="-122"/>
+              </a:rPr>
+              <a:t>”</a:t>
+            </a:r>
+            <a:endParaRPr lang="en-US" sz="1800" dirty="0">
+              <a:latin typeface="微软雅黑" panose="020B0503020204020204" pitchFamily="34" charset="-122"/>
+              <a:ea typeface="微软雅黑" panose="020B0503020204020204" pitchFamily="34" charset="-122"/>
+            </a:endParaRPr>
+          </a:p>
+          <a:p>
+            <a:pPr lvl="1">
+              <a:buFont typeface="Wingdings" panose="05000000000000000000" pitchFamily="2" charset="2"/>
+              <a:buChar char="Ø"/>
+            </a:pPr>
+            <a:r>
+              <a:rPr lang="zh-CN" altLang="en-US" sz="1800" dirty="0">
+                <a:latin typeface="微软雅黑" panose="020B0503020204020204" pitchFamily="34" charset="-122"/>
+                <a:ea typeface="微软雅黑" panose="020B0503020204020204" pitchFamily="34" charset="-122"/>
+              </a:rPr>
+              <a:t>定义</a:t>
+            </a:r>
+            <a:r>
+              <a:rPr lang="en-US" sz="1800" dirty="0" err="1">
+                <a:latin typeface="微软雅黑" panose="020B0503020204020204" pitchFamily="34" charset="-122"/>
+                <a:ea typeface="微软雅黑" panose="020B0503020204020204" pitchFamily="34" charset="-122"/>
+              </a:rPr>
+              <a:t>datetime_field</a:t>
+            </a:r>
+            <a:r>
+              <a:rPr lang="zh-CN" altLang="en-US" sz="1800" dirty="0">
+                <a:latin typeface="微软雅黑" panose="020B0503020204020204" pitchFamily="34" charset="-122"/>
+                <a:ea typeface="微软雅黑" panose="020B0503020204020204" pitchFamily="34" charset="-122"/>
+              </a:rPr>
+              <a:t>为“</a:t>
+            </a:r>
+            <a:r>
+              <a:rPr lang="en-US" altLang="zh-CN" sz="1800" dirty="0">
+                <a:latin typeface="微软雅黑" panose="020B0503020204020204" pitchFamily="34" charset="-122"/>
+                <a:ea typeface="微软雅黑" panose="020B0503020204020204" pitchFamily="34" charset="-122"/>
+              </a:rPr>
+              <a:t>time”</a:t>
+            </a:r>
+          </a:p>
+          <a:p>
+            <a:pPr lvl="1">
+              <a:buFont typeface="Wingdings" panose="05000000000000000000" pitchFamily="2" charset="2"/>
+              <a:buChar char="Ø"/>
+            </a:pPr>
+            <a:r>
+              <a:rPr lang="zh-CN" altLang="en-US" sz="1800" dirty="0">
+                <a:latin typeface="微软雅黑" panose="020B0503020204020204" pitchFamily="34" charset="-122"/>
+                <a:ea typeface="微软雅黑" panose="020B0503020204020204" pitchFamily="34" charset="-122"/>
+              </a:rPr>
+              <a:t>数据频率假定为</a:t>
+            </a:r>
+            <a:r>
+              <a:rPr lang="en-US" altLang="zh-CN" sz="1800" dirty="0">
+                <a:latin typeface="微软雅黑" panose="020B0503020204020204" pitchFamily="34" charset="-122"/>
+                <a:ea typeface="微软雅黑" panose="020B0503020204020204" pitchFamily="34" charset="-122"/>
+              </a:rPr>
+              <a:t>daily</a:t>
+            </a:r>
+          </a:p>
+          <a:p>
+            <a:pPr lvl="1">
+              <a:buFont typeface="Wingdings" panose="05000000000000000000" pitchFamily="2" charset="2"/>
+              <a:buChar char="Ø"/>
+            </a:pPr>
+            <a:r>
+              <a:rPr lang="zh-CN" altLang="en-US" sz="1800" dirty="0">
+                <a:latin typeface="微软雅黑" panose="020B0503020204020204" pitchFamily="34" charset="-122"/>
+                <a:ea typeface="微软雅黑" panose="020B0503020204020204" pitchFamily="34" charset="-122"/>
+              </a:rPr>
+              <a:t>优先级设为最高</a:t>
+            </a:r>
+            <a:endParaRPr lang="en-US" altLang="zh-CN" sz="1800" dirty="0">
+              <a:latin typeface="微软雅黑" panose="020B0503020204020204" pitchFamily="34" charset="-122"/>
+              <a:ea typeface="微软雅黑" panose="020B0503020204020204" pitchFamily="34" charset="-122"/>
+            </a:endParaRPr>
+          </a:p>
+          <a:p>
+            <a:pPr lvl="1">
+              <a:buFont typeface="Wingdings" panose="05000000000000000000" pitchFamily="2" charset="2"/>
+              <a:buChar char="Ø"/>
+            </a:pPr>
+            <a:r>
+              <a:rPr lang="en-US" altLang="zh-CN" sz="1800" dirty="0" err="1">
+                <a:latin typeface="微软雅黑" panose="020B0503020204020204" pitchFamily="34" charset="-122"/>
+                <a:ea typeface="微软雅黑" panose="020B0503020204020204" pitchFamily="34" charset="-122"/>
+              </a:rPr>
+              <a:t>update_list</a:t>
+            </a:r>
+            <a:r>
+              <a:rPr lang="zh-CN" altLang="en-US" sz="1800" dirty="0">
+                <a:latin typeface="微软雅黑" panose="020B0503020204020204" pitchFamily="34" charset="-122"/>
+                <a:ea typeface="微软雅黑" panose="020B0503020204020204" pitchFamily="34" charset="-122"/>
+              </a:rPr>
+              <a:t>取固定的三个值</a:t>
+            </a:r>
+            <a:endParaRPr lang="en-US" altLang="zh-CN" sz="1800" dirty="0">
+              <a:latin typeface="微软雅黑" panose="020B0503020204020204" pitchFamily="34" charset="-122"/>
+              <a:ea typeface="微软雅黑" panose="020B0503020204020204" pitchFamily="34" charset="-122"/>
+            </a:endParaRPr>
+          </a:p>
+          <a:p>
+            <a:r>
+              <a:rPr lang="zh-CN" altLang="en-US" sz="2000" dirty="0">
+                <a:latin typeface="微软雅黑" panose="020B0503020204020204" pitchFamily="34" charset="-122"/>
+                <a:ea typeface="微软雅黑" panose="020B0503020204020204" pitchFamily="34" charset="-122"/>
+              </a:rPr>
+              <a:t>打开主界面可以看到我们声明的数据</a:t>
+            </a:r>
+            <a:endParaRPr lang="en-US" altLang="zh-CN" sz="2000" dirty="0">
+              <a:latin typeface="微软雅黑" panose="020B0503020204020204" pitchFamily="34" charset="-122"/>
+              <a:ea typeface="微软雅黑" panose="020B0503020204020204" pitchFamily="34" charset="-122"/>
+            </a:endParaRPr>
+          </a:p>
+          <a:p>
+            <a:pPr lvl="1">
+              <a:buFont typeface="Wingdings" panose="05000000000000000000" pitchFamily="2" charset="2"/>
+              <a:buChar char="Ø"/>
+            </a:pPr>
+            <a:r>
+              <a:rPr lang="zh-CN" altLang="en-US" sz="1800" dirty="0">
+                <a:latin typeface="微软雅黑" panose="020B0503020204020204" pitchFamily="34" charset="-122"/>
+                <a:ea typeface="微软雅黑" panose="020B0503020204020204" pitchFamily="34" charset="-122"/>
+              </a:rPr>
+              <a:t>点击进入可以看到子项目</a:t>
+            </a:r>
+            <a:endParaRPr lang="en-US" altLang="zh-CN" sz="1800" dirty="0">
+              <a:latin typeface="微软雅黑" panose="020B0503020204020204" pitchFamily="34" charset="-122"/>
+              <a:ea typeface="微软雅黑" panose="020B0503020204020204" pitchFamily="34" charset="-122"/>
+            </a:endParaRPr>
+          </a:p>
+        </p:txBody>
+      </p:sp>
+      <p:grpSp>
+        <p:nvGrpSpPr>
+          <p:cNvPr id="12" name="Group 11">
+            <a:extLst>
+              <a:ext uri="{FF2B5EF4-FFF2-40B4-BE49-F238E27FC236}">
+                <a16:creationId xmlns:a16="http://schemas.microsoft.com/office/drawing/2014/main" id="{828A5161-06F1-46CF-8AD7-844680A59E13}"/>
+              </a:ext>
+              <a:ext uri="{C183D7F6-B498-43B3-948B-1728B52AA6E4}">
+                <adec:decorative xmlns:adec="http://schemas.microsoft.com/office/drawing/2017/decorative" val="1"/>
+              </a:ext>
+            </a:extLst>
+          </p:cNvPr>
+          <p:cNvGrpSpPr>
+            <a:grpSpLocks noGrp="1" noUngrp="1" noRot="1" noChangeAspect="1" noMove="1" noResize="1"/>
+          </p:cNvGrpSpPr>
+          <p:nvPr>
+            <p:extLst>
+              <p:ext uri="{386F3935-93C4-4BCD-93E2-E3B085C9AB24}">
+                <p16:designElem xmlns:p16="http://schemas.microsoft.com/office/powerpoint/2015/main" val="1"/>
+              </p:ext>
+            </p:extLst>
+          </p:nvPr>
+        </p:nvGrpSpPr>
+        <p:grpSpPr>
+          <a:xfrm>
+            <a:off x="0" y="4601497"/>
+            <a:ext cx="1014060" cy="2017580"/>
+            <a:chOff x="0" y="4601497"/>
+            <a:chExt cx="1014060" cy="2017580"/>
+          </a:xfrm>
+        </p:grpSpPr>
+        <p:sp>
+          <p:nvSpPr>
+            <p:cNvPr id="13" name="Isosceles Triangle 12">
+              <a:extLst>
+                <a:ext uri="{FF2B5EF4-FFF2-40B4-BE49-F238E27FC236}">
+                  <a16:creationId xmlns:a16="http://schemas.microsoft.com/office/drawing/2014/main" id="{D3F51FEB-38FB-4F6C-9F7B-2F2AFAB65463}"/>
+                </a:ext>
+                <a:ext uri="{C183D7F6-B498-43B3-948B-1728B52AA6E4}">
+                  <adec:decorative xmlns:adec="http://schemas.microsoft.com/office/drawing/2017/decorative" val="1"/>
+                </a:ext>
+              </a:extLst>
+            </p:cNvPr>
+            <p:cNvSpPr/>
+            <p:nvPr>
+              <p:extLst>
+                <p:ext uri="{386F3935-93C4-4BCD-93E2-E3B085C9AB24}">
+                  <p16:designElem xmlns:p16="http://schemas.microsoft.com/office/powerpoint/2015/main" val="1"/>
+                </p:ext>
+              </p:extLst>
+            </p:nvPr>
+          </p:nvSpPr>
+          <p:spPr>
+            <a:xfrm rot="5400000">
+              <a:off x="-501760" y="5103257"/>
+              <a:ext cx="2017580" cy="1014060"/>
+            </a:xfrm>
+            <a:prstGeom prst="triangle">
+              <a:avLst>
+                <a:gd name="adj" fmla="val 50000"/>
+              </a:avLst>
+            </a:prstGeom>
+            <a:solidFill>
+              <a:schemeClr val="accent1">
+                <a:alpha val="30000"/>
+              </a:schemeClr>
+            </a:solidFill>
+            <a:ln>
+              <a:noFill/>
+            </a:ln>
+          </p:spPr>
+          <p:style>
+            <a:lnRef idx="2">
+              <a:schemeClr val="accent1">
+                <a:shade val="50000"/>
+              </a:schemeClr>
+            </a:lnRef>
+            <a:fillRef idx="1">
+              <a:schemeClr val="accent1"/>
+            </a:fillRef>
+            <a:effectRef idx="0">
+              <a:schemeClr val="accent1"/>
+            </a:effectRef>
+            <a:fontRef idx="minor">
+              <a:schemeClr val="lt1"/>
+            </a:fontRef>
+          </p:style>
+          <p:txBody>
+            <a:bodyPr rtlCol="0" anchor="ctr"/>
+            <a:lstStyle/>
+            <a:p>
+              <a:pPr algn="ctr"/>
+              <a:endParaRPr lang="en-US"/>
+            </a:p>
+          </p:txBody>
+        </p:sp>
+        <p:sp>
+          <p:nvSpPr>
+            <p:cNvPr id="14" name="Rectangle 13">
+              <a:extLst>
+                <a:ext uri="{FF2B5EF4-FFF2-40B4-BE49-F238E27FC236}">
+                  <a16:creationId xmlns:a16="http://schemas.microsoft.com/office/drawing/2014/main" id="{1E547BA6-BAE0-43BB-A7CA-60F69CE252F0}"/>
+                </a:ext>
+                <a:ext uri="{C183D7F6-B498-43B3-948B-1728B52AA6E4}">
+                  <adec:decorative xmlns:adec="http://schemas.microsoft.com/office/drawing/2017/decorative" val="1"/>
+                </a:ext>
+              </a:extLst>
+            </p:cNvPr>
+            <p:cNvSpPr/>
+            <p:nvPr>
+              <p:extLst>
+                <p:ext uri="{386F3935-93C4-4BCD-93E2-E3B085C9AB24}">
+                  <p16:designElem xmlns:p16="http://schemas.microsoft.com/office/powerpoint/2015/main" val="1"/>
+                </p:ext>
+              </p:extLst>
+            </p:nvPr>
+          </p:nvSpPr>
+          <p:spPr>
+            <a:xfrm rot="2700000">
+              <a:off x="427916" y="5728708"/>
+              <a:ext cx="485578" cy="485578"/>
+            </a:xfrm>
+            <a:prstGeom prst="rect">
+              <a:avLst/>
+            </a:prstGeom>
+            <a:solidFill>
+              <a:schemeClr val="accent1">
+                <a:alpha val="30000"/>
+              </a:schemeClr>
+            </a:solidFill>
+            <a:ln>
+              <a:noFill/>
+            </a:ln>
+          </p:spPr>
+          <p:style>
+            <a:lnRef idx="2">
+              <a:schemeClr val="accent1">
+                <a:shade val="50000"/>
+              </a:schemeClr>
+            </a:lnRef>
+            <a:fillRef idx="1">
+              <a:schemeClr val="accent1"/>
+            </a:fillRef>
+            <a:effectRef idx="0">
+              <a:schemeClr val="accent1"/>
+            </a:effectRef>
+            <a:fontRef idx="minor">
+              <a:schemeClr val="lt1"/>
+            </a:fontRef>
+          </p:style>
+          <p:txBody>
+            <a:bodyPr rtlCol="0" anchor="ctr"/>
+            <a:lstStyle/>
+            <a:p>
+              <a:pPr algn="ctr"/>
+              <a:endParaRPr lang="en-US"/>
+            </a:p>
+          </p:txBody>
+        </p:sp>
+      </p:grpSp>
+      <p:grpSp>
+        <p:nvGrpSpPr>
+          <p:cNvPr id="16" name="Group 15">
+            <a:extLst>
+              <a:ext uri="{FF2B5EF4-FFF2-40B4-BE49-F238E27FC236}">
+                <a16:creationId xmlns:a16="http://schemas.microsoft.com/office/drawing/2014/main" id="{5995D10D-E9C9-47DB-AE7E-801FEF38F5C9}"/>
+              </a:ext>
+              <a:ext uri="{C183D7F6-B498-43B3-948B-1728B52AA6E4}">
+                <adec:decorative xmlns:adec="http://schemas.microsoft.com/office/drawing/2017/decorative" val="1"/>
+              </a:ext>
+            </a:extLst>
+          </p:cNvPr>
+          <p:cNvGrpSpPr>
+            <a:grpSpLocks noGrp="1" noUngrp="1" noRot="1" noChangeAspect="1" noMove="1" noResize="1"/>
+          </p:cNvGrpSpPr>
+          <p:nvPr>
+            <p:extLst>
+              <p:ext uri="{386F3935-93C4-4BCD-93E2-E3B085C9AB24}">
+                <p16:designElem xmlns:p16="http://schemas.microsoft.com/office/powerpoint/2015/main" val="1"/>
+              </p:ext>
+            </p:extLst>
+          </p:nvPr>
+        </p:nvGrpSpPr>
+        <p:grpSpPr>
+          <a:xfrm>
+            <a:off x="11219290" y="1"/>
+            <a:ext cx="972709" cy="1935307"/>
+            <a:chOff x="10918968" y="713127"/>
+            <a:chExt cx="1273032" cy="2532832"/>
+          </a:xfrm>
+        </p:grpSpPr>
+        <p:sp>
+          <p:nvSpPr>
+            <p:cNvPr id="17" name="Rectangle 16">
+              <a:extLst>
+                <a:ext uri="{FF2B5EF4-FFF2-40B4-BE49-F238E27FC236}">
+                  <a16:creationId xmlns:a16="http://schemas.microsoft.com/office/drawing/2014/main" id="{CC1A72C6-3DE4-4EC3-9AD5-9E0D40D8CE8A}"/>
+                </a:ext>
+                <a:ext uri="{C183D7F6-B498-43B3-948B-1728B52AA6E4}">
+                  <adec:decorative xmlns:adec="http://schemas.microsoft.com/office/drawing/2017/decorative" val="1"/>
+                </a:ext>
+              </a:extLst>
+            </p:cNvPr>
+            <p:cNvSpPr/>
+            <p:nvPr>
+              <p:extLst>
+                <p:ext uri="{386F3935-93C4-4BCD-93E2-E3B085C9AB24}">
+                  <p16:designElem xmlns:p16="http://schemas.microsoft.com/office/powerpoint/2015/main" val="1"/>
+                </p:ext>
+              </p:extLst>
+            </p:nvPr>
+          </p:nvSpPr>
+          <p:spPr>
+            <a:xfrm rot="2700000">
+              <a:off x="11052629" y="2120024"/>
+              <a:ext cx="645368" cy="645368"/>
+            </a:xfrm>
+            <a:prstGeom prst="rect">
+              <a:avLst/>
+            </a:prstGeom>
+            <a:solidFill>
+              <a:schemeClr val="accent4">
+                <a:alpha val="30000"/>
+              </a:schemeClr>
+            </a:solidFill>
+            <a:ln>
+              <a:noFill/>
+            </a:ln>
+          </p:spPr>
+          <p:style>
+            <a:lnRef idx="2">
+              <a:schemeClr val="accent1">
+                <a:shade val="50000"/>
+              </a:schemeClr>
+            </a:lnRef>
+            <a:fillRef idx="1">
+              <a:schemeClr val="accent1"/>
+            </a:fillRef>
+            <a:effectRef idx="0">
+              <a:schemeClr val="accent1"/>
+            </a:effectRef>
+            <a:fontRef idx="minor">
+              <a:schemeClr val="lt1"/>
+            </a:fontRef>
+          </p:style>
+          <p:txBody>
+            <a:bodyPr rtlCol="0" anchor="ctr"/>
+            <a:lstStyle/>
+            <a:p>
+              <a:pPr algn="ctr"/>
+              <a:endParaRPr lang="en-US"/>
+            </a:p>
+          </p:txBody>
+        </p:sp>
+        <p:sp>
+          <p:nvSpPr>
+            <p:cNvPr id="18" name="Isosceles Triangle 17">
+              <a:extLst>
+                <a:ext uri="{FF2B5EF4-FFF2-40B4-BE49-F238E27FC236}">
+                  <a16:creationId xmlns:a16="http://schemas.microsoft.com/office/drawing/2014/main" id="{0B0DA1F1-C391-4EDF-9FE0-23E86E137765}"/>
+                </a:ext>
+                <a:ext uri="{C183D7F6-B498-43B3-948B-1728B52AA6E4}">
+                  <adec:decorative xmlns:adec="http://schemas.microsoft.com/office/drawing/2017/decorative" val="1"/>
+                </a:ext>
+              </a:extLst>
+            </p:cNvPr>
+            <p:cNvSpPr/>
+            <p:nvPr>
+              <p:extLst>
+                <p:ext uri="{386F3935-93C4-4BCD-93E2-E3B085C9AB24}">
+                  <p16:designElem xmlns:p16="http://schemas.microsoft.com/office/powerpoint/2015/main" val="1"/>
+                </p:ext>
+              </p:extLst>
+            </p:nvPr>
+          </p:nvSpPr>
+          <p:spPr>
+            <a:xfrm rot="16200000">
+              <a:off x="10289068" y="1343027"/>
+              <a:ext cx="2532832" cy="1273032"/>
+            </a:xfrm>
+            <a:prstGeom prst="triangle">
+              <a:avLst>
+                <a:gd name="adj" fmla="val 50000"/>
+              </a:avLst>
+            </a:prstGeom>
+            <a:solidFill>
+              <a:schemeClr val="accent4">
+                <a:alpha val="30000"/>
+              </a:schemeClr>
+            </a:solidFill>
+            <a:ln>
+              <a:noFill/>
+            </a:ln>
+          </p:spPr>
+          <p:style>
+            <a:lnRef idx="2">
+              <a:schemeClr val="accent1">
+                <a:shade val="50000"/>
+              </a:schemeClr>
+            </a:lnRef>
+            <a:fillRef idx="1">
+              <a:schemeClr val="accent1"/>
+            </a:fillRef>
+            <a:effectRef idx="0">
+              <a:schemeClr val="accent1"/>
+            </a:effectRef>
+            <a:fontRef idx="minor">
+              <a:schemeClr val="lt1"/>
+            </a:fontRef>
+          </p:style>
+          <p:txBody>
+            <a:bodyPr rtlCol="0" anchor="ctr"/>
+            <a:lstStyle/>
+            <a:p>
+              <a:pPr algn="ctr"/>
+              <a:endParaRPr lang="en-US" dirty="0"/>
+            </a:p>
+          </p:txBody>
+        </p:sp>
+      </p:grpSp>
+      <p:pic>
+        <p:nvPicPr>
+          <p:cNvPr id="9" name="Picture 8">
+            <a:extLst>
+              <a:ext uri="{FF2B5EF4-FFF2-40B4-BE49-F238E27FC236}">
+                <a16:creationId xmlns:a16="http://schemas.microsoft.com/office/drawing/2014/main" id="{3877CABD-4AB5-4180-BE69-9ECEE6C8C6E8}"/>
+              </a:ext>
+            </a:extLst>
+          </p:cNvPr>
+          <p:cNvPicPr>
+            <a:picLocks noChangeAspect="1"/>
+          </p:cNvPicPr>
+          <p:nvPr/>
+        </p:nvPicPr>
+        <p:blipFill>
+          <a:blip r:embed="rId2"/>
+          <a:stretch>
+            <a:fillRect/>
+          </a:stretch>
+        </p:blipFill>
+        <p:spPr>
+          <a:xfrm>
+            <a:off x="7246781" y="1175898"/>
+            <a:ext cx="4669885" cy="2821082"/>
+          </a:xfrm>
+          <a:prstGeom prst="rect">
+            <a:avLst/>
+          </a:prstGeom>
+        </p:spPr>
+      </p:pic>
+      <p:pic>
+        <p:nvPicPr>
+          <p:cNvPr id="11" name="Picture 10">
+            <a:extLst>
+              <a:ext uri="{FF2B5EF4-FFF2-40B4-BE49-F238E27FC236}">
+                <a16:creationId xmlns:a16="http://schemas.microsoft.com/office/drawing/2014/main" id="{252BCD53-4D5A-4C9D-B04E-C951F6DB09D0}"/>
+              </a:ext>
+            </a:extLst>
+          </p:cNvPr>
+          <p:cNvPicPr>
+            <a:picLocks noChangeAspect="1"/>
+          </p:cNvPicPr>
+          <p:nvPr/>
+        </p:nvPicPr>
+        <p:blipFill>
+          <a:blip r:embed="rId3"/>
+          <a:stretch>
+            <a:fillRect/>
+          </a:stretch>
+        </p:blipFill>
+        <p:spPr>
+          <a:xfrm>
+            <a:off x="5919328" y="4307097"/>
+            <a:ext cx="6003385" cy="1840097"/>
+          </a:xfrm>
+          <a:prstGeom prst="rect">
+            <a:avLst/>
+          </a:prstGeom>
+        </p:spPr>
+      </p:pic>
+    </p:spTree>
+    <p:extLst>
+      <p:ext uri="{BB962C8B-B14F-4D97-AF65-F5344CB8AC3E}">
+        <p14:creationId xmlns:p14="http://schemas.microsoft.com/office/powerpoint/2010/main" val="1720438152"/>
+      </p:ext>
+    </p:extLst>
+  </p:cSld>
+  <p:clrMapOvr>
+    <a:masterClrMapping/>
+  </p:clrMapOvr>
+</p:sld>
+</file>
+
+<file path=ppt/slides/slide7.xml><?xml version="1.0" encoding="utf-8"?>
+<p:sld xmlns:a="http://schemas.openxmlformats.org/drawingml/2006/main" xmlns:r="http://schemas.openxmlformats.org/officeDocument/2006/relationships" xmlns:p="http://schemas.openxmlformats.org/presentationml/2006/main">
+  <p:cSld>
+    <p:bg>
+      <p:bgPr>
+        <a:solidFill>
+          <a:schemeClr val="bg1"/>
+        </a:solidFill>
+        <a:effectLst/>
+      </p:bgPr>
+    </p:bg>
+    <p:spTree>
+      <p:nvGrpSpPr>
+        <p:cNvPr id="1" name=""/>
+        <p:cNvGrpSpPr/>
+        <p:nvPr/>
+      </p:nvGrpSpPr>
+      <p:grpSpPr>
+        <a:xfrm>
+          <a:off x="0" y="0"/>
+          <a:ext cx="0" cy="0"/>
+          <a:chOff x="0" y="0"/>
+          <a:chExt cx="0" cy="0"/>
+        </a:xfrm>
+      </p:grpSpPr>
+      <p:sp>
+        <p:nvSpPr>
+          <p:cNvPr id="10" name="Rectangle 9">
+            <a:extLst>
+              <a:ext uri="{FF2B5EF4-FFF2-40B4-BE49-F238E27FC236}">
+                <a16:creationId xmlns:a16="http://schemas.microsoft.com/office/drawing/2014/main" id="{2B566528-1B12-4246-9431-5C2D7D081168}"/>
+              </a:ext>
+              <a:ext uri="{C183D7F6-B498-43B3-948B-1728B52AA6E4}">
+                <adec:decorative xmlns:adec="http://schemas.microsoft.com/office/drawing/2017/decorative" val="1"/>
+              </a:ext>
+            </a:extLst>
+          </p:cNvPr>
+          <p:cNvSpPr>
+            <a:spLocks noGrp="1" noRot="1" noChangeAspect="1" noMove="1" noResize="1" noEditPoints="1" noAdjustHandles="1" noChangeArrowheads="1" noChangeShapeType="1" noTextEdit="1"/>
+          </p:cNvSpPr>
+          <p:nvPr>
+            <p:extLst>
+              <p:ext uri="{386F3935-93C4-4BCD-93E2-E3B085C9AB24}">
+                <p16:designElem xmlns:p16="http://schemas.microsoft.com/office/powerpoint/2015/main" val="1"/>
+              </p:ext>
+            </p:extLst>
+          </p:nvPr>
+        </p:nvSpPr>
+        <p:spPr>
+          <a:xfrm>
+            <a:off x="0" y="0"/>
+            <a:ext cx="12192000" cy="6858000"/>
+          </a:xfrm>
+          <a:prstGeom prst="rect">
+            <a:avLst/>
+          </a:prstGeom>
+          <a:solidFill>
+            <a:schemeClr val="bg1"/>
+          </a:solidFill>
+          <a:ln>
+            <a:noFill/>
+          </a:ln>
+        </p:spPr>
+        <p:style>
+          <a:lnRef idx="2">
+            <a:schemeClr val="accent1">
+              <a:shade val="50000"/>
+            </a:schemeClr>
+          </a:lnRef>
+          <a:fillRef idx="1">
+            <a:schemeClr val="accent1"/>
+          </a:fillRef>
+          <a:effectRef idx="0">
+            <a:schemeClr val="accent1"/>
+          </a:effectRef>
+          <a:fontRef idx="minor">
+            <a:schemeClr val="lt1"/>
+          </a:fontRef>
+        </p:style>
+        <p:txBody>
+          <a:bodyPr rtlCol="0" anchor="ctr"/>
+          <a:lstStyle/>
+          <a:p>
+            <a:pPr algn="ctr"/>
+            <a:endParaRPr lang="en-US" dirty="0"/>
+          </a:p>
+        </p:txBody>
+      </p:sp>
+      <p:sp>
+        <p:nvSpPr>
+          <p:cNvPr id="2" name="Title 1">
+            <a:extLst>
+              <a:ext uri="{FF2B5EF4-FFF2-40B4-BE49-F238E27FC236}">
+                <a16:creationId xmlns:a16="http://schemas.microsoft.com/office/drawing/2014/main" id="{B4323D46-F7B6-4C96-9C24-8EFB4BF94BAA}"/>
+              </a:ext>
+            </a:extLst>
+          </p:cNvPr>
+          <p:cNvSpPr>
+            <a:spLocks noGrp="1"/>
+          </p:cNvSpPr>
+          <p:nvPr>
+            <p:ph type="title"/>
+          </p:nvPr>
+        </p:nvSpPr>
+        <p:spPr>
+          <a:xfrm>
+            <a:off x="643467" y="321734"/>
+            <a:ext cx="6901193" cy="1135737"/>
+          </a:xfrm>
+        </p:spPr>
+        <p:txBody>
+          <a:bodyPr>
+            <a:normAutofit/>
+          </a:bodyPr>
+          <a:lstStyle/>
+          <a:p>
+            <a:r>
+              <a:rPr lang="en-US" sz="3600" dirty="0">
+                <a:latin typeface="微软雅黑" panose="020B0503020204020204" pitchFamily="34" charset="-122"/>
+                <a:ea typeface="微软雅黑" panose="020B0503020204020204" pitchFamily="34" charset="-122"/>
+              </a:rPr>
+              <a:t>Example – Add Collector</a:t>
+            </a:r>
+          </a:p>
+        </p:txBody>
+      </p:sp>
+      <p:grpSp>
+        <p:nvGrpSpPr>
+          <p:cNvPr id="12" name="Group 11">
+            <a:extLst>
+              <a:ext uri="{FF2B5EF4-FFF2-40B4-BE49-F238E27FC236}">
+                <a16:creationId xmlns:a16="http://schemas.microsoft.com/office/drawing/2014/main" id="{912209CB-3E4C-43AE-B507-08269FAE89F5}"/>
+              </a:ext>
+              <a:ext uri="{C183D7F6-B498-43B3-948B-1728B52AA6E4}">
+                <adec:decorative xmlns:adec="http://schemas.microsoft.com/office/drawing/2017/decorative" val="1"/>
+              </a:ext>
+            </a:extLst>
+          </p:cNvPr>
+          <p:cNvGrpSpPr>
+            <a:grpSpLocks noGrp="1" noUngrp="1" noRot="1" noChangeAspect="1" noMove="1" noResize="1"/>
+          </p:cNvGrpSpPr>
+          <p:nvPr>
+            <p:extLst>
+              <p:ext uri="{386F3935-93C4-4BCD-93E2-E3B085C9AB24}">
+                <p16:designElem xmlns:p16="http://schemas.microsoft.com/office/powerpoint/2015/main" val="1"/>
+              </p:ext>
+            </p:extLst>
+          </p:nvPr>
+        </p:nvGrpSpPr>
+        <p:grpSpPr>
+          <a:xfrm>
+            <a:off x="11094720" y="0"/>
+            <a:ext cx="1097280" cy="1097280"/>
+            <a:chOff x="11094720" y="0"/>
+            <a:chExt cx="1097280" cy="1097280"/>
+          </a:xfrm>
+        </p:grpSpPr>
+        <p:sp>
+          <p:nvSpPr>
+            <p:cNvPr id="13" name="Isosceles Triangle 12">
+              <a:extLst>
+                <a:ext uri="{FF2B5EF4-FFF2-40B4-BE49-F238E27FC236}">
+                  <a16:creationId xmlns:a16="http://schemas.microsoft.com/office/drawing/2014/main" id="{A580F890-B085-4E95-96AA-55AEBEC5CE6E}"/>
+                </a:ext>
+                <a:ext uri="{C183D7F6-B498-43B3-948B-1728B52AA6E4}">
+                  <adec:decorative xmlns:adec="http://schemas.microsoft.com/office/drawing/2017/decorative" val="1"/>
+                </a:ext>
+              </a:extLst>
+            </p:cNvPr>
+            <p:cNvSpPr/>
+            <p:nvPr>
+              <p:extLst>
+                <p:ext uri="{386F3935-93C4-4BCD-93E2-E3B085C9AB24}">
+                  <p16:designElem xmlns:p16="http://schemas.microsoft.com/office/powerpoint/2015/main" val="1"/>
+                </p:ext>
+              </p:extLst>
+            </p:nvPr>
+          </p:nvSpPr>
+          <p:spPr>
+            <a:xfrm rot="16200000">
+              <a:off x="11094720" y="0"/>
+              <a:ext cx="1097280" cy="1097280"/>
+            </a:xfrm>
+            <a:prstGeom prst="triangle">
+              <a:avLst>
+                <a:gd name="adj" fmla="val 100000"/>
+              </a:avLst>
+            </a:prstGeom>
+            <a:solidFill>
+              <a:schemeClr val="accent4">
+                <a:alpha val="30000"/>
+              </a:schemeClr>
+            </a:solidFill>
+            <a:ln>
+              <a:noFill/>
+            </a:ln>
+          </p:spPr>
+          <p:style>
+            <a:lnRef idx="2">
+              <a:schemeClr val="accent1">
+                <a:shade val="50000"/>
+              </a:schemeClr>
+            </a:lnRef>
+            <a:fillRef idx="1">
+              <a:schemeClr val="accent1"/>
+            </a:fillRef>
+            <a:effectRef idx="0">
+              <a:schemeClr val="accent1"/>
+            </a:effectRef>
+            <a:fontRef idx="minor">
+              <a:schemeClr val="lt1"/>
+            </a:fontRef>
+          </p:style>
+          <p:txBody>
+            <a:bodyPr rtlCol="0" anchor="ctr"/>
+            <a:lstStyle/>
+            <a:p>
+              <a:pPr algn="ctr"/>
+              <a:endParaRPr lang="en-US" dirty="0"/>
+            </a:p>
+          </p:txBody>
+        </p:sp>
+        <p:sp>
+          <p:nvSpPr>
+            <p:cNvPr id="14" name="Rectangle 13">
+              <a:extLst>
+                <a:ext uri="{FF2B5EF4-FFF2-40B4-BE49-F238E27FC236}">
+                  <a16:creationId xmlns:a16="http://schemas.microsoft.com/office/drawing/2014/main" id="{7BCB7912-FEA6-4C89-8E9B-D95EF15647EA}"/>
+                </a:ext>
+                <a:ext uri="{C183D7F6-B498-43B3-948B-1728B52AA6E4}">
+                  <adec:decorative xmlns:adec="http://schemas.microsoft.com/office/drawing/2017/decorative" val="1"/>
+                </a:ext>
+              </a:extLst>
+            </p:cNvPr>
+            <p:cNvSpPr/>
+            <p:nvPr>
+              <p:extLst>
+                <p:ext uri="{386F3935-93C4-4BCD-93E2-E3B085C9AB24}">
+                  <p16:designElem xmlns:p16="http://schemas.microsoft.com/office/powerpoint/2015/main" val="1"/>
+                </p:ext>
+              </p:extLst>
+            </p:nvPr>
+          </p:nvSpPr>
+          <p:spPr>
+            <a:xfrm rot="2700000">
+              <a:off x="11189552" y="127618"/>
+              <a:ext cx="457894" cy="457894"/>
+            </a:xfrm>
+            <a:prstGeom prst="rect">
+              <a:avLst/>
+            </a:prstGeom>
+            <a:solidFill>
+              <a:schemeClr val="accent4">
+                <a:alpha val="30000"/>
+              </a:schemeClr>
+            </a:solidFill>
+            <a:ln>
+              <a:noFill/>
+            </a:ln>
+          </p:spPr>
+          <p:style>
+            <a:lnRef idx="2">
+              <a:schemeClr val="accent1">
+                <a:shade val="50000"/>
+              </a:schemeClr>
+            </a:lnRef>
+            <a:fillRef idx="1">
+              <a:schemeClr val="accent1"/>
+            </a:fillRef>
+            <a:effectRef idx="0">
+              <a:schemeClr val="accent1"/>
+            </a:effectRef>
+            <a:fontRef idx="minor">
+              <a:schemeClr val="lt1"/>
+            </a:fontRef>
+          </p:style>
+          <p:txBody>
+            <a:bodyPr rtlCol="0" anchor="ctr"/>
+            <a:lstStyle/>
+            <a:p>
+              <a:pPr algn="ctr"/>
+              <a:endParaRPr lang="en-US"/>
+            </a:p>
+          </p:txBody>
+        </p:sp>
+      </p:grpSp>
+      <p:sp>
+        <p:nvSpPr>
+          <p:cNvPr id="3" name="Content Placeholder 2">
+            <a:extLst>
+              <a:ext uri="{FF2B5EF4-FFF2-40B4-BE49-F238E27FC236}">
+                <a16:creationId xmlns:a16="http://schemas.microsoft.com/office/drawing/2014/main" id="{63E3B140-4172-4DB0-B925-8738C98CF579}"/>
+              </a:ext>
+            </a:extLst>
+          </p:cNvPr>
+          <p:cNvSpPr>
+            <a:spLocks noGrp="1"/>
+          </p:cNvSpPr>
+          <p:nvPr>
+            <p:ph idx="1"/>
+          </p:nvPr>
+        </p:nvSpPr>
+        <p:spPr>
+          <a:xfrm>
+            <a:off x="643469" y="1782981"/>
+            <a:ext cx="5522218" cy="4393982"/>
+          </a:xfrm>
+        </p:spPr>
+        <p:txBody>
+          <a:bodyPr>
+            <a:normAutofit/>
+          </a:bodyPr>
+          <a:lstStyle/>
+          <a:p>
+            <a:r>
+              <a:rPr lang="zh-CN" altLang="en-US" sz="2000" dirty="0">
+                <a:latin typeface="微软雅黑" panose="020B0503020204020204" pitchFamily="34" charset="-122"/>
+                <a:ea typeface="微软雅黑" panose="020B0503020204020204" pitchFamily="34" charset="-122"/>
+              </a:rPr>
+              <a:t>在</a:t>
+            </a:r>
+            <a:r>
+              <a:rPr lang="en-US" altLang="zh-CN" sz="2000" dirty="0" err="1">
+                <a:latin typeface="微软雅黑" panose="020B0503020204020204" pitchFamily="34" charset="-122"/>
+                <a:ea typeface="微软雅黑" panose="020B0503020204020204" pitchFamily="34" charset="-122"/>
+              </a:rPr>
+              <a:t>StockAnalysisSystem</a:t>
+            </a:r>
+            <a:r>
+              <a:rPr lang="en-US" altLang="zh-CN" sz="2000" dirty="0">
+                <a:latin typeface="微软雅黑" panose="020B0503020204020204" pitchFamily="34" charset="-122"/>
+                <a:ea typeface="微软雅黑" panose="020B0503020204020204" pitchFamily="34" charset="-122"/>
+              </a:rPr>
+              <a:t>/plugin/Collector</a:t>
+            </a:r>
+            <a:r>
+              <a:rPr lang="zh-CN" altLang="en-US" sz="2000" dirty="0">
+                <a:latin typeface="微软雅黑" panose="020B0503020204020204" pitchFamily="34" charset="-122"/>
+                <a:ea typeface="微软雅黑" panose="020B0503020204020204" pitchFamily="34" charset="-122"/>
+              </a:rPr>
+              <a:t>下添加一个</a:t>
+            </a:r>
+            <a:r>
+              <a:rPr lang="en-US" altLang="zh-CN" sz="2000" dirty="0">
+                <a:latin typeface="微软雅黑" panose="020B0503020204020204" pitchFamily="34" charset="-122"/>
+                <a:ea typeface="微软雅黑" panose="020B0503020204020204" pitchFamily="34" charset="-122"/>
+              </a:rPr>
+              <a:t>python</a:t>
+            </a:r>
+            <a:r>
+              <a:rPr lang="zh-CN" altLang="en-US" sz="2000" dirty="0">
+                <a:latin typeface="微软雅黑" panose="020B0503020204020204" pitchFamily="34" charset="-122"/>
+                <a:ea typeface="微软雅黑" panose="020B0503020204020204" pitchFamily="34" charset="-122"/>
+              </a:rPr>
+              <a:t>文件</a:t>
+            </a:r>
+            <a:endParaRPr lang="en-US" altLang="zh-CN" sz="2000" dirty="0">
+              <a:latin typeface="微软雅黑" panose="020B0503020204020204" pitchFamily="34" charset="-122"/>
+              <a:ea typeface="微软雅黑" panose="020B0503020204020204" pitchFamily="34" charset="-122"/>
+            </a:endParaRPr>
+          </a:p>
+          <a:p>
+            <a:r>
+              <a:rPr lang="zh-CN" altLang="en-US" sz="2000" dirty="0">
+                <a:latin typeface="微软雅黑" panose="020B0503020204020204" pitchFamily="34" charset="-122"/>
+                <a:ea typeface="微软雅黑" panose="020B0503020204020204" pitchFamily="34" charset="-122"/>
+              </a:rPr>
+              <a:t>实现</a:t>
+            </a:r>
+            <a:r>
+              <a:rPr lang="en-US" altLang="zh-CN" sz="2000" dirty="0">
+                <a:latin typeface="微软雅黑" panose="020B0503020204020204" pitchFamily="34" charset="-122"/>
+                <a:ea typeface="微软雅黑" panose="020B0503020204020204" pitchFamily="34" charset="-122"/>
+              </a:rPr>
+              <a:t>plug-in</a:t>
+            </a:r>
+            <a:r>
+              <a:rPr lang="zh-CN" altLang="en-US" sz="2000" dirty="0">
+                <a:latin typeface="微软雅黑" panose="020B0503020204020204" pitchFamily="34" charset="-122"/>
+                <a:ea typeface="微软雅黑" panose="020B0503020204020204" pitchFamily="34" charset="-122"/>
+              </a:rPr>
+              <a:t>相关的函数（上图）</a:t>
+            </a:r>
+            <a:endParaRPr lang="en-US" altLang="zh-CN" sz="2000" dirty="0">
+              <a:latin typeface="微软雅黑" panose="020B0503020204020204" pitchFamily="34" charset="-122"/>
+              <a:ea typeface="微软雅黑" panose="020B0503020204020204" pitchFamily="34" charset="-122"/>
+            </a:endParaRPr>
+          </a:p>
+          <a:p>
+            <a:r>
+              <a:rPr lang="zh-CN" altLang="en-US" sz="2000" dirty="0">
+                <a:latin typeface="微软雅黑" panose="020B0503020204020204" pitchFamily="34" charset="-122"/>
+                <a:ea typeface="微软雅黑" panose="020B0503020204020204" pitchFamily="34" charset="-122"/>
+              </a:rPr>
+              <a:t>实现</a:t>
+            </a:r>
+            <a:r>
+              <a:rPr lang="en-US" altLang="zh-CN" sz="2000" dirty="0">
+                <a:latin typeface="微软雅黑" panose="020B0503020204020204" pitchFamily="34" charset="-122"/>
+                <a:ea typeface="微软雅黑" panose="020B0503020204020204" pitchFamily="34" charset="-122"/>
+              </a:rPr>
+              <a:t>Collector</a:t>
+            </a:r>
+            <a:r>
+              <a:rPr lang="zh-CN" altLang="en-US" sz="2000" dirty="0">
+                <a:latin typeface="微软雅黑" panose="020B0503020204020204" pitchFamily="34" charset="-122"/>
+                <a:ea typeface="微软雅黑" panose="020B0503020204020204" pitchFamily="34" charset="-122"/>
+              </a:rPr>
+              <a:t>相关的函数（下图），这里直接返回一个固定的</a:t>
+            </a:r>
+            <a:r>
+              <a:rPr lang="en-US" altLang="zh-CN" sz="2000" dirty="0" err="1">
+                <a:latin typeface="微软雅黑" panose="020B0503020204020204" pitchFamily="34" charset="-122"/>
+                <a:ea typeface="微软雅黑" panose="020B0503020204020204" pitchFamily="34" charset="-122"/>
+              </a:rPr>
+              <a:t>DataFrame</a:t>
+            </a:r>
+            <a:endParaRPr lang="en-US" altLang="zh-CN" sz="2000" dirty="0">
+              <a:latin typeface="微软雅黑" panose="020B0503020204020204" pitchFamily="34" charset="-122"/>
+              <a:ea typeface="微软雅黑" panose="020B0503020204020204" pitchFamily="34" charset="-122"/>
+            </a:endParaRPr>
+          </a:p>
+          <a:p>
+            <a:r>
+              <a:rPr lang="zh-CN" altLang="en-US" sz="2000" dirty="0">
+                <a:latin typeface="微软雅黑" panose="020B0503020204020204" pitchFamily="34" charset="-122"/>
+                <a:ea typeface="微软雅黑" panose="020B0503020204020204" pitchFamily="34" charset="-122"/>
+              </a:rPr>
+              <a:t>重新启动程序，在</a:t>
+            </a:r>
+            <a:r>
+              <a:rPr lang="en-US" altLang="zh-CN" sz="2000" dirty="0" err="1">
+                <a:latin typeface="微软雅黑" panose="020B0503020204020204" pitchFamily="34" charset="-122"/>
+                <a:ea typeface="微软雅黑" panose="020B0503020204020204" pitchFamily="34" charset="-122"/>
+              </a:rPr>
+              <a:t>Example.Collector</a:t>
+            </a:r>
+            <a:r>
+              <a:rPr lang="zh-CN" altLang="en-US" sz="2000" dirty="0">
+                <a:latin typeface="微软雅黑" panose="020B0503020204020204" pitchFamily="34" charset="-122"/>
+                <a:ea typeface="微软雅黑" panose="020B0503020204020204" pitchFamily="34" charset="-122"/>
+              </a:rPr>
+              <a:t>这一行中点击</a:t>
+            </a:r>
+            <a:r>
+              <a:rPr lang="en-US" altLang="zh-CN" sz="2000" dirty="0">
+                <a:latin typeface="微软雅黑" panose="020B0503020204020204" pitchFamily="34" charset="-122"/>
+                <a:ea typeface="微软雅黑" panose="020B0503020204020204" pitchFamily="34" charset="-122"/>
+              </a:rPr>
+              <a:t>Auto</a:t>
+            </a:r>
+            <a:r>
+              <a:rPr lang="zh-CN" altLang="en-US" sz="2000" dirty="0">
+                <a:latin typeface="微软雅黑" panose="020B0503020204020204" pitchFamily="34" charset="-122"/>
+                <a:ea typeface="微软雅黑" panose="020B0503020204020204" pitchFamily="34" charset="-122"/>
+              </a:rPr>
+              <a:t>（自动更新）</a:t>
+            </a:r>
+            <a:endParaRPr lang="en-US" altLang="zh-CN" sz="2000" dirty="0">
+              <a:latin typeface="微软雅黑" panose="020B0503020204020204" pitchFamily="34" charset="-122"/>
+              <a:ea typeface="微软雅黑" panose="020B0503020204020204" pitchFamily="34" charset="-122"/>
+            </a:endParaRPr>
+          </a:p>
+          <a:p>
+            <a:r>
+              <a:rPr lang="zh-CN" altLang="en-US" sz="2000" dirty="0">
+                <a:latin typeface="微软雅黑" panose="020B0503020204020204" pitchFamily="34" charset="-122"/>
+                <a:ea typeface="微软雅黑" panose="020B0503020204020204" pitchFamily="34" charset="-122"/>
+              </a:rPr>
+              <a:t>可以看到我们的数据已经存入了数据库，并且能够被查询（见下页。显示范围为更新时传入的参数而非实际范围，后面会改得更精确）</a:t>
+            </a:r>
+            <a:endParaRPr lang="en-US" sz="2000" dirty="0">
+              <a:latin typeface="微软雅黑" panose="020B0503020204020204" pitchFamily="34" charset="-122"/>
+              <a:ea typeface="微软雅黑" panose="020B0503020204020204" pitchFamily="34" charset="-122"/>
+            </a:endParaRPr>
+          </a:p>
+        </p:txBody>
+      </p:sp>
+      <p:pic>
+        <p:nvPicPr>
+          <p:cNvPr id="4" name="Picture 3">
+            <a:extLst>
+              <a:ext uri="{FF2B5EF4-FFF2-40B4-BE49-F238E27FC236}">
+                <a16:creationId xmlns:a16="http://schemas.microsoft.com/office/drawing/2014/main" id="{CE8FE1E9-5775-4A22-B547-2DCD97EA9C91}"/>
+              </a:ext>
+            </a:extLst>
+          </p:cNvPr>
+          <p:cNvPicPr>
+            <a:picLocks noChangeAspect="1"/>
+          </p:cNvPicPr>
+          <p:nvPr/>
+        </p:nvPicPr>
+        <p:blipFill>
+          <a:blip r:embed="rId4"/>
+          <a:stretch>
+            <a:fillRect/>
+          </a:stretch>
+        </p:blipFill>
+        <p:spPr>
+          <a:xfrm>
+            <a:off x="8402697" y="244262"/>
+            <a:ext cx="2603914" cy="2635439"/>
+          </a:xfrm>
+          <a:prstGeom prst="rect">
+            <a:avLst/>
+          </a:prstGeom>
+        </p:spPr>
+      </p:pic>
+      <p:sp>
+        <p:nvSpPr>
+          <p:cNvPr id="16" name="Isosceles Triangle 15">
+            <a:extLst>
+              <a:ext uri="{FF2B5EF4-FFF2-40B4-BE49-F238E27FC236}">
+                <a16:creationId xmlns:a16="http://schemas.microsoft.com/office/drawing/2014/main" id="{D3F51FEB-38FB-4F6C-9F7B-2F2AFAB65463}"/>
+              </a:ext>
+              <a:ext uri="{C183D7F6-B498-43B3-948B-1728B52AA6E4}">
+                <adec:decorative xmlns:adec="http://schemas.microsoft.com/office/drawing/2017/decorative" val="1"/>
+              </a:ext>
+            </a:extLst>
+          </p:cNvPr>
+          <p:cNvSpPr>
+            <a:spLocks noGrp="1" noRot="1" noChangeAspect="1" noMove="1" noResize="1" noEditPoints="1" noAdjustHandles="1" noChangeArrowheads="1" noChangeShapeType="1" noTextEdit="1"/>
+          </p:cNvSpPr>
+          <p:nvPr>
+            <p:extLst>
+              <p:ext uri="{386F3935-93C4-4BCD-93E2-E3B085C9AB24}">
+                <p16:designElem xmlns:p16="http://schemas.microsoft.com/office/powerpoint/2015/main" val="1"/>
+              </p:ext>
+            </p:extLst>
+          </p:nvPr>
+        </p:nvSpPr>
+        <p:spPr>
+          <a:xfrm rot="5400000">
+            <a:off x="-501760" y="5103257"/>
+            <a:ext cx="2017580" cy="1014060"/>
+          </a:xfrm>
+          <a:prstGeom prst="triangle">
+            <a:avLst>
+              <a:gd name="adj" fmla="val 50000"/>
+            </a:avLst>
+          </a:prstGeom>
+          <a:solidFill>
+            <a:schemeClr val="accent1">
+              <a:alpha val="30000"/>
+            </a:schemeClr>
+          </a:solidFill>
+          <a:ln>
+            <a:noFill/>
+          </a:ln>
+        </p:spPr>
+        <p:style>
+          <a:lnRef idx="2">
+            <a:schemeClr val="accent1">
+              <a:shade val="50000"/>
+            </a:schemeClr>
+          </a:lnRef>
+          <a:fillRef idx="1">
+            <a:schemeClr val="accent1"/>
+          </a:fillRef>
+          <a:effectRef idx="0">
+            <a:schemeClr val="accent1"/>
+          </a:effectRef>
+          <a:fontRef idx="minor">
+            <a:schemeClr val="lt1"/>
+          </a:fontRef>
+        </p:style>
+        <p:txBody>
+          <a:bodyPr rtlCol="0" anchor="ctr"/>
+          <a:lstStyle/>
+          <a:p>
+            <a:pPr algn="ctr"/>
+            <a:endParaRPr lang="en-US"/>
+          </a:p>
+        </p:txBody>
+      </p:sp>
+      <p:sp>
+        <p:nvSpPr>
+          <p:cNvPr id="18" name="Rectangle 17">
+            <a:extLst>
+              <a:ext uri="{FF2B5EF4-FFF2-40B4-BE49-F238E27FC236}">
+                <a16:creationId xmlns:a16="http://schemas.microsoft.com/office/drawing/2014/main" id="{1E547BA6-BAE0-43BB-A7CA-60F69CE252F0}"/>
+              </a:ext>
+              <a:ext uri="{C183D7F6-B498-43B3-948B-1728B52AA6E4}">
+                <adec:decorative xmlns:adec="http://schemas.microsoft.com/office/drawing/2017/decorative" val="1"/>
+              </a:ext>
+            </a:extLst>
+          </p:cNvPr>
+          <p:cNvSpPr>
+            <a:spLocks noGrp="1" noRot="1" noChangeAspect="1" noMove="1" noResize="1" noEditPoints="1" noAdjustHandles="1" noChangeArrowheads="1" noChangeShapeType="1" noTextEdit="1"/>
+          </p:cNvSpPr>
+          <p:nvPr>
+            <p:extLst>
+              <p:ext uri="{386F3935-93C4-4BCD-93E2-E3B085C9AB24}">
+                <p16:designElem xmlns:p16="http://schemas.microsoft.com/office/powerpoint/2015/main" val="1"/>
+              </p:ext>
+            </p:extLst>
+          </p:nvPr>
+        </p:nvSpPr>
+        <p:spPr>
+          <a:xfrm rot="2700000">
+            <a:off x="427916" y="5728708"/>
+            <a:ext cx="485578" cy="485578"/>
+          </a:xfrm>
+          <a:prstGeom prst="rect">
+            <a:avLst/>
+          </a:prstGeom>
+          <a:solidFill>
+            <a:schemeClr val="accent1">
+              <a:alpha val="30000"/>
+            </a:schemeClr>
+          </a:solidFill>
+          <a:ln>
+            <a:noFill/>
+          </a:ln>
+        </p:spPr>
+        <p:style>
+          <a:lnRef idx="2">
+            <a:schemeClr val="accent1">
+              <a:shade val="50000"/>
+            </a:schemeClr>
+          </a:lnRef>
+          <a:fillRef idx="1">
+            <a:schemeClr val="accent1"/>
+          </a:fillRef>
+          <a:effectRef idx="0">
+            <a:schemeClr val="accent1"/>
+          </a:effectRef>
+          <a:fontRef idx="minor">
+            <a:schemeClr val="lt1"/>
+          </a:fontRef>
+        </p:style>
+        <p:txBody>
+          <a:bodyPr rtlCol="0" anchor="ctr"/>
+          <a:lstStyle/>
+          <a:p>
+            <a:pPr algn="ctr"/>
+            <a:endParaRPr lang="en-US"/>
+          </a:p>
+        </p:txBody>
+      </p:sp>
+      <p:pic>
+        <p:nvPicPr>
+          <p:cNvPr id="6" name="Picture 5">
+            <a:extLst>
+              <a:ext uri="{FF2B5EF4-FFF2-40B4-BE49-F238E27FC236}">
+                <a16:creationId xmlns:a16="http://schemas.microsoft.com/office/drawing/2014/main" id="{12AD6A62-2F97-4354-B69C-B7C6A4E0BCA8}"/>
+              </a:ext>
+            </a:extLst>
+          </p:cNvPr>
+          <p:cNvPicPr>
+            <a:picLocks noChangeAspect="1"/>
+          </p:cNvPicPr>
+          <p:nvPr/>
+        </p:nvPicPr>
+        <p:blipFill>
+          <a:blip r:embed="rId5"/>
+          <a:stretch>
+            <a:fillRect/>
+          </a:stretch>
+        </p:blipFill>
+        <p:spPr>
+          <a:xfrm>
+            <a:off x="6342433" y="2975879"/>
+            <a:ext cx="5522217" cy="3637859"/>
+          </a:xfrm>
+          <a:prstGeom prst="rect">
+            <a:avLst/>
+          </a:prstGeom>
+        </p:spPr>
+      </p:pic>
+      <p:graphicFrame>
+        <p:nvGraphicFramePr>
+          <p:cNvPr id="7" name="Object 6">
+            <a:extLst>
+              <a:ext uri="{FF2B5EF4-FFF2-40B4-BE49-F238E27FC236}">
+                <a16:creationId xmlns:a16="http://schemas.microsoft.com/office/drawing/2014/main" id="{688DEFB9-0E91-4172-8F51-FDA7C3A1342C}"/>
+              </a:ext>
+            </a:extLst>
+          </p:cNvPr>
+          <p:cNvGraphicFramePr>
+            <a:graphicFrameLocks noChangeAspect="1"/>
+          </p:cNvGraphicFramePr>
+          <p:nvPr>
+            <p:extLst>
+              <p:ext uri="{D42A27DB-BD31-4B8C-83A1-F6EECF244321}">
+                <p14:modId xmlns:p14="http://schemas.microsoft.com/office/powerpoint/2010/main" val="2013957225"/>
+              </p:ext>
+            </p:extLst>
+          </p:nvPr>
+        </p:nvGraphicFramePr>
+        <p:xfrm>
+          <a:off x="2247775" y="5287416"/>
+          <a:ext cx="2302544" cy="889547"/>
+        </p:xfrm>
+        <a:graphic>
+          <a:graphicData uri="http://schemas.openxmlformats.org/presentationml/2006/ole">
+            <mc:AlternateContent xmlns:mc="http://schemas.openxmlformats.org/markup-compatibility/2006">
+              <mc:Choice xmlns:v="urn:schemas-microsoft-com:vml" Requires="v">
+                <p:oleObj spid="_x0000_s2067" name="Packager Shell Object" showAsIcon="1" r:id="rId6" imgW="1138680" imgH="439560" progId="Package">
+                  <p:embed/>
+                </p:oleObj>
+              </mc:Choice>
+              <mc:Fallback>
+                <p:oleObj name="Packager Shell Object" showAsIcon="1" r:id="rId6" imgW="1138680" imgH="439560" progId="Package">
+                  <p:embed/>
+                  <p:pic>
+                    <p:nvPicPr>
+                      <p:cNvPr id="0" name=""/>
+                      <p:cNvPicPr/>
+                      <p:nvPr/>
+                    </p:nvPicPr>
+                    <p:blipFill>
+                      <a:blip r:embed="rId7"/>
+                      <a:stretch>
+                        <a:fillRect/>
+                      </a:stretch>
+                    </p:blipFill>
+                    <p:spPr>
+                      <a:xfrm>
+                        <a:off x="2247775" y="5287416"/>
+                        <a:ext cx="2302544" cy="889547"/>
+                      </a:xfrm>
+                      <a:prstGeom prst="rect">
+                        <a:avLst/>
+                      </a:prstGeom>
+                    </p:spPr>
+                  </p:pic>
+                </p:oleObj>
+              </mc:Fallback>
+            </mc:AlternateContent>
+          </a:graphicData>
+        </a:graphic>
+      </p:graphicFrame>
+    </p:spTree>
+    <p:extLst>
+      <p:ext uri="{BB962C8B-B14F-4D97-AF65-F5344CB8AC3E}">
+        <p14:creationId xmlns:p14="http://schemas.microsoft.com/office/powerpoint/2010/main" val="2998131693"/>
+      </p:ext>
+    </p:extLst>
+  </p:cSld>
+  <p:clrMapOvr>
+    <a:masterClrMapping/>
+  </p:clrMapOvr>
+</p:sld>
+</file>
+
+<file path=ppt/slides/slide8.xml><?xml version="1.0" encoding="utf-8"?>
+<p:sld xmlns:a="http://schemas.openxmlformats.org/drawingml/2006/main" xmlns:r="http://schemas.openxmlformats.org/officeDocument/2006/relationships" xmlns:p="http://schemas.openxmlformats.org/presentationml/2006/main">
+  <p:cSld>
+    <p:bg>
+      <p:bgPr>
+        <a:solidFill>
+          <a:schemeClr val="bg1"/>
+        </a:solidFill>
+        <a:effectLst/>
+      </p:bgPr>
+    </p:bg>
+    <p:spTree>
+      <p:nvGrpSpPr>
+        <p:cNvPr id="1" name=""/>
+        <p:cNvGrpSpPr/>
+        <p:nvPr/>
+      </p:nvGrpSpPr>
+      <p:grpSpPr>
+        <a:xfrm>
+          <a:off x="0" y="0"/>
+          <a:ext cx="0" cy="0"/>
+          <a:chOff x="0" y="0"/>
+          <a:chExt cx="0" cy="0"/>
+        </a:xfrm>
+      </p:grpSpPr>
+      <p:sp useBgFill="1">
+        <p:nvSpPr>
+          <p:cNvPr id="9" name="Rectangle 8">
+            <a:extLst>
+              <a:ext uri="{FF2B5EF4-FFF2-40B4-BE49-F238E27FC236}">
+                <a16:creationId xmlns:a16="http://schemas.microsoft.com/office/drawing/2014/main" id="{665DBBEF-238B-476B-96AB-8AAC3224ECEA}"/>
+              </a:ext>
+              <a:ext uri="{C183D7F6-B498-43B3-948B-1728B52AA6E4}">
+                <adec:decorative xmlns:adec="http://schemas.microsoft.com/office/drawing/2017/decorative" val="1"/>
+              </a:ext>
+            </a:extLst>
+          </p:cNvPr>
+          <p:cNvSpPr>
+            <a:spLocks noGrp="1" noRot="1" noChangeAspect="1" noMove="1" noResize="1" noEditPoints="1" noAdjustHandles="1" noChangeArrowheads="1" noChangeShapeType="1" noTextEdit="1"/>
+          </p:cNvSpPr>
+          <p:nvPr>
+            <p:extLst>
+              <p:ext uri="{386F3935-93C4-4BCD-93E2-E3B085C9AB24}">
+                <p16:designElem xmlns:p16="http://schemas.microsoft.com/office/powerpoint/2015/main" val="1"/>
+              </p:ext>
+            </p:extLst>
+          </p:nvPr>
+        </p:nvSpPr>
+        <p:spPr>
+          <a:xfrm>
+            <a:off x="0" y="0"/>
+            <a:ext cx="12192000" cy="6858000"/>
+          </a:xfrm>
+          <a:prstGeom prst="rect">
+            <a:avLst/>
+          </a:prstGeom>
+          <a:ln>
+            <a:noFill/>
+          </a:ln>
+        </p:spPr>
+        <p:style>
+          <a:lnRef idx="2">
+            <a:schemeClr val="accent1">
+              <a:shade val="50000"/>
+            </a:schemeClr>
+          </a:lnRef>
+          <a:fillRef idx="1">
+            <a:schemeClr val="accent1"/>
+          </a:fillRef>
+          <a:effectRef idx="0">
+            <a:schemeClr val="accent1"/>
+          </a:effectRef>
+          <a:fontRef idx="minor">
+            <a:schemeClr val="lt1"/>
+          </a:fontRef>
+        </p:style>
+        <p:txBody>
+          <a:bodyPr rtlCol="0" anchor="ctr"/>
+          <a:lstStyle/>
+          <a:p>
+            <a:pPr algn="ctr"/>
+            <a:endParaRPr lang="en-US"/>
+          </a:p>
+        </p:txBody>
+      </p:sp>
+      <p:sp>
+        <p:nvSpPr>
+          <p:cNvPr id="2" name="Title 1">
+            <a:extLst>
+              <a:ext uri="{FF2B5EF4-FFF2-40B4-BE49-F238E27FC236}">
+                <a16:creationId xmlns:a16="http://schemas.microsoft.com/office/drawing/2014/main" id="{AB6DDA29-5858-463C-AD43-1C489734B0AD}"/>
+              </a:ext>
+            </a:extLst>
+          </p:cNvPr>
+          <p:cNvSpPr>
+            <a:spLocks noGrp="1"/>
+          </p:cNvSpPr>
+          <p:nvPr>
+            <p:ph type="title"/>
+          </p:nvPr>
+        </p:nvSpPr>
+        <p:spPr>
+          <a:xfrm>
+            <a:off x="638882" y="639193"/>
+            <a:ext cx="3571810" cy="3573516"/>
+          </a:xfrm>
+        </p:spPr>
+        <p:txBody>
+          <a:bodyPr vert="horz" lIns="91440" tIns="45720" rIns="91440" bIns="45720" rtlCol="0" anchor="b">
+            <a:normAutofit/>
+          </a:bodyPr>
+          <a:lstStyle/>
+          <a:p>
+            <a:r>
+              <a:rPr lang="en-US" sz="5400" kern="1200" dirty="0">
+                <a:solidFill>
+                  <a:schemeClr val="tx1"/>
+                </a:solidFill>
+                <a:latin typeface="微软雅黑" panose="020B0503020204020204" pitchFamily="34" charset="-122"/>
+                <a:ea typeface="微软雅黑" panose="020B0503020204020204" pitchFamily="34" charset="-122"/>
+              </a:rPr>
+              <a:t>Example </a:t>
+            </a:r>
+            <a:r>
+              <a:rPr lang="en-US" altLang="zh-CN" sz="5400" kern="1200" dirty="0">
+                <a:solidFill>
+                  <a:schemeClr val="tx1"/>
+                </a:solidFill>
+                <a:latin typeface="微软雅黑" panose="020B0503020204020204" pitchFamily="34" charset="-122"/>
+                <a:ea typeface="微软雅黑" panose="020B0503020204020204" pitchFamily="34" charset="-122"/>
+              </a:rPr>
+              <a:t>- Result</a:t>
+            </a:r>
+            <a:endParaRPr lang="en-US" sz="5400" kern="1200" dirty="0">
+              <a:solidFill>
+                <a:schemeClr val="tx1"/>
+              </a:solidFill>
+              <a:latin typeface="微软雅黑" panose="020B0503020204020204" pitchFamily="34" charset="-122"/>
+              <a:ea typeface="微软雅黑" panose="020B0503020204020204" pitchFamily="34" charset="-122"/>
+            </a:endParaRPr>
+          </a:p>
+        </p:txBody>
+      </p:sp>
+      <p:sp>
+        <p:nvSpPr>
+          <p:cNvPr id="13" name="sketch line">
+            <a:extLst>
+              <a:ext uri="{FF2B5EF4-FFF2-40B4-BE49-F238E27FC236}">
+                <a16:creationId xmlns:a16="http://schemas.microsoft.com/office/drawing/2014/main" id="{3FCFB1DE-0B7E-48CC-BA90-B2AB0889F9D6}"/>
+              </a:ext>
+              <a:ext uri="{C183D7F6-B498-43B3-948B-1728B52AA6E4}">
+                <adec:decorative xmlns:adec="http://schemas.microsoft.com/office/drawing/2017/decorative" val="1"/>
+              </a:ext>
+            </a:extLst>
+          </p:cNvPr>
+          <p:cNvSpPr>
+            <a:spLocks noGrp="1" noRot="1" noChangeAspect="1" noMove="1" noResize="1" noEditPoints="1" noAdjustHandles="1" noChangeArrowheads="1" noChangeShapeType="1" noTextEdit="1"/>
+          </p:cNvSpPr>
+          <p:nvPr>
+            <p:extLst>
+              <p:ext uri="{386F3935-93C4-4BCD-93E2-E3B085C9AB24}">
+                <p16:designElem xmlns:p16="http://schemas.microsoft.com/office/powerpoint/2015/main" val="1"/>
+              </p:ext>
+            </p:extLst>
+          </p:nvPr>
+        </p:nvSpPr>
+        <p:spPr>
+          <a:xfrm>
+            <a:off x="643278" y="4409267"/>
+            <a:ext cx="3255095" cy="18288"/>
+          </a:xfrm>
+          <a:custGeom>
+            <a:avLst/>
+            <a:gdLst>
+              <a:gd name="connsiteX0" fmla="*/ 0 w 3255095"/>
+              <a:gd name="connsiteY0" fmla="*/ 0 h 18288"/>
+              <a:gd name="connsiteX1" fmla="*/ 618468 w 3255095"/>
+              <a:gd name="connsiteY1" fmla="*/ 0 h 18288"/>
+              <a:gd name="connsiteX2" fmla="*/ 1269487 w 3255095"/>
+              <a:gd name="connsiteY2" fmla="*/ 0 h 18288"/>
+              <a:gd name="connsiteX3" fmla="*/ 1953057 w 3255095"/>
+              <a:gd name="connsiteY3" fmla="*/ 0 h 18288"/>
+              <a:gd name="connsiteX4" fmla="*/ 2636627 w 3255095"/>
+              <a:gd name="connsiteY4" fmla="*/ 0 h 18288"/>
+              <a:gd name="connsiteX5" fmla="*/ 3255095 w 3255095"/>
+              <a:gd name="connsiteY5" fmla="*/ 0 h 18288"/>
+              <a:gd name="connsiteX6" fmla="*/ 3255095 w 3255095"/>
+              <a:gd name="connsiteY6" fmla="*/ 18288 h 18288"/>
+              <a:gd name="connsiteX7" fmla="*/ 2538974 w 3255095"/>
+              <a:gd name="connsiteY7" fmla="*/ 18288 h 18288"/>
+              <a:gd name="connsiteX8" fmla="*/ 1822853 w 3255095"/>
+              <a:gd name="connsiteY8" fmla="*/ 18288 h 18288"/>
+              <a:gd name="connsiteX9" fmla="*/ 1171834 w 3255095"/>
+              <a:gd name="connsiteY9" fmla="*/ 18288 h 18288"/>
+              <a:gd name="connsiteX10" fmla="*/ 0 w 3255095"/>
+              <a:gd name="connsiteY10" fmla="*/ 18288 h 18288"/>
+              <a:gd name="connsiteX11" fmla="*/ 0 w 3255095"/>
+              <a:gd name="connsiteY11" fmla="*/ 0 h 18288"/>
+            </a:gdLst>
+            <a:ahLst/>
+            <a:cxnLst>
+              <a:cxn ang="0">
+                <a:pos x="connsiteX0" y="connsiteY0"/>
+              </a:cxn>
+              <a:cxn ang="0">
+                <a:pos x="connsiteX1" y="connsiteY1"/>
+              </a:cxn>
+              <a:cxn ang="0">
+                <a:pos x="connsiteX2" y="connsiteY2"/>
+              </a:cxn>
+              <a:cxn ang="0">
+                <a:pos x="connsiteX3" y="connsiteY3"/>
+              </a:cxn>
+              <a:cxn ang="0">
+                <a:pos x="connsiteX4" y="connsiteY4"/>
+              </a:cxn>
+              <a:cxn ang="0">
+                <a:pos x="connsiteX5" y="connsiteY5"/>
+              </a:cxn>
+              <a:cxn ang="0">
+                <a:pos x="connsiteX6" y="connsiteY6"/>
+              </a:cxn>
+              <a:cxn ang="0">
+                <a:pos x="connsiteX7" y="connsiteY7"/>
+              </a:cxn>
+              <a:cxn ang="0">
+                <a:pos x="connsiteX8" y="connsiteY8"/>
+              </a:cxn>
+              <a:cxn ang="0">
+                <a:pos x="connsiteX9" y="connsiteY9"/>
+              </a:cxn>
+              <a:cxn ang="0">
+                <a:pos x="connsiteX10" y="connsiteY10"/>
+              </a:cxn>
+              <a:cxn ang="0">
+                <a:pos x="connsiteX11" y="connsiteY11"/>
+              </a:cxn>
+            </a:cxnLst>
+            <a:rect l="l" t="t" r="r" b="b"/>
+            <a:pathLst>
+              <a:path w="3255095" h="18288" fill="none" extrusionOk="0">
+                <a:moveTo>
+                  <a:pt x="0" y="0"/>
+                </a:moveTo>
+                <a:cubicBezTo>
+                  <a:pt x="240201" y="-22123"/>
+                  <a:pt x="462021" y="-19623"/>
+                  <a:pt x="618468" y="0"/>
+                </a:cubicBezTo>
+                <a:cubicBezTo>
+                  <a:pt x="774915" y="19623"/>
+                  <a:pt x="974734" y="2035"/>
+                  <a:pt x="1269487" y="0"/>
+                </a:cubicBezTo>
+                <a:cubicBezTo>
+                  <a:pt x="1564240" y="-2035"/>
+                  <a:pt x="1733579" y="10639"/>
+                  <a:pt x="1953057" y="0"/>
+                </a:cubicBezTo>
+                <a:cubicBezTo>
+                  <a:pt x="2172535" y="-10639"/>
+                  <a:pt x="2453962" y="14018"/>
+                  <a:pt x="2636627" y="0"/>
+                </a:cubicBezTo>
+                <a:cubicBezTo>
+                  <a:pt x="2819292" y="-14018"/>
+                  <a:pt x="3121375" y="5399"/>
+                  <a:pt x="3255095" y="0"/>
+                </a:cubicBezTo>
+                <a:cubicBezTo>
+                  <a:pt x="3254386" y="8157"/>
+                  <a:pt x="3254682" y="12125"/>
+                  <a:pt x="3255095" y="18288"/>
+                </a:cubicBezTo>
+                <a:cubicBezTo>
+                  <a:pt x="3088545" y="23203"/>
+                  <a:pt x="2687475" y="7419"/>
+                  <a:pt x="2538974" y="18288"/>
+                </a:cubicBezTo>
+                <a:cubicBezTo>
+                  <a:pt x="2390473" y="29157"/>
+                  <a:pt x="2137381" y="-8959"/>
+                  <a:pt x="1822853" y="18288"/>
+                </a:cubicBezTo>
+                <a:cubicBezTo>
+                  <a:pt x="1508325" y="45535"/>
+                  <a:pt x="1466437" y="20385"/>
+                  <a:pt x="1171834" y="18288"/>
+                </a:cubicBezTo>
+                <a:cubicBezTo>
+                  <a:pt x="877231" y="16191"/>
+                  <a:pt x="561097" y="37643"/>
+                  <a:pt x="0" y="18288"/>
+                </a:cubicBezTo>
+                <a:cubicBezTo>
+                  <a:pt x="-46" y="12483"/>
+                  <a:pt x="-203" y="6491"/>
+                  <a:pt x="0" y="0"/>
+                </a:cubicBezTo>
+                <a:close/>
+              </a:path>
+              <a:path w="3255095" h="18288" stroke="0" extrusionOk="0">
+                <a:moveTo>
+                  <a:pt x="0" y="0"/>
+                </a:moveTo>
+                <a:cubicBezTo>
+                  <a:pt x="291965" y="19429"/>
+                  <a:pt x="363155" y="8568"/>
+                  <a:pt x="618468" y="0"/>
+                </a:cubicBezTo>
+                <a:cubicBezTo>
+                  <a:pt x="873781" y="-8568"/>
+                  <a:pt x="904459" y="-19505"/>
+                  <a:pt x="1171834" y="0"/>
+                </a:cubicBezTo>
+                <a:cubicBezTo>
+                  <a:pt x="1439209" y="19505"/>
+                  <a:pt x="1744369" y="9790"/>
+                  <a:pt x="1887955" y="0"/>
+                </a:cubicBezTo>
+                <a:cubicBezTo>
+                  <a:pt x="2031541" y="-9790"/>
+                  <a:pt x="2346378" y="21240"/>
+                  <a:pt x="2506423" y="0"/>
+                </a:cubicBezTo>
+                <a:cubicBezTo>
+                  <a:pt x="2666468" y="-21240"/>
+                  <a:pt x="2990257" y="30414"/>
+                  <a:pt x="3255095" y="0"/>
+                </a:cubicBezTo>
+                <a:cubicBezTo>
+                  <a:pt x="3254831" y="4493"/>
+                  <a:pt x="3255479" y="9472"/>
+                  <a:pt x="3255095" y="18288"/>
+                </a:cubicBezTo>
+                <a:cubicBezTo>
+                  <a:pt x="3120743" y="16690"/>
+                  <a:pt x="2759628" y="42462"/>
+                  <a:pt x="2604076" y="18288"/>
+                </a:cubicBezTo>
+                <a:cubicBezTo>
+                  <a:pt x="2448524" y="-5886"/>
+                  <a:pt x="2184336" y="19599"/>
+                  <a:pt x="1887955" y="18288"/>
+                </a:cubicBezTo>
+                <a:cubicBezTo>
+                  <a:pt x="1591574" y="16977"/>
+                  <a:pt x="1548845" y="6870"/>
+                  <a:pt x="1334589" y="18288"/>
+                </a:cubicBezTo>
+                <a:cubicBezTo>
+                  <a:pt x="1120333" y="29706"/>
+                  <a:pt x="996014" y="9662"/>
+                  <a:pt x="683570" y="18288"/>
+                </a:cubicBezTo>
+                <a:cubicBezTo>
+                  <a:pt x="371126" y="26914"/>
+                  <a:pt x="198687" y="16167"/>
+                  <a:pt x="0" y="18288"/>
+                </a:cubicBezTo>
+                <a:cubicBezTo>
+                  <a:pt x="843" y="9577"/>
+                  <a:pt x="371" y="6900"/>
+                  <a:pt x="0" y="0"/>
+                </a:cubicBezTo>
+                <a:close/>
+              </a:path>
+            </a:pathLst>
+          </a:custGeom>
+          <a:solidFill>
+            <a:schemeClr val="accent2"/>
+          </a:solidFill>
+          <a:ln w="38100" cap="rnd">
+            <a:solidFill>
+              <a:schemeClr val="accent2"/>
+            </a:solidFill>
+            <a:round/>
+            <a:extLst>
+              <a:ext uri="{C807C97D-BFC1-408E-A445-0C87EB9F89A2}">
+                <ask:lineSketchStyleProps xmlns:ask="http://schemas.microsoft.com/office/drawing/2018/sketchyshapes" sd="1219033472">
+                  <a:prstGeom prst="rect">
+                    <a:avLst/>
+                  </a:prstGeom>
+                  <ask:type>
+                    <ask:lineSketchFreehand/>
+                  </ask:type>
+                </ask:lineSketchStyleProps>
+              </a:ext>
+            </a:extLst>
+          </a:ln>
+        </p:spPr>
+        <p:style>
+          <a:lnRef idx="2">
+            <a:schemeClr val="accent1">
+              <a:shade val="50000"/>
+            </a:schemeClr>
+          </a:lnRef>
+          <a:fillRef idx="1">
+            <a:schemeClr val="accent1"/>
+          </a:fillRef>
+          <a:effectRef idx="0">
+            <a:schemeClr val="accent1"/>
+          </a:effectRef>
+          <a:fontRef idx="minor">
+            <a:schemeClr val="lt1"/>
+          </a:fontRef>
+        </p:style>
+        <p:txBody>
+          <a:bodyPr rtlCol="0" anchor="ctr"/>
+          <a:lstStyle/>
+          <a:p>
+            <a:pPr algn="ctr"/>
+            <a:endParaRPr lang="en-US"/>
+          </a:p>
+        </p:txBody>
+      </p:sp>
+      <p:pic>
+        <p:nvPicPr>
+          <p:cNvPr id="4" name="Picture 3" descr="Graphical user interface, application&#10;&#10;Description automatically generated">
+            <a:extLst>
+              <a:ext uri="{FF2B5EF4-FFF2-40B4-BE49-F238E27FC236}">
+                <a16:creationId xmlns:a16="http://schemas.microsoft.com/office/drawing/2014/main" id="{DDD15787-617F-40F4-99BB-1ED66B6AE850}"/>
+              </a:ext>
+            </a:extLst>
+          </p:cNvPr>
+          <p:cNvPicPr>
+            <a:picLocks noChangeAspect="1"/>
+          </p:cNvPicPr>
+          <p:nvPr/>
+        </p:nvPicPr>
+        <p:blipFill>
+          <a:blip r:embed="rId2"/>
+          <a:stretch>
+            <a:fillRect/>
+          </a:stretch>
+        </p:blipFill>
+        <p:spPr>
+          <a:xfrm>
+            <a:off x="4654296" y="1151698"/>
+            <a:ext cx="7214616" cy="4527171"/>
+          </a:xfrm>
+          <a:prstGeom prst="rect">
+            <a:avLst/>
+          </a:prstGeom>
+        </p:spPr>
+      </p:pic>
+    </p:spTree>
+    <p:extLst>
+      <p:ext uri="{BB962C8B-B14F-4D97-AF65-F5344CB8AC3E}">
+        <p14:creationId xmlns:p14="http://schemas.microsoft.com/office/powerpoint/2010/main" val="973212727"/>
+      </p:ext>
+    </p:extLst>
+  </p:cSld>
+  <p:clrMapOvr>
+    <a:masterClrMapping/>
+  </p:clrMapOvr>
+</p:sld>
+</file>
+
+<file path=ppt/slides/slide9.xml><?xml version="1.0" encoding="utf-8"?>
+<p:sld xmlns:a="http://schemas.openxmlformats.org/drawingml/2006/main" xmlns:r="http://schemas.openxmlformats.org/officeDocument/2006/relationships" xmlns:p="http://schemas.openxmlformats.org/presentationml/2006/main">
+  <p:cSld>
+    <p:spTree>
+      <p:nvGrpSpPr>
+        <p:cNvPr id="1" name=""/>
+        <p:cNvGrpSpPr/>
+        <p:nvPr/>
+      </p:nvGrpSpPr>
+      <p:grpSpPr>
+        <a:xfrm>
+          <a:off x="0" y="0"/>
+          <a:ext cx="0" cy="0"/>
+          <a:chOff x="0" y="0"/>
+          <a:chExt cx="0" cy="0"/>
+        </a:xfrm>
+      </p:grpSpPr>
+      <p:sp>
+        <p:nvSpPr>
+          <p:cNvPr id="2" name="Title 1">
+            <a:extLst>
+              <a:ext uri="{FF2B5EF4-FFF2-40B4-BE49-F238E27FC236}">
+                <a16:creationId xmlns:a16="http://schemas.microsoft.com/office/drawing/2014/main" id="{9B934ACB-B6DB-4B7C-B717-67025A7D5F47}"/>
+              </a:ext>
+            </a:extLst>
+          </p:cNvPr>
+          <p:cNvSpPr>
+            <a:spLocks noGrp="1"/>
+          </p:cNvSpPr>
+          <p:nvPr>
+            <p:ph type="title"/>
+          </p:nvPr>
+        </p:nvSpPr>
+        <p:spPr/>
+        <p:txBody>
+          <a:bodyPr/>
+          <a:lstStyle/>
+          <a:p>
+            <a:r>
+              <a:rPr lang="en-US" dirty="0">
+                <a:latin typeface="微软雅黑" panose="020B0503020204020204" pitchFamily="34" charset="-122"/>
+                <a:ea typeface="微软雅黑" panose="020B0503020204020204" pitchFamily="34" charset="-122"/>
+              </a:rPr>
+              <a:t>Example </a:t>
+            </a:r>
+            <a:r>
+              <a:rPr lang="en-US" altLang="zh-CN" dirty="0">
+                <a:latin typeface="微软雅黑" panose="020B0503020204020204" pitchFamily="34" charset="-122"/>
+                <a:ea typeface="微软雅黑" panose="020B0503020204020204" pitchFamily="34" charset="-122"/>
+              </a:rPr>
+              <a:t>- </a:t>
+            </a:r>
+            <a:r>
+              <a:rPr lang="en-US" dirty="0">
+                <a:latin typeface="微软雅黑" panose="020B0503020204020204" pitchFamily="34" charset="-122"/>
+                <a:ea typeface="微软雅黑" panose="020B0503020204020204" pitchFamily="34" charset="-122"/>
+              </a:rPr>
+              <a:t>Note</a:t>
+            </a:r>
+          </a:p>
+        </p:txBody>
+      </p:sp>
+      <p:sp>
+        <p:nvSpPr>
+          <p:cNvPr id="3" name="Content Placeholder 2">
+            <a:extLst>
+              <a:ext uri="{FF2B5EF4-FFF2-40B4-BE49-F238E27FC236}">
+                <a16:creationId xmlns:a16="http://schemas.microsoft.com/office/drawing/2014/main" id="{B3F1D543-BDDC-4495-B3D0-58F2F3C42FF0}"/>
+              </a:ext>
+            </a:extLst>
+          </p:cNvPr>
+          <p:cNvSpPr>
+            <a:spLocks noGrp="1"/>
+          </p:cNvSpPr>
+          <p:nvPr>
+            <p:ph idx="1"/>
+          </p:nvPr>
+        </p:nvSpPr>
+        <p:spPr/>
+        <p:txBody>
+          <a:bodyPr/>
+          <a:lstStyle/>
+          <a:p>
+            <a:r>
+              <a:rPr lang="zh-CN" altLang="en-US" dirty="0">
+                <a:latin typeface="微软雅黑" panose="020B0503020204020204" pitchFamily="34" charset="-122"/>
+                <a:ea typeface="微软雅黑" panose="020B0503020204020204" pitchFamily="34" charset="-122"/>
+              </a:rPr>
+              <a:t>示例中一次性返回了所有数据，而在实际使用中应该根据传入的参数（</a:t>
+            </a:r>
+            <a:r>
+              <a:rPr lang="en-US" altLang="zh-CN" dirty="0">
+                <a:latin typeface="微软雅黑" panose="020B0503020204020204" pitchFamily="34" charset="-122"/>
+                <a:ea typeface="微软雅黑" panose="020B0503020204020204" pitchFamily="34" charset="-122"/>
+              </a:rPr>
+              <a:t>id, time</a:t>
+            </a:r>
+            <a:r>
+              <a:rPr lang="zh-CN" altLang="en-US" dirty="0">
+                <a:latin typeface="微软雅黑" panose="020B0503020204020204" pitchFamily="34" charset="-122"/>
+                <a:ea typeface="微软雅黑" panose="020B0503020204020204" pitchFamily="34" charset="-122"/>
+              </a:rPr>
+              <a:t>）进行采集并返回指定的数据</a:t>
+            </a:r>
+            <a:endParaRPr lang="en-US" altLang="zh-CN" dirty="0">
+              <a:latin typeface="微软雅黑" panose="020B0503020204020204" pitchFamily="34" charset="-122"/>
+              <a:ea typeface="微软雅黑" panose="020B0503020204020204" pitchFamily="34" charset="-122"/>
+            </a:endParaRPr>
+          </a:p>
+          <a:p>
+            <a:r>
+              <a:rPr lang="zh-CN" altLang="en-US" dirty="0">
+                <a:latin typeface="微软雅黑" panose="020B0503020204020204" pitchFamily="34" charset="-122"/>
+                <a:ea typeface="微软雅黑" panose="020B0503020204020204" pitchFamily="34" charset="-122"/>
+              </a:rPr>
+              <a:t>一般的更新方式是遍历</a:t>
+            </a:r>
+            <a:r>
+              <a:rPr lang="en-US" altLang="zh-CN" dirty="0" err="1">
+                <a:latin typeface="微软雅黑" panose="020B0503020204020204" pitchFamily="34" charset="-122"/>
+                <a:ea typeface="微软雅黑" panose="020B0503020204020204" pitchFamily="34" charset="-122"/>
+              </a:rPr>
+              <a:t>update_list</a:t>
+            </a:r>
+            <a:r>
+              <a:rPr lang="zh-CN" altLang="en-US" dirty="0">
+                <a:latin typeface="微软雅黑" panose="020B0503020204020204" pitchFamily="34" charset="-122"/>
+                <a:ea typeface="微软雅黑" panose="020B0503020204020204" pitchFamily="34" charset="-122"/>
+              </a:rPr>
+              <a:t>，将</a:t>
+            </a:r>
+            <a:r>
+              <a:rPr lang="en-US" altLang="zh-CN" dirty="0">
+                <a:latin typeface="微软雅黑" panose="020B0503020204020204" pitchFamily="34" charset="-122"/>
+                <a:ea typeface="微软雅黑" panose="020B0503020204020204" pitchFamily="34" charset="-122"/>
+              </a:rPr>
+              <a:t>identity</a:t>
+            </a:r>
+            <a:r>
+              <a:rPr lang="zh-CN" altLang="en-US" dirty="0">
+                <a:latin typeface="微软雅黑" panose="020B0503020204020204" pitchFamily="34" charset="-122"/>
+                <a:ea typeface="微软雅黑" panose="020B0503020204020204" pitchFamily="34" charset="-122"/>
+              </a:rPr>
+              <a:t>依次取出分别调用</a:t>
+            </a:r>
+            <a:r>
+              <a:rPr lang="en-US" altLang="zh-CN" dirty="0">
+                <a:latin typeface="微软雅黑" panose="020B0503020204020204" pitchFamily="34" charset="-122"/>
+                <a:ea typeface="微软雅黑" panose="020B0503020204020204" pitchFamily="34" charset="-122"/>
+              </a:rPr>
+              <a:t>Collector</a:t>
+            </a:r>
+            <a:r>
+              <a:rPr lang="zh-CN" altLang="en-US" dirty="0">
+                <a:latin typeface="微软雅黑" panose="020B0503020204020204" pitchFamily="34" charset="-122"/>
+                <a:ea typeface="微软雅黑" panose="020B0503020204020204" pitchFamily="34" charset="-122"/>
+              </a:rPr>
+              <a:t>中的</a:t>
+            </a:r>
+            <a:r>
+              <a:rPr lang="en-US" altLang="zh-CN" dirty="0">
+                <a:latin typeface="微软雅黑" panose="020B0503020204020204" pitchFamily="34" charset="-122"/>
+                <a:ea typeface="微软雅黑" panose="020B0503020204020204" pitchFamily="34" charset="-122"/>
+              </a:rPr>
+              <a:t>query</a:t>
+            </a:r>
+            <a:r>
+              <a:rPr lang="zh-CN" altLang="en-US" dirty="0">
+                <a:latin typeface="微软雅黑" panose="020B0503020204020204" pitchFamily="34" charset="-122"/>
+                <a:ea typeface="微软雅黑" panose="020B0503020204020204" pitchFamily="34" charset="-122"/>
+              </a:rPr>
+              <a:t>函数。示例中</a:t>
+            </a:r>
+            <a:r>
+              <a:rPr lang="en-US" altLang="zh-CN" dirty="0" err="1">
+                <a:latin typeface="微软雅黑" panose="020B0503020204020204" pitchFamily="34" charset="-122"/>
+                <a:ea typeface="微软雅黑" panose="020B0503020204020204" pitchFamily="34" charset="-122"/>
+              </a:rPr>
+              <a:t>update_list</a:t>
+            </a:r>
+            <a:r>
+              <a:rPr lang="zh-CN" altLang="en-US" dirty="0">
+                <a:latin typeface="微软雅黑" panose="020B0503020204020204" pitchFamily="34" charset="-122"/>
+                <a:ea typeface="微软雅黑" panose="020B0503020204020204" pitchFamily="34" charset="-122"/>
+              </a:rPr>
+              <a:t>有三个值，所以</a:t>
+            </a:r>
+            <a:r>
+              <a:rPr lang="en-US" altLang="zh-CN" dirty="0">
+                <a:latin typeface="微软雅黑" panose="020B0503020204020204" pitchFamily="34" charset="-122"/>
+                <a:ea typeface="微软雅黑" panose="020B0503020204020204" pitchFamily="34" charset="-122"/>
+              </a:rPr>
+              <a:t>query</a:t>
+            </a:r>
+            <a:r>
+              <a:rPr lang="zh-CN" altLang="en-US" dirty="0">
+                <a:latin typeface="微软雅黑" panose="020B0503020204020204" pitchFamily="34" charset="-122"/>
+                <a:ea typeface="微软雅黑" panose="020B0503020204020204" pitchFamily="34" charset="-122"/>
+              </a:rPr>
+              <a:t>函数会被调用三次。</a:t>
+            </a:r>
+            <a:endParaRPr lang="en-US" altLang="zh-CN" dirty="0">
+              <a:latin typeface="微软雅黑" panose="020B0503020204020204" pitchFamily="34" charset="-122"/>
+              <a:ea typeface="微软雅黑" panose="020B0503020204020204" pitchFamily="34" charset="-122"/>
+            </a:endParaRPr>
+          </a:p>
+          <a:p>
+            <a:r>
+              <a:rPr lang="zh-CN" altLang="en-US" dirty="0">
+                <a:latin typeface="微软雅黑" panose="020B0503020204020204" pitchFamily="34" charset="-122"/>
+                <a:ea typeface="微软雅黑" panose="020B0503020204020204" pitchFamily="34" charset="-122"/>
+              </a:rPr>
+              <a:t>某些情况下系统会尝试进行</a:t>
+            </a:r>
+            <a:r>
+              <a:rPr lang="en-US" altLang="zh-CN" dirty="0">
+                <a:latin typeface="微软雅黑" panose="020B0503020204020204" pitchFamily="34" charset="-122"/>
+                <a:ea typeface="微软雅黑" panose="020B0503020204020204" pitchFamily="34" charset="-122"/>
+              </a:rPr>
+              <a:t>slice update</a:t>
+            </a:r>
+            <a:r>
+              <a:rPr lang="zh-CN" altLang="en-US" dirty="0">
+                <a:latin typeface="微软雅黑" panose="020B0503020204020204" pitchFamily="34" charset="-122"/>
+                <a:ea typeface="微软雅黑" panose="020B0503020204020204" pitchFamily="34" charset="-122"/>
+              </a:rPr>
+              <a:t>。即不指定</a:t>
+            </a:r>
+            <a:r>
+              <a:rPr lang="en-US" altLang="zh-CN" dirty="0">
+                <a:latin typeface="微软雅黑" panose="020B0503020204020204" pitchFamily="34" charset="-122"/>
+                <a:ea typeface="微软雅黑" panose="020B0503020204020204" pitchFamily="34" charset="-122"/>
+              </a:rPr>
+              <a:t>identity</a:t>
+            </a:r>
+            <a:r>
+              <a:rPr lang="zh-CN" altLang="en-US" dirty="0">
+                <a:latin typeface="微软雅黑" panose="020B0503020204020204" pitchFamily="34" charset="-122"/>
+                <a:ea typeface="微软雅黑" panose="020B0503020204020204" pitchFamily="34" charset="-122"/>
+              </a:rPr>
+              <a:t>，仅指定时间，尝试获取这一天所有股票的信息（依照</a:t>
+            </a:r>
+            <a:r>
+              <a:rPr lang="en-US" altLang="zh-CN" dirty="0" err="1">
+                <a:latin typeface="微软雅黑" panose="020B0503020204020204" pitchFamily="34" charset="-122"/>
+                <a:ea typeface="微软雅黑" panose="020B0503020204020204" pitchFamily="34" charset="-122"/>
+              </a:rPr>
+              <a:t>ts</a:t>
+            </a:r>
+            <a:r>
+              <a:rPr lang="zh-CN" altLang="en-US" dirty="0">
+                <a:latin typeface="微软雅黑" panose="020B0503020204020204" pitchFamily="34" charset="-122"/>
+                <a:ea typeface="微软雅黑" panose="020B0503020204020204" pitchFamily="34" charset="-122"/>
+              </a:rPr>
+              <a:t>定的）。</a:t>
+            </a:r>
+            <a:endParaRPr lang="en-US" altLang="zh-CN" dirty="0">
+              <a:latin typeface="微软雅黑" panose="020B0503020204020204" pitchFamily="34" charset="-122"/>
+              <a:ea typeface="微软雅黑" panose="020B0503020204020204" pitchFamily="34" charset="-122"/>
+            </a:endParaRPr>
+          </a:p>
+          <a:p>
+            <a:r>
+              <a:rPr lang="zh-CN" altLang="en-US" dirty="0">
+                <a:latin typeface="微软雅黑" panose="020B0503020204020204" pitchFamily="34" charset="-122"/>
+                <a:ea typeface="微软雅黑" panose="020B0503020204020204" pitchFamily="34" charset="-122"/>
+              </a:rPr>
+              <a:t>每次请求获得的值会进行自动合并和存储，</a:t>
+            </a:r>
+            <a:r>
+              <a:rPr lang="en-US" altLang="zh-CN" dirty="0" err="1">
+                <a:latin typeface="微软雅黑" panose="020B0503020204020204" pitchFamily="34" charset="-122"/>
+                <a:ea typeface="微软雅黑" panose="020B0503020204020204" pitchFamily="34" charset="-122"/>
+              </a:rPr>
+              <a:t>sas</a:t>
+            </a:r>
+            <a:r>
+              <a:rPr lang="zh-CN" altLang="en-US" dirty="0">
+                <a:latin typeface="微软雅黑" panose="020B0503020204020204" pitchFamily="34" charset="-122"/>
+                <a:ea typeface="微软雅黑" panose="020B0503020204020204" pitchFamily="34" charset="-122"/>
+              </a:rPr>
+              <a:t>系统会确保这一系列过程能正确执行</a:t>
+            </a:r>
+            <a:endParaRPr lang="en-US" dirty="0">
+              <a:latin typeface="微软雅黑" panose="020B0503020204020204" pitchFamily="34" charset="-122"/>
+              <a:ea typeface="微软雅黑" panose="020B0503020204020204" pitchFamily="34" charset="-122"/>
+            </a:endParaRPr>
+          </a:p>
+        </p:txBody>
+      </p:sp>
+    </p:spTree>
+    <p:extLst>
+      <p:ext uri="{BB962C8B-B14F-4D97-AF65-F5344CB8AC3E}">
+        <p14:creationId xmlns:p14="http://schemas.microsoft.com/office/powerpoint/2010/main" val="196058541"/>
       </p:ext>
     </p:extLst>
   </p:cSld>

</xml_diff>